<commit_message>
Check in more stuff
</commit_message>
<xml_diff>
--- a/FTC/2022/Advanced FTC Code.pptx
+++ b/FTC/2022/Advanced FTC Code.pptx
@@ -5,7 +5,7 @@
     <p:sldMasterId id="2147483648" r:id="rId1"/>
   </p:sldMasterIdLst>
   <p:notesMasterIdLst>
-    <p:notesMasterId r:id="rId29"/>
+    <p:notesMasterId r:id="rId10"/>
   </p:notesMasterIdLst>
   <p:sldIdLst>
     <p:sldId id="256" r:id="rId2"/>
@@ -13,28 +13,9 @@
     <p:sldId id="259" r:id="rId4"/>
     <p:sldId id="272" r:id="rId5"/>
     <p:sldId id="273" r:id="rId6"/>
-    <p:sldId id="260" r:id="rId7"/>
-    <p:sldId id="274" r:id="rId8"/>
-    <p:sldId id="276" r:id="rId9"/>
-    <p:sldId id="275" r:id="rId10"/>
-    <p:sldId id="277" r:id="rId11"/>
-    <p:sldId id="271" r:id="rId12"/>
-    <p:sldId id="278" r:id="rId13"/>
-    <p:sldId id="261" r:id="rId14"/>
-    <p:sldId id="262" r:id="rId15"/>
-    <p:sldId id="279" r:id="rId16"/>
-    <p:sldId id="280" r:id="rId17"/>
-    <p:sldId id="281" r:id="rId18"/>
-    <p:sldId id="282" r:id="rId19"/>
-    <p:sldId id="283" r:id="rId20"/>
-    <p:sldId id="284" r:id="rId21"/>
-    <p:sldId id="285" r:id="rId22"/>
-    <p:sldId id="286" r:id="rId23"/>
-    <p:sldId id="287" r:id="rId24"/>
-    <p:sldId id="288" r:id="rId25"/>
-    <p:sldId id="291" r:id="rId26"/>
-    <p:sldId id="292" r:id="rId27"/>
-    <p:sldId id="290" r:id="rId28"/>
+    <p:sldId id="293" r:id="rId7"/>
+    <p:sldId id="294" r:id="rId8"/>
+    <p:sldId id="295" r:id="rId9"/>
   </p:sldIdLst>
   <p:sldSz cx="12192000" cy="6858000"/>
   <p:notesSz cx="6858000" cy="9144000"/>
@@ -13774,2220 +13755,6 @@
 </p:sld>
 </file>
 
-<file path=ppt/slides/slide10.xml><?xml version="1.0" encoding="utf-8"?>
-<p:sld xmlns:a="http://schemas.openxmlformats.org/drawingml/2006/main" xmlns:r="http://schemas.openxmlformats.org/officeDocument/2006/relationships" xmlns:p="http://schemas.openxmlformats.org/presentationml/2006/main">
-  <p:cSld>
-    <p:spTree>
-      <p:nvGrpSpPr>
-        <p:cNvPr id="1" name=""/>
-        <p:cNvGrpSpPr/>
-        <p:nvPr/>
-      </p:nvGrpSpPr>
-      <p:grpSpPr>
-        <a:xfrm>
-          <a:off x="0" y="0"/>
-          <a:ext cx="0" cy="0"/>
-          <a:chOff x="0" y="0"/>
-          <a:chExt cx="0" cy="0"/>
-        </a:xfrm>
-      </p:grpSpPr>
-      <p:sp>
-        <p:nvSpPr>
-          <p:cNvPr id="2" name="Title 1">
-            <a:extLst>
-              <a:ext uri="{FF2B5EF4-FFF2-40B4-BE49-F238E27FC236}">
-                <a16:creationId xmlns:a16="http://schemas.microsoft.com/office/drawing/2014/main" id="{CC4A3FAA-0E02-4277-9A18-5E14BC20FA27}"/>
-              </a:ext>
-            </a:extLst>
-          </p:cNvPr>
-          <p:cNvSpPr>
-            <a:spLocks noGrp="1"/>
-          </p:cNvSpPr>
-          <p:nvPr>
-            <p:ph type="title"/>
-          </p:nvPr>
-        </p:nvSpPr>
-        <p:spPr/>
-        <p:txBody>
-          <a:bodyPr/>
-          <a:lstStyle/>
-          <a:p>
-            <a:r>
-              <a:rPr lang="en-US" dirty="0"/>
-              <a:t>Gyro get data</a:t>
-            </a:r>
-          </a:p>
-        </p:txBody>
-      </p:sp>
-      <p:sp>
-        <p:nvSpPr>
-          <p:cNvPr id="3" name="Content Placeholder 2">
-            <a:extLst>
-              <a:ext uri="{FF2B5EF4-FFF2-40B4-BE49-F238E27FC236}">
-                <a16:creationId xmlns:a16="http://schemas.microsoft.com/office/drawing/2014/main" id="{B50147CF-DAA8-4BEB-A969-D6D9FECE042F}"/>
-              </a:ext>
-            </a:extLst>
-          </p:cNvPr>
-          <p:cNvSpPr>
-            <a:spLocks noGrp="1"/>
-          </p:cNvSpPr>
-          <p:nvPr>
-            <p:ph idx="1"/>
-          </p:nvPr>
-        </p:nvSpPr>
-        <p:spPr/>
-        <p:txBody>
-          <a:bodyPr>
-            <a:normAutofit/>
-          </a:bodyPr>
-          <a:lstStyle/>
-          <a:p>
-            <a:pPr marL="0" indent="0">
-              <a:buNone/>
-            </a:pPr>
-            <a:r>
-              <a:rPr lang="en-US" sz="3200" dirty="0" err="1"/>
-              <a:t>telemetry.addLine</a:t>
-            </a:r>
-            <a:r>
-              <a:rPr lang="en-US" sz="3200" dirty="0"/>
-              <a:t>().</a:t>
-            </a:r>
-            <a:r>
-              <a:rPr lang="en-US" sz="3200" dirty="0" err="1"/>
-              <a:t>addData</a:t>
-            </a:r>
-            <a:r>
-              <a:rPr lang="en-US" sz="3200" dirty="0"/>
-              <a:t>("heading", new </a:t>
-            </a:r>
-            <a:r>
-              <a:rPr lang="en-US" sz="3200" dirty="0" err="1"/>
-              <a:t>Func</a:t>
-            </a:r>
-            <a:r>
-              <a:rPr lang="en-US" sz="3200" dirty="0"/>
-              <a:t>&lt;String&gt;() </a:t>
-            </a:r>
-          </a:p>
-          <a:p>
-            <a:pPr marL="0" indent="0">
-              <a:buNone/>
-            </a:pPr>
-            <a:r>
-              <a:rPr lang="en-US" sz="3200" dirty="0"/>
-              <a:t>{                @Override public String value() {                    return </a:t>
-            </a:r>
-            <a:r>
-              <a:rPr lang="en-US" sz="3200" dirty="0" err="1"/>
-              <a:t>formatAngle</a:t>
-            </a:r>
-            <a:r>
-              <a:rPr lang="en-US" sz="3200" dirty="0"/>
-              <a:t>(</a:t>
-            </a:r>
-            <a:r>
-              <a:rPr lang="en-US" sz="3200" dirty="0" err="1"/>
-              <a:t>angles.angleUnit</a:t>
-            </a:r>
-            <a:r>
-              <a:rPr lang="en-US" sz="3200" dirty="0"/>
-              <a:t>, </a:t>
-            </a:r>
-            <a:r>
-              <a:rPr lang="en-US" sz="3200" dirty="0" err="1"/>
-              <a:t>angles.firstAngle</a:t>
-            </a:r>
-            <a:r>
-              <a:rPr lang="en-US" sz="3200" dirty="0"/>
-              <a:t>);  }</a:t>
-            </a:r>
-          </a:p>
-          <a:p>
-            <a:pPr marL="0" indent="0">
-              <a:buNone/>
-            </a:pPr>
-            <a:r>
-              <a:rPr lang="en-US" sz="3200" dirty="0"/>
-              <a:t>});</a:t>
-            </a:r>
-          </a:p>
-        </p:txBody>
-      </p:sp>
-      <p:sp>
-        <p:nvSpPr>
-          <p:cNvPr id="5" name="Footer Placeholder 4">
-            <a:extLst>
-              <a:ext uri="{FF2B5EF4-FFF2-40B4-BE49-F238E27FC236}">
-                <a16:creationId xmlns:a16="http://schemas.microsoft.com/office/drawing/2014/main" id="{82484588-9CFE-4A0D-93C3-72A99A666C57}"/>
-              </a:ext>
-            </a:extLst>
-          </p:cNvPr>
-          <p:cNvSpPr>
-            <a:spLocks noGrp="1"/>
-          </p:cNvSpPr>
-          <p:nvPr>
-            <p:ph type="ftr" sz="quarter" idx="11"/>
-          </p:nvPr>
-        </p:nvSpPr>
-        <p:spPr>
-          <a:xfrm>
-            <a:off x="200892" y="6262255"/>
-            <a:ext cx="9081654" cy="374074"/>
-          </a:xfrm>
-        </p:spPr>
-        <p:txBody>
-          <a:bodyPr/>
-          <a:lstStyle/>
-          <a:p>
-            <a:r>
-              <a:rPr lang="en-US" sz="2400" dirty="0">
-                <a:solidFill>
-                  <a:schemeClr val="tx1"/>
-                </a:solidFill>
-              </a:rPr>
-              <a:t>https://github.com/JimWright4089/FIRSTWorkshops</a:t>
-            </a:r>
-          </a:p>
-        </p:txBody>
-      </p:sp>
-    </p:spTree>
-    <p:extLst>
-      <p:ext uri="{BB962C8B-B14F-4D97-AF65-F5344CB8AC3E}">
-        <p14:creationId xmlns:p14="http://schemas.microsoft.com/office/powerpoint/2010/main" val="758787572"/>
-      </p:ext>
-    </p:extLst>
-  </p:cSld>
-  <p:clrMapOvr>
-    <a:masterClrMapping/>
-  </p:clrMapOvr>
-</p:sld>
-</file>
-
-<file path=ppt/slides/slide11.xml><?xml version="1.0" encoding="utf-8"?>
-<p:sld xmlns:a="http://schemas.openxmlformats.org/drawingml/2006/main" xmlns:r="http://schemas.openxmlformats.org/officeDocument/2006/relationships" xmlns:p="http://schemas.openxmlformats.org/presentationml/2006/main">
-  <p:cSld>
-    <p:spTree>
-      <p:nvGrpSpPr>
-        <p:cNvPr id="1" name=""/>
-        <p:cNvGrpSpPr/>
-        <p:nvPr/>
-      </p:nvGrpSpPr>
-      <p:grpSpPr>
-        <a:xfrm>
-          <a:off x="0" y="0"/>
-          <a:ext cx="0" cy="0"/>
-          <a:chOff x="0" y="0"/>
-          <a:chExt cx="0" cy="0"/>
-        </a:xfrm>
-      </p:grpSpPr>
-      <p:sp>
-        <p:nvSpPr>
-          <p:cNvPr id="2" name="Title 1">
-            <a:extLst>
-              <a:ext uri="{FF2B5EF4-FFF2-40B4-BE49-F238E27FC236}">
-                <a16:creationId xmlns:a16="http://schemas.microsoft.com/office/drawing/2014/main" id="{CC4A3FAA-0E02-4277-9A18-5E14BC20FA27}"/>
-              </a:ext>
-            </a:extLst>
-          </p:cNvPr>
-          <p:cNvSpPr>
-            <a:spLocks noGrp="1"/>
-          </p:cNvSpPr>
-          <p:nvPr>
-            <p:ph type="title"/>
-          </p:nvPr>
-        </p:nvSpPr>
-        <p:spPr/>
-        <p:txBody>
-          <a:bodyPr/>
-          <a:lstStyle/>
-          <a:p>
-            <a:r>
-              <a:rPr lang="en-US" dirty="0"/>
-              <a:t>Driving Straight</a:t>
-            </a:r>
-          </a:p>
-        </p:txBody>
-      </p:sp>
-      <p:sp>
-        <p:nvSpPr>
-          <p:cNvPr id="3" name="Content Placeholder 2">
-            <a:extLst>
-              <a:ext uri="{FF2B5EF4-FFF2-40B4-BE49-F238E27FC236}">
-                <a16:creationId xmlns:a16="http://schemas.microsoft.com/office/drawing/2014/main" id="{B50147CF-DAA8-4BEB-A969-D6D9FECE042F}"/>
-              </a:ext>
-            </a:extLst>
-          </p:cNvPr>
-          <p:cNvSpPr>
-            <a:spLocks noGrp="1"/>
-          </p:cNvSpPr>
-          <p:nvPr>
-            <p:ph idx="1"/>
-          </p:nvPr>
-        </p:nvSpPr>
-        <p:spPr/>
-        <p:txBody>
-          <a:bodyPr>
-            <a:normAutofit/>
-          </a:bodyPr>
-          <a:lstStyle/>
-          <a:p>
-            <a:r>
-              <a:rPr lang="en-US" sz="3200" dirty="0"/>
-              <a:t>FTC robots for the most part drive straight.</a:t>
-            </a:r>
-          </a:p>
-          <a:p>
-            <a:r>
-              <a:rPr lang="en-US" sz="3200" dirty="0"/>
-              <a:t>The field is not that big.</a:t>
-            </a:r>
-          </a:p>
-          <a:p>
-            <a:r>
-              <a:rPr lang="en-US" sz="3200" dirty="0"/>
-              <a:t>Gyro is used for Tele/Auto.</a:t>
-            </a:r>
-          </a:p>
-        </p:txBody>
-      </p:sp>
-      <p:sp>
-        <p:nvSpPr>
-          <p:cNvPr id="5" name="Footer Placeholder 4">
-            <a:extLst>
-              <a:ext uri="{FF2B5EF4-FFF2-40B4-BE49-F238E27FC236}">
-                <a16:creationId xmlns:a16="http://schemas.microsoft.com/office/drawing/2014/main" id="{FB164297-73AC-4BF9-BFE0-85A1AF9DD029}"/>
-              </a:ext>
-            </a:extLst>
-          </p:cNvPr>
-          <p:cNvSpPr>
-            <a:spLocks noGrp="1"/>
-          </p:cNvSpPr>
-          <p:nvPr>
-            <p:ph type="ftr" sz="quarter" idx="11"/>
-          </p:nvPr>
-        </p:nvSpPr>
-        <p:spPr>
-          <a:xfrm>
-            <a:off x="214747" y="6345382"/>
-            <a:ext cx="9081654" cy="374074"/>
-          </a:xfrm>
-        </p:spPr>
-        <p:txBody>
-          <a:bodyPr/>
-          <a:lstStyle/>
-          <a:p>
-            <a:r>
-              <a:rPr lang="en-US" sz="2400" dirty="0">
-                <a:solidFill>
-                  <a:schemeClr val="tx1"/>
-                </a:solidFill>
-              </a:rPr>
-              <a:t>https://github.com/JimWright4089/FIRSTWorkshops</a:t>
-            </a:r>
-          </a:p>
-        </p:txBody>
-      </p:sp>
-    </p:spTree>
-    <p:extLst>
-      <p:ext uri="{BB962C8B-B14F-4D97-AF65-F5344CB8AC3E}">
-        <p14:creationId xmlns:p14="http://schemas.microsoft.com/office/powerpoint/2010/main" val="2276203360"/>
-      </p:ext>
-    </p:extLst>
-  </p:cSld>
-  <p:clrMapOvr>
-    <a:masterClrMapping/>
-  </p:clrMapOvr>
-</p:sld>
-</file>
-
-<file path=ppt/slides/slide12.xml><?xml version="1.0" encoding="utf-8"?>
-<p:sld xmlns:a="http://schemas.openxmlformats.org/drawingml/2006/main" xmlns:r="http://schemas.openxmlformats.org/officeDocument/2006/relationships" xmlns:p="http://schemas.openxmlformats.org/presentationml/2006/main">
-  <p:cSld>
-    <p:spTree>
-      <p:nvGrpSpPr>
-        <p:cNvPr id="1" name=""/>
-        <p:cNvGrpSpPr/>
-        <p:nvPr/>
-      </p:nvGrpSpPr>
-      <p:grpSpPr>
-        <a:xfrm>
-          <a:off x="0" y="0"/>
-          <a:ext cx="0" cy="0"/>
-          <a:chOff x="0" y="0"/>
-          <a:chExt cx="0" cy="0"/>
-        </a:xfrm>
-      </p:grpSpPr>
-      <p:sp>
-        <p:nvSpPr>
-          <p:cNvPr id="2" name="Title 1">
-            <a:extLst>
-              <a:ext uri="{FF2B5EF4-FFF2-40B4-BE49-F238E27FC236}">
-                <a16:creationId xmlns:a16="http://schemas.microsoft.com/office/drawing/2014/main" id="{CC4A3FAA-0E02-4277-9A18-5E14BC20FA27}"/>
-              </a:ext>
-            </a:extLst>
-          </p:cNvPr>
-          <p:cNvSpPr>
-            <a:spLocks noGrp="1"/>
-          </p:cNvSpPr>
-          <p:nvPr>
-            <p:ph type="title"/>
-          </p:nvPr>
-        </p:nvSpPr>
-        <p:spPr/>
-        <p:txBody>
-          <a:bodyPr/>
-          <a:lstStyle/>
-          <a:p>
-            <a:r>
-              <a:rPr lang="en-US" dirty="0"/>
-              <a:t>Driving Straight</a:t>
-            </a:r>
-          </a:p>
-        </p:txBody>
-      </p:sp>
-      <p:sp>
-        <p:nvSpPr>
-          <p:cNvPr id="3" name="Content Placeholder 2">
-            <a:extLst>
-              <a:ext uri="{FF2B5EF4-FFF2-40B4-BE49-F238E27FC236}">
-                <a16:creationId xmlns:a16="http://schemas.microsoft.com/office/drawing/2014/main" id="{B50147CF-DAA8-4BEB-A969-D6D9FECE042F}"/>
-              </a:ext>
-            </a:extLst>
-          </p:cNvPr>
-          <p:cNvSpPr>
-            <a:spLocks noGrp="1"/>
-          </p:cNvSpPr>
-          <p:nvPr>
-            <p:ph idx="1"/>
-          </p:nvPr>
-        </p:nvSpPr>
-        <p:spPr/>
-        <p:txBody>
-          <a:bodyPr>
-            <a:normAutofit/>
-          </a:bodyPr>
-          <a:lstStyle/>
-          <a:p>
-            <a:r>
-              <a:rPr lang="en-US" sz="3200" dirty="0"/>
-              <a:t>FTC robots for the most part drive straight.</a:t>
-            </a:r>
-          </a:p>
-          <a:p>
-            <a:r>
-              <a:rPr lang="en-US" sz="3200" dirty="0"/>
-              <a:t>The field is not that big.</a:t>
-            </a:r>
-          </a:p>
-          <a:p>
-            <a:r>
-              <a:rPr lang="en-US" sz="3200" dirty="0"/>
-              <a:t>Gyro is used for Tele/Auto.</a:t>
-            </a:r>
-          </a:p>
-        </p:txBody>
-      </p:sp>
-      <p:sp>
-        <p:nvSpPr>
-          <p:cNvPr id="5" name="Footer Placeholder 4">
-            <a:extLst>
-              <a:ext uri="{FF2B5EF4-FFF2-40B4-BE49-F238E27FC236}">
-                <a16:creationId xmlns:a16="http://schemas.microsoft.com/office/drawing/2014/main" id="{FB164297-73AC-4BF9-BFE0-85A1AF9DD029}"/>
-              </a:ext>
-            </a:extLst>
-          </p:cNvPr>
-          <p:cNvSpPr>
-            <a:spLocks noGrp="1"/>
-          </p:cNvSpPr>
-          <p:nvPr>
-            <p:ph type="ftr" sz="quarter" idx="11"/>
-          </p:nvPr>
-        </p:nvSpPr>
-        <p:spPr>
-          <a:xfrm>
-            <a:off x="214747" y="6345382"/>
-            <a:ext cx="9081654" cy="374074"/>
-          </a:xfrm>
-        </p:spPr>
-        <p:txBody>
-          <a:bodyPr/>
-          <a:lstStyle/>
-          <a:p>
-            <a:r>
-              <a:rPr lang="en-US" sz="2400" dirty="0">
-                <a:solidFill>
-                  <a:schemeClr val="tx1"/>
-                </a:solidFill>
-              </a:rPr>
-              <a:t>https://github.com/JimWright4089/FIRSTWorkshops</a:t>
-            </a:r>
-          </a:p>
-        </p:txBody>
-      </p:sp>
-    </p:spTree>
-    <p:extLst>
-      <p:ext uri="{BB962C8B-B14F-4D97-AF65-F5344CB8AC3E}">
-        <p14:creationId xmlns:p14="http://schemas.microsoft.com/office/powerpoint/2010/main" val="3584895054"/>
-      </p:ext>
-    </p:extLst>
-  </p:cSld>
-  <p:clrMapOvr>
-    <a:masterClrMapping/>
-  </p:clrMapOvr>
-</p:sld>
-</file>
-
-<file path=ppt/slides/slide13.xml><?xml version="1.0" encoding="utf-8"?>
-<p:sld xmlns:a="http://schemas.openxmlformats.org/drawingml/2006/main" xmlns:r="http://schemas.openxmlformats.org/officeDocument/2006/relationships" xmlns:p="http://schemas.openxmlformats.org/presentationml/2006/main">
-  <p:cSld>
-    <p:spTree>
-      <p:nvGrpSpPr>
-        <p:cNvPr id="1" name=""/>
-        <p:cNvGrpSpPr/>
-        <p:nvPr/>
-      </p:nvGrpSpPr>
-      <p:grpSpPr>
-        <a:xfrm>
-          <a:off x="0" y="0"/>
-          <a:ext cx="0" cy="0"/>
-          <a:chOff x="0" y="0"/>
-          <a:chExt cx="0" cy="0"/>
-        </a:xfrm>
-      </p:grpSpPr>
-      <p:sp>
-        <p:nvSpPr>
-          <p:cNvPr id="2" name="Title 1">
-            <a:extLst>
-              <a:ext uri="{FF2B5EF4-FFF2-40B4-BE49-F238E27FC236}">
-                <a16:creationId xmlns:a16="http://schemas.microsoft.com/office/drawing/2014/main" id="{CC4A3FAA-0E02-4277-9A18-5E14BC20FA27}"/>
-              </a:ext>
-            </a:extLst>
-          </p:cNvPr>
-          <p:cNvSpPr>
-            <a:spLocks noGrp="1"/>
-          </p:cNvSpPr>
-          <p:nvPr>
-            <p:ph type="title"/>
-          </p:nvPr>
-        </p:nvSpPr>
-        <p:spPr/>
-        <p:txBody>
-          <a:bodyPr/>
-          <a:lstStyle/>
-          <a:p>
-            <a:r>
-              <a:rPr lang="en-US" dirty="0"/>
-              <a:t>Fast and Slow Buttons</a:t>
-            </a:r>
-          </a:p>
-        </p:txBody>
-      </p:sp>
-      <p:sp>
-        <p:nvSpPr>
-          <p:cNvPr id="3" name="Content Placeholder 2">
-            <a:extLst>
-              <a:ext uri="{FF2B5EF4-FFF2-40B4-BE49-F238E27FC236}">
-                <a16:creationId xmlns:a16="http://schemas.microsoft.com/office/drawing/2014/main" id="{B50147CF-DAA8-4BEB-A969-D6D9FECE042F}"/>
-              </a:ext>
-            </a:extLst>
-          </p:cNvPr>
-          <p:cNvSpPr>
-            <a:spLocks noGrp="1"/>
-          </p:cNvSpPr>
-          <p:nvPr>
-            <p:ph idx="1"/>
-          </p:nvPr>
-        </p:nvSpPr>
-        <p:spPr/>
-        <p:txBody>
-          <a:bodyPr>
-            <a:normAutofit fontScale="85000" lnSpcReduction="10000"/>
-          </a:bodyPr>
-          <a:lstStyle/>
-          <a:p>
-            <a:r>
-              <a:rPr lang="en-US" b="1" dirty="0"/>
-              <a:t>double y = </a:t>
-            </a:r>
-            <a:r>
-              <a:rPr lang="en-US" b="1" dirty="0" err="1"/>
-              <a:t>driveJoystick.getRawAxis</a:t>
-            </a:r>
-            <a:r>
-              <a:rPr lang="en-US" b="1" dirty="0"/>
-              <a:t>(1);   double x = </a:t>
-            </a:r>
-            <a:r>
-              <a:rPr lang="en-US" b="1" dirty="0" err="1"/>
-              <a:t>driveJoystick.getRawAxis</a:t>
-            </a:r>
-            <a:r>
-              <a:rPr lang="en-US" b="1" dirty="0"/>
-              <a:t>(2);</a:t>
-            </a:r>
-          </a:p>
-          <a:p>
-            <a:r>
-              <a:rPr lang="en-US" dirty="0"/>
-              <a:t>x = </a:t>
-            </a:r>
-            <a:r>
-              <a:rPr lang="en-US" dirty="0" err="1"/>
-              <a:t>DriveMath.</a:t>
-            </a:r>
-            <a:r>
-              <a:rPr lang="en-US" i="1" dirty="0" err="1"/>
-              <a:t>DeadBand</a:t>
-            </a:r>
-            <a:r>
-              <a:rPr lang="en-US" i="1" dirty="0"/>
-              <a:t>(x,0.05);    </a:t>
-            </a:r>
-            <a:r>
-              <a:rPr lang="es-ES" dirty="0"/>
-              <a:t>y = </a:t>
-            </a:r>
-            <a:r>
-              <a:rPr lang="es-ES" dirty="0" err="1"/>
-              <a:t>DriveMath.</a:t>
-            </a:r>
-            <a:r>
-              <a:rPr lang="es-ES" i="1" dirty="0" err="1"/>
-              <a:t>DeadBand</a:t>
-            </a:r>
-            <a:r>
-              <a:rPr lang="es-ES" i="1" dirty="0"/>
-              <a:t>(y,0.05);</a:t>
-            </a:r>
-            <a:endParaRPr lang="en-US" dirty="0"/>
-          </a:p>
-          <a:p>
-            <a:r>
-              <a:rPr lang="en-US" b="1" dirty="0"/>
-              <a:t>if (false == </a:t>
-            </a:r>
-            <a:r>
-              <a:rPr lang="en-US" b="1" dirty="0" err="1"/>
-              <a:t>driveJoystick.getRawButton</a:t>
-            </a:r>
-            <a:r>
-              <a:rPr lang="en-US" b="1" dirty="0"/>
-              <a:t>(</a:t>
-            </a:r>
-            <a:r>
-              <a:rPr lang="en-US" b="1" dirty="0" err="1"/>
-              <a:t>Constants.</a:t>
-            </a:r>
-            <a:r>
-              <a:rPr lang="en-US" b="1" i="1" dirty="0" err="1"/>
-              <a:t>kFastButton</a:t>
-            </a:r>
-            <a:r>
-              <a:rPr lang="en-US" b="1" i="1" dirty="0"/>
-              <a:t>)) {</a:t>
-            </a:r>
-          </a:p>
-          <a:p>
-            <a:r>
-              <a:rPr lang="en-US" dirty="0"/>
-              <a:t>      } </a:t>
-            </a:r>
-            <a:r>
-              <a:rPr lang="en-US" b="1" dirty="0"/>
-              <a:t>else {</a:t>
-            </a:r>
-            <a:endParaRPr lang="en-US" dirty="0"/>
-          </a:p>
-          <a:p>
-            <a:r>
-              <a:rPr lang="en-US" dirty="0"/>
-              <a:t>        </a:t>
-            </a:r>
-            <a:r>
-              <a:rPr lang="en-US" b="1" dirty="0"/>
-              <a:t>if (false == </a:t>
-            </a:r>
-            <a:r>
-              <a:rPr lang="en-US" b="1" dirty="0" err="1"/>
-              <a:t>driveJoystick.getRawButton</a:t>
-            </a:r>
-            <a:r>
-              <a:rPr lang="en-US" b="1" dirty="0"/>
-              <a:t>(</a:t>
-            </a:r>
-            <a:r>
-              <a:rPr lang="en-US" b="1" dirty="0" err="1"/>
-              <a:t>Constants.</a:t>
-            </a:r>
-            <a:r>
-              <a:rPr lang="en-US" b="1" i="1" dirty="0" err="1"/>
-              <a:t>kSlowButton</a:t>
-            </a:r>
-            <a:r>
-              <a:rPr lang="en-US" b="1" i="1" dirty="0"/>
-              <a:t>)) {</a:t>
-            </a:r>
-          </a:p>
-          <a:p>
-            <a:r>
-              <a:rPr lang="en-US" dirty="0"/>
-              <a:t>    	y *= </a:t>
-            </a:r>
-            <a:r>
-              <a:rPr lang="en-US" dirty="0" err="1"/>
-              <a:t>Constants.</a:t>
-            </a:r>
-            <a:r>
-              <a:rPr lang="en-US" b="1" i="1" dirty="0" err="1"/>
-              <a:t>kNormalSpeed</a:t>
-            </a:r>
-            <a:r>
-              <a:rPr lang="en-US" b="1" i="1" dirty="0"/>
-              <a:t>; </a:t>
-            </a:r>
-            <a:r>
-              <a:rPr lang="en-US" dirty="0"/>
-              <a:t>x *= </a:t>
-            </a:r>
-            <a:r>
-              <a:rPr lang="en-US" dirty="0" err="1"/>
-              <a:t>Constants.</a:t>
-            </a:r>
-            <a:r>
-              <a:rPr lang="en-US" b="1" i="1" dirty="0" err="1"/>
-              <a:t>kNormalTurnSpeed</a:t>
-            </a:r>
-            <a:r>
-              <a:rPr lang="en-US" b="1" i="1" dirty="0"/>
-              <a:t>;</a:t>
-            </a:r>
-            <a:endParaRPr lang="en-US" dirty="0"/>
-          </a:p>
-          <a:p>
-            <a:r>
-              <a:rPr lang="en-US" dirty="0"/>
-              <a:t>        } </a:t>
-            </a:r>
-            <a:r>
-              <a:rPr lang="en-US" b="1" dirty="0"/>
-              <a:t>else {</a:t>
-            </a:r>
-          </a:p>
-          <a:p>
-            <a:r>
-              <a:rPr lang="en-US" dirty="0"/>
-              <a:t>        y *= </a:t>
-            </a:r>
-            <a:r>
-              <a:rPr lang="en-US" dirty="0" err="1"/>
-              <a:t>Constants.</a:t>
-            </a:r>
-            <a:r>
-              <a:rPr lang="en-US" b="1" i="1" dirty="0" err="1"/>
-              <a:t>kSlowSpeed</a:t>
-            </a:r>
-            <a:r>
-              <a:rPr lang="en-US" b="1" i="1" dirty="0"/>
-              <a:t>; </a:t>
-            </a:r>
-            <a:r>
-              <a:rPr lang="en-US" dirty="0"/>
-              <a:t>x *= </a:t>
-            </a:r>
-            <a:r>
-              <a:rPr lang="en-US" dirty="0" err="1"/>
-              <a:t>Constants.</a:t>
-            </a:r>
-            <a:r>
-              <a:rPr lang="en-US" b="1" i="1" dirty="0" err="1"/>
-              <a:t>kSlowTurnSpeed</a:t>
-            </a:r>
-            <a:r>
-              <a:rPr lang="en-US" b="1" i="1" dirty="0"/>
-              <a:t>;</a:t>
-            </a:r>
-          </a:p>
-          <a:p>
-            <a:r>
-              <a:rPr lang="en-US" dirty="0"/>
-              <a:t>        }</a:t>
-            </a:r>
-          </a:p>
-          <a:p>
-            <a:r>
-              <a:rPr lang="en-US" dirty="0"/>
-              <a:t>      }</a:t>
-            </a:r>
-            <a:endParaRPr lang="en-US" sz="3000" dirty="0"/>
-          </a:p>
-        </p:txBody>
-      </p:sp>
-      <p:sp>
-        <p:nvSpPr>
-          <p:cNvPr id="5" name="Footer Placeholder 4">
-            <a:extLst>
-              <a:ext uri="{FF2B5EF4-FFF2-40B4-BE49-F238E27FC236}">
-                <a16:creationId xmlns:a16="http://schemas.microsoft.com/office/drawing/2014/main" id="{842D4832-23D1-4065-917B-F6EC5E2733B7}"/>
-              </a:ext>
-            </a:extLst>
-          </p:cNvPr>
-          <p:cNvSpPr>
-            <a:spLocks noGrp="1"/>
-          </p:cNvSpPr>
-          <p:nvPr>
-            <p:ph type="ftr" sz="quarter" idx="11"/>
-          </p:nvPr>
-        </p:nvSpPr>
-        <p:spPr>
-          <a:xfrm>
-            <a:off x="311728" y="6276109"/>
-            <a:ext cx="9081654" cy="374074"/>
-          </a:xfrm>
-        </p:spPr>
-        <p:txBody>
-          <a:bodyPr/>
-          <a:lstStyle/>
-          <a:p>
-            <a:r>
-              <a:rPr lang="en-US" sz="2400" dirty="0">
-                <a:solidFill>
-                  <a:schemeClr val="tx1"/>
-                </a:solidFill>
-              </a:rPr>
-              <a:t>https://github.com/JimWright4089/FIRSTWorkshops</a:t>
-            </a:r>
-          </a:p>
-        </p:txBody>
-      </p:sp>
-    </p:spTree>
-    <p:extLst>
-      <p:ext uri="{BB962C8B-B14F-4D97-AF65-F5344CB8AC3E}">
-        <p14:creationId xmlns:p14="http://schemas.microsoft.com/office/powerpoint/2010/main" val="1531261527"/>
-      </p:ext>
-    </p:extLst>
-  </p:cSld>
-  <p:clrMapOvr>
-    <a:masterClrMapping/>
-  </p:clrMapOvr>
-</p:sld>
-</file>
-
-<file path=ppt/slides/slide14.xml><?xml version="1.0" encoding="utf-8"?>
-<p:sld xmlns:a="http://schemas.openxmlformats.org/drawingml/2006/main" xmlns:r="http://schemas.openxmlformats.org/officeDocument/2006/relationships" xmlns:p="http://schemas.openxmlformats.org/presentationml/2006/main">
-  <p:cSld>
-    <p:spTree>
-      <p:nvGrpSpPr>
-        <p:cNvPr id="1" name=""/>
-        <p:cNvGrpSpPr/>
-        <p:nvPr/>
-      </p:nvGrpSpPr>
-      <p:grpSpPr>
-        <a:xfrm>
-          <a:off x="0" y="0"/>
-          <a:ext cx="0" cy="0"/>
-          <a:chOff x="0" y="0"/>
-          <a:chExt cx="0" cy="0"/>
-        </a:xfrm>
-      </p:grpSpPr>
-      <p:sp>
-        <p:nvSpPr>
-          <p:cNvPr id="2" name="Title 1">
-            <a:extLst>
-              <a:ext uri="{FF2B5EF4-FFF2-40B4-BE49-F238E27FC236}">
-                <a16:creationId xmlns:a16="http://schemas.microsoft.com/office/drawing/2014/main" id="{CC4A3FAA-0E02-4277-9A18-5E14BC20FA27}"/>
-              </a:ext>
-            </a:extLst>
-          </p:cNvPr>
-          <p:cNvSpPr>
-            <a:spLocks noGrp="1"/>
-          </p:cNvSpPr>
-          <p:nvPr>
-            <p:ph type="title"/>
-          </p:nvPr>
-        </p:nvSpPr>
-        <p:spPr/>
-        <p:txBody>
-          <a:bodyPr/>
-          <a:lstStyle/>
-          <a:p>
-            <a:r>
-              <a:rPr lang="en-US" dirty="0"/>
-              <a:t>Add the Gyro / Turning</a:t>
-            </a:r>
-          </a:p>
-        </p:txBody>
-      </p:sp>
-      <p:sp>
-        <p:nvSpPr>
-          <p:cNvPr id="3" name="Content Placeholder 2">
-            <a:extLst>
-              <a:ext uri="{FF2B5EF4-FFF2-40B4-BE49-F238E27FC236}">
-                <a16:creationId xmlns:a16="http://schemas.microsoft.com/office/drawing/2014/main" id="{B50147CF-DAA8-4BEB-A969-D6D9FECE042F}"/>
-              </a:ext>
-            </a:extLst>
-          </p:cNvPr>
-          <p:cNvSpPr>
-            <a:spLocks noGrp="1"/>
-          </p:cNvSpPr>
-          <p:nvPr>
-            <p:ph idx="1"/>
-          </p:nvPr>
-        </p:nvSpPr>
-        <p:spPr/>
-        <p:txBody>
-          <a:bodyPr>
-            <a:normAutofit fontScale="70000" lnSpcReduction="20000"/>
-          </a:bodyPr>
-          <a:lstStyle/>
-          <a:p>
-            <a:r>
-              <a:rPr lang="en-US" sz="3000" dirty="0"/>
-              <a:t>turn = x; speed = y;</a:t>
-            </a:r>
-          </a:p>
-          <a:p>
-            <a:pPr marL="0" indent="0">
-              <a:buNone/>
-            </a:pPr>
-            <a:r>
-              <a:rPr lang="en-US" sz="2800" dirty="0"/>
-              <a:t>	</a:t>
-            </a:r>
-            <a:r>
-              <a:rPr lang="en-US" sz="2800" dirty="0" err="1"/>
-              <a:t>mCurrentAngle</a:t>
-            </a:r>
-            <a:r>
-              <a:rPr lang="en-US" sz="2800" dirty="0"/>
-              <a:t> = </a:t>
-            </a:r>
-            <a:r>
-              <a:rPr lang="en-US" sz="2800" dirty="0" err="1"/>
-              <a:t>angles.firstAngle</a:t>
-            </a:r>
-            <a:r>
-              <a:rPr lang="en-US" sz="3000" dirty="0"/>
-              <a:t>  </a:t>
-            </a:r>
-          </a:p>
-          <a:p>
-            <a:pPr marL="0" indent="0">
-              <a:buNone/>
-            </a:pPr>
-            <a:endParaRPr lang="en-US" sz="3000" dirty="0"/>
-          </a:p>
-          <a:p>
-            <a:r>
-              <a:rPr lang="en-US" sz="3000" dirty="0"/>
-              <a:t>if (</a:t>
-            </a:r>
-            <a:r>
-              <a:rPr lang="en-US" sz="3000" dirty="0" err="1"/>
-              <a:t>Math.abs</a:t>
-            </a:r>
-            <a:r>
-              <a:rPr lang="en-US" sz="3000" dirty="0"/>
-              <a:t>(turn) &gt; 0.2) {</a:t>
-            </a:r>
-          </a:p>
-          <a:p>
-            <a:r>
-              <a:rPr lang="en-US" sz="3000" dirty="0"/>
-              <a:t>        </a:t>
-            </a:r>
-            <a:r>
-              <a:rPr lang="en-US" sz="3000" dirty="0" err="1"/>
-              <a:t>RawDriveRobot</a:t>
-            </a:r>
-            <a:r>
-              <a:rPr lang="en-US" sz="3000" dirty="0"/>
-              <a:t>(speed*.5, turn*.5);</a:t>
-            </a:r>
-          </a:p>
-          <a:p>
-            <a:r>
-              <a:rPr lang="en-US" sz="3000" dirty="0"/>
-              <a:t>        </a:t>
-            </a:r>
-            <a:r>
-              <a:rPr lang="en-US" sz="3000" dirty="0" err="1"/>
-              <a:t>mTargetAngle</a:t>
-            </a:r>
-            <a:r>
-              <a:rPr lang="en-US" sz="3000" dirty="0"/>
-              <a:t> = </a:t>
-            </a:r>
-            <a:r>
-              <a:rPr lang="en-US" sz="3000" dirty="0" err="1"/>
-              <a:t>mCurrentAngle</a:t>
-            </a:r>
-            <a:r>
-              <a:rPr lang="en-US" sz="3000" dirty="0"/>
-              <a:t>;</a:t>
-            </a:r>
-          </a:p>
-          <a:p>
-            <a:r>
-              <a:rPr lang="en-US" sz="3000" dirty="0"/>
-              <a:t>      } else {</a:t>
-            </a:r>
-          </a:p>
-          <a:p>
-            <a:r>
-              <a:rPr lang="en-US" sz="3000" dirty="0"/>
-              <a:t>        * Next page *</a:t>
-            </a:r>
-          </a:p>
-          <a:p>
-            <a:r>
-              <a:rPr lang="en-US" sz="3000" dirty="0"/>
-              <a:t>      }</a:t>
-            </a:r>
-          </a:p>
-        </p:txBody>
-      </p:sp>
-      <p:sp>
-        <p:nvSpPr>
-          <p:cNvPr id="5" name="Footer Placeholder 4">
-            <a:extLst>
-              <a:ext uri="{FF2B5EF4-FFF2-40B4-BE49-F238E27FC236}">
-                <a16:creationId xmlns:a16="http://schemas.microsoft.com/office/drawing/2014/main" id="{371C134C-9F7D-4F5D-893E-14C6DB1B17A3}"/>
-              </a:ext>
-            </a:extLst>
-          </p:cNvPr>
-          <p:cNvSpPr>
-            <a:spLocks noGrp="1"/>
-          </p:cNvSpPr>
-          <p:nvPr>
-            <p:ph type="ftr" sz="quarter" idx="11"/>
-          </p:nvPr>
-        </p:nvSpPr>
-        <p:spPr>
-          <a:xfrm>
-            <a:off x="353291" y="6303818"/>
-            <a:ext cx="9081654" cy="374074"/>
-          </a:xfrm>
-        </p:spPr>
-        <p:txBody>
-          <a:bodyPr/>
-          <a:lstStyle/>
-          <a:p>
-            <a:r>
-              <a:rPr lang="en-US" sz="2400" dirty="0">
-                <a:solidFill>
-                  <a:schemeClr val="tx1"/>
-                </a:solidFill>
-              </a:rPr>
-              <a:t>https://github.com/JimWright4089/FIRSTWorkshops</a:t>
-            </a:r>
-          </a:p>
-        </p:txBody>
-      </p:sp>
-    </p:spTree>
-    <p:extLst>
-      <p:ext uri="{BB962C8B-B14F-4D97-AF65-F5344CB8AC3E}">
-        <p14:creationId xmlns:p14="http://schemas.microsoft.com/office/powerpoint/2010/main" val="2549125896"/>
-      </p:ext>
-    </p:extLst>
-  </p:cSld>
-  <p:clrMapOvr>
-    <a:masterClrMapping/>
-  </p:clrMapOvr>
-</p:sld>
-</file>
-
-<file path=ppt/slides/slide15.xml><?xml version="1.0" encoding="utf-8"?>
-<p:sld xmlns:a="http://schemas.openxmlformats.org/drawingml/2006/main" xmlns:r="http://schemas.openxmlformats.org/officeDocument/2006/relationships" xmlns:p="http://schemas.openxmlformats.org/presentationml/2006/main">
-  <p:cSld>
-    <p:spTree>
-      <p:nvGrpSpPr>
-        <p:cNvPr id="1" name=""/>
-        <p:cNvGrpSpPr/>
-        <p:nvPr/>
-      </p:nvGrpSpPr>
-      <p:grpSpPr>
-        <a:xfrm>
-          <a:off x="0" y="0"/>
-          <a:ext cx="0" cy="0"/>
-          <a:chOff x="0" y="0"/>
-          <a:chExt cx="0" cy="0"/>
-        </a:xfrm>
-      </p:grpSpPr>
-      <p:sp>
-        <p:nvSpPr>
-          <p:cNvPr id="2" name="Title 1">
-            <a:extLst>
-              <a:ext uri="{FF2B5EF4-FFF2-40B4-BE49-F238E27FC236}">
-                <a16:creationId xmlns:a16="http://schemas.microsoft.com/office/drawing/2014/main" id="{CC4A3FAA-0E02-4277-9A18-5E14BC20FA27}"/>
-              </a:ext>
-            </a:extLst>
-          </p:cNvPr>
-          <p:cNvSpPr>
-            <a:spLocks noGrp="1"/>
-          </p:cNvSpPr>
-          <p:nvPr>
-            <p:ph type="title"/>
-          </p:nvPr>
-        </p:nvSpPr>
-        <p:spPr/>
-        <p:txBody>
-          <a:bodyPr/>
-          <a:lstStyle/>
-          <a:p>
-            <a:r>
-              <a:rPr lang="en-US" dirty="0"/>
-              <a:t>Straight and stop</a:t>
-            </a:r>
-          </a:p>
-        </p:txBody>
-      </p:sp>
-      <p:sp>
-        <p:nvSpPr>
-          <p:cNvPr id="3" name="Content Placeholder 2">
-            <a:extLst>
-              <a:ext uri="{FF2B5EF4-FFF2-40B4-BE49-F238E27FC236}">
-                <a16:creationId xmlns:a16="http://schemas.microsoft.com/office/drawing/2014/main" id="{B50147CF-DAA8-4BEB-A969-D6D9FECE042F}"/>
-              </a:ext>
-            </a:extLst>
-          </p:cNvPr>
-          <p:cNvSpPr>
-            <a:spLocks noGrp="1"/>
-          </p:cNvSpPr>
-          <p:nvPr>
-            <p:ph idx="1"/>
-          </p:nvPr>
-        </p:nvSpPr>
-        <p:spPr/>
-        <p:txBody>
-          <a:bodyPr>
-            <a:normAutofit fontScale="85000" lnSpcReduction="20000"/>
-          </a:bodyPr>
-          <a:lstStyle/>
-          <a:p>
-            <a:r>
-              <a:rPr lang="en-US" b="1" dirty="0"/>
-              <a:t>if (</a:t>
-            </a:r>
-            <a:r>
-              <a:rPr lang="en-US" b="1" dirty="0" err="1"/>
-              <a:t>Math.</a:t>
-            </a:r>
-            <a:r>
-              <a:rPr lang="en-US" b="1" i="1" dirty="0" err="1"/>
-              <a:t>abs</a:t>
-            </a:r>
-            <a:r>
-              <a:rPr lang="en-US" b="1" i="1" dirty="0"/>
-              <a:t>(speed) &gt; 0.1) {</a:t>
-            </a:r>
-          </a:p>
-          <a:p>
-            <a:r>
-              <a:rPr lang="en-US" dirty="0"/>
-              <a:t>          </a:t>
-            </a:r>
-            <a:r>
-              <a:rPr lang="en-US" b="1" dirty="0"/>
-              <a:t>double </a:t>
-            </a:r>
-            <a:r>
-              <a:rPr lang="en-US" b="1" dirty="0" err="1"/>
-              <a:t>angleError</a:t>
-            </a:r>
-            <a:r>
-              <a:rPr lang="en-US" b="1" dirty="0"/>
-              <a:t> = (</a:t>
-            </a:r>
-            <a:r>
-              <a:rPr lang="en-US" b="1" dirty="0" err="1"/>
-              <a:t>mTargetAngle</a:t>
-            </a:r>
-            <a:r>
-              <a:rPr lang="en-US" b="1" dirty="0"/>
-              <a:t> - </a:t>
-            </a:r>
-            <a:r>
-              <a:rPr lang="en-US" b="1" dirty="0" err="1"/>
-              <a:t>mCurrentAngle</a:t>
-            </a:r>
-            <a:r>
-              <a:rPr lang="en-US" b="1" dirty="0"/>
-              <a:t>);</a:t>
-            </a:r>
-          </a:p>
-          <a:p>
-            <a:r>
-              <a:rPr lang="en-US" dirty="0"/>
-              <a:t>          </a:t>
-            </a:r>
-            <a:r>
-              <a:rPr lang="en-US" dirty="0" err="1"/>
-              <a:t>turnThrottle</a:t>
-            </a:r>
-            <a:r>
-              <a:rPr lang="en-US" dirty="0"/>
-              <a:t> = </a:t>
-            </a:r>
-            <a:r>
-              <a:rPr lang="en-US" dirty="0" err="1"/>
-              <a:t>angleError</a:t>
-            </a:r>
-            <a:r>
-              <a:rPr lang="en-US" dirty="0"/>
-              <a:t> * </a:t>
-            </a:r>
-            <a:r>
-              <a:rPr lang="en-US" b="1" i="1" dirty="0" err="1"/>
-              <a:t>kPgain</a:t>
-            </a:r>
-            <a:r>
-              <a:rPr lang="en-US" b="1" i="1" dirty="0"/>
-              <a:t> - (</a:t>
-            </a:r>
-            <a:r>
-              <a:rPr lang="en-US" b="1" i="1" dirty="0" err="1"/>
-              <a:t>currentAngularRate</a:t>
-            </a:r>
-            <a:r>
-              <a:rPr lang="en-US" b="1" i="1" dirty="0"/>
-              <a:t>) * </a:t>
-            </a:r>
-            <a:r>
-              <a:rPr lang="en-US" b="1" i="1" dirty="0" err="1"/>
-              <a:t>kDgain</a:t>
-            </a:r>
-            <a:r>
-              <a:rPr lang="en-US" b="1" i="1" dirty="0"/>
-              <a:t>;</a:t>
-            </a:r>
-          </a:p>
-          <a:p>
-            <a:r>
-              <a:rPr lang="en-US" dirty="0"/>
-              <a:t>          </a:t>
-            </a:r>
-            <a:r>
-              <a:rPr lang="en-US" b="1" dirty="0"/>
-              <a:t>double </a:t>
-            </a:r>
-            <a:r>
-              <a:rPr lang="en-US" b="1" dirty="0" err="1"/>
-              <a:t>maxThrot</a:t>
-            </a:r>
-            <a:r>
-              <a:rPr lang="en-US" b="1" dirty="0"/>
-              <a:t> = </a:t>
-            </a:r>
-            <a:r>
-              <a:rPr lang="en-US" b="1" dirty="0" err="1"/>
-              <a:t>DriveMath.</a:t>
-            </a:r>
-            <a:r>
-              <a:rPr lang="en-US" b="1" i="1" dirty="0" err="1"/>
-              <a:t>MaxCorrection</a:t>
-            </a:r>
-            <a:r>
-              <a:rPr lang="en-US" b="1" i="1" dirty="0"/>
-              <a:t>(speed, </a:t>
-            </a:r>
-            <a:r>
-              <a:rPr lang="en-US" b="1" i="1" dirty="0" err="1"/>
-              <a:t>kMaxCorrectionRatio</a:t>
-            </a:r>
-            <a:r>
-              <a:rPr lang="en-US" b="1" i="1" dirty="0"/>
-              <a:t>);</a:t>
-            </a:r>
-          </a:p>
-          <a:p>
-            <a:r>
-              <a:rPr lang="en-US" dirty="0"/>
-              <a:t>          </a:t>
-            </a:r>
-            <a:r>
-              <a:rPr lang="en-US" dirty="0" err="1"/>
-              <a:t>turnThrottle</a:t>
-            </a:r>
-            <a:r>
-              <a:rPr lang="en-US" dirty="0"/>
-              <a:t> =  -1*</a:t>
-            </a:r>
-            <a:r>
-              <a:rPr lang="en-US" dirty="0" err="1"/>
-              <a:t>DriveMath.</a:t>
-            </a:r>
-            <a:r>
-              <a:rPr lang="en-US" i="1" dirty="0" err="1"/>
-              <a:t>Cap</a:t>
-            </a:r>
-            <a:r>
-              <a:rPr lang="en-US" i="1" dirty="0"/>
-              <a:t>(</a:t>
-            </a:r>
-            <a:r>
-              <a:rPr lang="en-US" i="1" dirty="0" err="1"/>
-              <a:t>turnThrottle</a:t>
-            </a:r>
-            <a:r>
-              <a:rPr lang="en-US" i="1" dirty="0"/>
-              <a:t>, </a:t>
-            </a:r>
-            <a:r>
-              <a:rPr lang="en-US" i="1" dirty="0" err="1"/>
-              <a:t>maxThrot</a:t>
-            </a:r>
-            <a:r>
-              <a:rPr lang="en-US" i="1" dirty="0"/>
-              <a:t>);</a:t>
-            </a:r>
-          </a:p>
-          <a:p>
-            <a:r>
-              <a:rPr lang="en-US" dirty="0"/>
-              <a:t>          </a:t>
-            </a:r>
-            <a:r>
-              <a:rPr lang="en-US" dirty="0" err="1"/>
-              <a:t>RawDriveRobot</a:t>
-            </a:r>
-            <a:r>
-              <a:rPr lang="en-US" dirty="0"/>
-              <a:t>(</a:t>
-            </a:r>
-            <a:r>
-              <a:rPr lang="en-US" dirty="0" err="1"/>
-              <a:t>speed,turnThrottle</a:t>
-            </a:r>
-            <a:r>
-              <a:rPr lang="en-US" dirty="0"/>
-              <a:t>);</a:t>
-            </a:r>
-          </a:p>
-          <a:p>
-            <a:r>
-              <a:rPr lang="en-US" dirty="0"/>
-              <a:t>        }</a:t>
-            </a:r>
-          </a:p>
-          <a:p>
-            <a:r>
-              <a:rPr lang="en-US" dirty="0"/>
-              <a:t>        </a:t>
-            </a:r>
-            <a:r>
-              <a:rPr lang="en-US" b="1" dirty="0"/>
-              <a:t>else</a:t>
-            </a:r>
-          </a:p>
-          <a:p>
-            <a:r>
-              <a:rPr lang="en-US" dirty="0"/>
-              <a:t>        {</a:t>
-            </a:r>
-          </a:p>
-          <a:p>
-            <a:r>
-              <a:rPr lang="en-US" dirty="0"/>
-              <a:t>          </a:t>
-            </a:r>
-            <a:r>
-              <a:rPr lang="en-US" dirty="0" err="1"/>
-              <a:t>RawDriveRobot</a:t>
-            </a:r>
-            <a:r>
-              <a:rPr lang="en-US" dirty="0"/>
-              <a:t>(0, 0); </a:t>
-            </a:r>
-            <a:r>
-              <a:rPr lang="en-US" dirty="0" err="1"/>
-              <a:t>mTargetAngle</a:t>
-            </a:r>
-            <a:r>
-              <a:rPr lang="en-US" dirty="0"/>
-              <a:t> = </a:t>
-            </a:r>
-            <a:r>
-              <a:rPr lang="en-US" dirty="0" err="1"/>
-              <a:t>mCurrentAngle</a:t>
-            </a:r>
-            <a:r>
-              <a:rPr lang="en-US" dirty="0"/>
-              <a:t>;</a:t>
-            </a:r>
-          </a:p>
-          <a:p>
-            <a:r>
-              <a:rPr lang="en-US" dirty="0"/>
-              <a:t>        }</a:t>
-            </a:r>
-            <a:endParaRPr lang="en-US" sz="3000" dirty="0"/>
-          </a:p>
-        </p:txBody>
-      </p:sp>
-      <p:sp>
-        <p:nvSpPr>
-          <p:cNvPr id="5" name="Footer Placeholder 4">
-            <a:extLst>
-              <a:ext uri="{FF2B5EF4-FFF2-40B4-BE49-F238E27FC236}">
-                <a16:creationId xmlns:a16="http://schemas.microsoft.com/office/drawing/2014/main" id="{371C134C-9F7D-4F5D-893E-14C6DB1B17A3}"/>
-              </a:ext>
-            </a:extLst>
-          </p:cNvPr>
-          <p:cNvSpPr>
-            <a:spLocks noGrp="1"/>
-          </p:cNvSpPr>
-          <p:nvPr>
-            <p:ph type="ftr" sz="quarter" idx="11"/>
-          </p:nvPr>
-        </p:nvSpPr>
-        <p:spPr>
-          <a:xfrm>
-            <a:off x="353291" y="6303818"/>
-            <a:ext cx="9081654" cy="374074"/>
-          </a:xfrm>
-        </p:spPr>
-        <p:txBody>
-          <a:bodyPr/>
-          <a:lstStyle/>
-          <a:p>
-            <a:r>
-              <a:rPr lang="en-US" sz="2400" dirty="0">
-                <a:solidFill>
-                  <a:schemeClr val="tx1"/>
-                </a:solidFill>
-              </a:rPr>
-              <a:t>https://github.com/JimWright4089/FIRSTWorkshops</a:t>
-            </a:r>
-          </a:p>
-        </p:txBody>
-      </p:sp>
-    </p:spTree>
-    <p:extLst>
-      <p:ext uri="{BB962C8B-B14F-4D97-AF65-F5344CB8AC3E}">
-        <p14:creationId xmlns:p14="http://schemas.microsoft.com/office/powerpoint/2010/main" val="2513975796"/>
-      </p:ext>
-    </p:extLst>
-  </p:cSld>
-  <p:clrMapOvr>
-    <a:masterClrMapping/>
-  </p:clrMapOvr>
-</p:sld>
-</file>
-
-<file path=ppt/slides/slide16.xml><?xml version="1.0" encoding="utf-8"?>
-<p:sld xmlns:a="http://schemas.openxmlformats.org/drawingml/2006/main" xmlns:r="http://schemas.openxmlformats.org/officeDocument/2006/relationships" xmlns:p="http://schemas.openxmlformats.org/presentationml/2006/main">
-  <p:cSld>
-    <p:spTree>
-      <p:nvGrpSpPr>
-        <p:cNvPr id="1" name=""/>
-        <p:cNvGrpSpPr/>
-        <p:nvPr/>
-      </p:nvGrpSpPr>
-      <p:grpSpPr>
-        <a:xfrm>
-          <a:off x="0" y="0"/>
-          <a:ext cx="0" cy="0"/>
-          <a:chOff x="0" y="0"/>
-          <a:chExt cx="0" cy="0"/>
-        </a:xfrm>
-      </p:grpSpPr>
-      <p:sp>
-        <p:nvSpPr>
-          <p:cNvPr id="2" name="Title 1">
-            <a:extLst>
-              <a:ext uri="{FF2B5EF4-FFF2-40B4-BE49-F238E27FC236}">
-                <a16:creationId xmlns:a16="http://schemas.microsoft.com/office/drawing/2014/main" id="{CC4A3FAA-0E02-4277-9A18-5E14BC20FA27}"/>
-              </a:ext>
-            </a:extLst>
-          </p:cNvPr>
-          <p:cNvSpPr>
-            <a:spLocks noGrp="1"/>
-          </p:cNvSpPr>
-          <p:nvPr>
-            <p:ph type="title"/>
-          </p:nvPr>
-        </p:nvSpPr>
-        <p:spPr/>
-        <p:txBody>
-          <a:bodyPr/>
-          <a:lstStyle/>
-          <a:p>
-            <a:r>
-              <a:rPr lang="en-US" dirty="0"/>
-              <a:t>Raw Drive the Robot</a:t>
-            </a:r>
-          </a:p>
-        </p:txBody>
-      </p:sp>
-      <p:sp>
-        <p:nvSpPr>
-          <p:cNvPr id="3" name="Content Placeholder 2">
-            <a:extLst>
-              <a:ext uri="{FF2B5EF4-FFF2-40B4-BE49-F238E27FC236}">
-                <a16:creationId xmlns:a16="http://schemas.microsoft.com/office/drawing/2014/main" id="{B50147CF-DAA8-4BEB-A969-D6D9FECE042F}"/>
-              </a:ext>
-            </a:extLst>
-          </p:cNvPr>
-          <p:cNvSpPr>
-            <a:spLocks noGrp="1"/>
-          </p:cNvSpPr>
-          <p:nvPr>
-            <p:ph idx="1"/>
-          </p:nvPr>
-        </p:nvSpPr>
-        <p:spPr/>
-        <p:txBody>
-          <a:bodyPr>
-            <a:normAutofit fontScale="92500" lnSpcReduction="20000"/>
-          </a:bodyPr>
-          <a:lstStyle/>
-          <a:p>
-            <a:r>
-              <a:rPr lang="en-US" b="1" dirty="0"/>
-              <a:t>if(</a:t>
-            </a:r>
-            <a:r>
-              <a:rPr lang="en-US" b="1" dirty="0" err="1"/>
-              <a:t>mActualSpeed</a:t>
-            </a:r>
-            <a:r>
-              <a:rPr lang="en-US" b="1" dirty="0"/>
-              <a:t> != speed)</a:t>
-            </a:r>
-            <a:r>
-              <a:rPr lang="en-US" dirty="0"/>
-              <a:t>      {</a:t>
-            </a:r>
-          </a:p>
-          <a:p>
-            <a:r>
-              <a:rPr lang="en-US" dirty="0"/>
-              <a:t>        </a:t>
-            </a:r>
-            <a:r>
-              <a:rPr lang="en-US" b="1" dirty="0"/>
-              <a:t>if(</a:t>
-            </a:r>
-            <a:r>
-              <a:rPr lang="en-US" b="1" dirty="0" err="1"/>
-              <a:t>mActualSpeed</a:t>
-            </a:r>
-            <a:r>
-              <a:rPr lang="en-US" b="1" dirty="0"/>
-              <a:t>&lt;speed) </a:t>
-            </a:r>
-            <a:r>
-              <a:rPr lang="en-US" dirty="0"/>
-              <a:t>        {</a:t>
-            </a:r>
-          </a:p>
-          <a:p>
-            <a:r>
-              <a:rPr lang="en-US" dirty="0"/>
-              <a:t>          </a:t>
-            </a:r>
-            <a:r>
-              <a:rPr lang="en-US" dirty="0" err="1"/>
-              <a:t>mActualSpeed</a:t>
-            </a:r>
-            <a:r>
-              <a:rPr lang="en-US" dirty="0"/>
-              <a:t> = </a:t>
-            </a:r>
-            <a:r>
-              <a:rPr lang="en-US" dirty="0" err="1"/>
-              <a:t>Math.</a:t>
-            </a:r>
-            <a:r>
-              <a:rPr lang="en-US" i="1" dirty="0" err="1"/>
-              <a:t>min</a:t>
-            </a:r>
-            <a:r>
-              <a:rPr lang="en-US" i="1" dirty="0"/>
-              <a:t>(</a:t>
-            </a:r>
-            <a:r>
-              <a:rPr lang="en-US" i="1" dirty="0" err="1"/>
-              <a:t>mActualSpeed+</a:t>
-            </a:r>
-            <a:r>
-              <a:rPr lang="en-US" b="1" i="1" dirty="0" err="1"/>
-              <a:t>kSpeedGain</a:t>
-            </a:r>
-            <a:r>
-              <a:rPr lang="en-US" b="1" i="1" dirty="0"/>
-              <a:t>, speed);</a:t>
-            </a:r>
-          </a:p>
-          <a:p>
-            <a:r>
-              <a:rPr lang="en-US" dirty="0"/>
-              <a:t>        }</a:t>
-            </a:r>
-          </a:p>
-          <a:p>
-            <a:r>
-              <a:rPr lang="en-US" dirty="0"/>
-              <a:t>        </a:t>
-            </a:r>
-            <a:r>
-              <a:rPr lang="en-US" b="1" dirty="0"/>
-              <a:t>else </a:t>
-            </a:r>
-            <a:r>
-              <a:rPr lang="en-US" dirty="0"/>
-              <a:t>{</a:t>
-            </a:r>
-          </a:p>
-          <a:p>
-            <a:r>
-              <a:rPr lang="en-US" dirty="0"/>
-              <a:t>          </a:t>
-            </a:r>
-            <a:r>
-              <a:rPr lang="en-US" dirty="0" err="1"/>
-              <a:t>mActualSpeed</a:t>
-            </a:r>
-            <a:r>
-              <a:rPr lang="en-US" dirty="0"/>
-              <a:t> = </a:t>
-            </a:r>
-            <a:r>
-              <a:rPr lang="en-US" dirty="0" err="1"/>
-              <a:t>Math.</a:t>
-            </a:r>
-            <a:r>
-              <a:rPr lang="en-US" i="1" dirty="0" err="1"/>
-              <a:t>max</a:t>
-            </a:r>
-            <a:r>
-              <a:rPr lang="en-US" i="1" dirty="0"/>
-              <a:t>(</a:t>
-            </a:r>
-            <a:r>
-              <a:rPr lang="en-US" i="1" dirty="0" err="1"/>
-              <a:t>mActualSpeed-</a:t>
-            </a:r>
-            <a:r>
-              <a:rPr lang="en-US" b="1" i="1" dirty="0" err="1"/>
-              <a:t>kSpeedGain</a:t>
-            </a:r>
-            <a:r>
-              <a:rPr lang="en-US" b="1" i="1" dirty="0"/>
-              <a:t>, speed);</a:t>
-            </a:r>
-          </a:p>
-          <a:p>
-            <a:r>
-              <a:rPr lang="en-US" dirty="0"/>
-              <a:t>        } }</a:t>
-            </a:r>
-          </a:p>
-          <a:p>
-            <a:r>
-              <a:rPr lang="en-US" b="1" dirty="0"/>
-              <a:t>      double </a:t>
-            </a:r>
-            <a:r>
-              <a:rPr lang="en-US" b="1" dirty="0" err="1"/>
-              <a:t>targetSpeedL</a:t>
-            </a:r>
-            <a:r>
-              <a:rPr lang="en-US" b="1" dirty="0"/>
-              <a:t> = (</a:t>
-            </a:r>
-            <a:r>
-              <a:rPr lang="en-US" b="1" dirty="0" err="1"/>
-              <a:t>mActualSpeed</a:t>
-            </a:r>
-            <a:r>
-              <a:rPr lang="en-US" b="1" dirty="0"/>
-              <a:t> + turn); </a:t>
-            </a:r>
-          </a:p>
-          <a:p>
-            <a:r>
-              <a:rPr lang="en-US" b="1" dirty="0"/>
-              <a:t>      double </a:t>
-            </a:r>
-            <a:r>
-              <a:rPr lang="en-US" b="1" dirty="0" err="1"/>
-              <a:t>targetSpeedR</a:t>
-            </a:r>
-            <a:r>
-              <a:rPr lang="en-US" b="1" dirty="0"/>
-              <a:t> = (</a:t>
-            </a:r>
-            <a:r>
-              <a:rPr lang="en-US" b="1" dirty="0" err="1"/>
-              <a:t>mActualSpeed</a:t>
-            </a:r>
-            <a:r>
-              <a:rPr lang="en-US" b="1" dirty="0"/>
-              <a:t> - turn);</a:t>
-            </a:r>
-          </a:p>
-          <a:p>
-            <a:r>
-              <a:rPr lang="en-US" dirty="0"/>
-              <a:t>      </a:t>
-            </a:r>
-            <a:r>
-              <a:rPr lang="en-US" i="1" dirty="0" err="1"/>
-              <a:t>DriveLF.set</a:t>
-            </a:r>
-            <a:r>
-              <a:rPr lang="en-US" i="1" dirty="0"/>
-              <a:t>(</a:t>
-            </a:r>
-            <a:r>
-              <a:rPr lang="en-US" b="1" i="1" dirty="0" err="1"/>
-              <a:t>targetSpeedL</a:t>
-            </a:r>
-            <a:r>
-              <a:rPr lang="en-US" b="1" i="1" dirty="0"/>
-              <a:t>); </a:t>
-            </a:r>
-            <a:r>
-              <a:rPr lang="en-US" i="1" dirty="0" err="1"/>
-              <a:t>DriveRF.set</a:t>
-            </a:r>
-            <a:r>
-              <a:rPr lang="en-US" i="1" dirty="0"/>
-              <a:t>(</a:t>
-            </a:r>
-            <a:r>
-              <a:rPr lang="en-US" b="1" i="1" dirty="0" err="1"/>
-              <a:t>targetSpeedR</a:t>
-            </a:r>
-            <a:r>
-              <a:rPr lang="en-US" b="1" i="1" dirty="0"/>
-              <a:t>);</a:t>
-            </a:r>
-            <a:endParaRPr lang="en-US" sz="3000" dirty="0"/>
-          </a:p>
-        </p:txBody>
-      </p:sp>
-      <p:sp>
-        <p:nvSpPr>
-          <p:cNvPr id="5" name="Footer Placeholder 4">
-            <a:extLst>
-              <a:ext uri="{FF2B5EF4-FFF2-40B4-BE49-F238E27FC236}">
-                <a16:creationId xmlns:a16="http://schemas.microsoft.com/office/drawing/2014/main" id="{371C134C-9F7D-4F5D-893E-14C6DB1B17A3}"/>
-              </a:ext>
-            </a:extLst>
-          </p:cNvPr>
-          <p:cNvSpPr>
-            <a:spLocks noGrp="1"/>
-          </p:cNvSpPr>
-          <p:nvPr>
-            <p:ph type="ftr" sz="quarter" idx="11"/>
-          </p:nvPr>
-        </p:nvSpPr>
-        <p:spPr>
-          <a:xfrm>
-            <a:off x="353291" y="6303818"/>
-            <a:ext cx="9081654" cy="374074"/>
-          </a:xfrm>
-        </p:spPr>
-        <p:txBody>
-          <a:bodyPr/>
-          <a:lstStyle/>
-          <a:p>
-            <a:r>
-              <a:rPr lang="en-US" sz="2400" dirty="0">
-                <a:solidFill>
-                  <a:schemeClr val="tx1"/>
-                </a:solidFill>
-              </a:rPr>
-              <a:t>https://github.com/JimWright4089/FIRSTWorkshops</a:t>
-            </a:r>
-          </a:p>
-        </p:txBody>
-      </p:sp>
-    </p:spTree>
-    <p:extLst>
-      <p:ext uri="{BB962C8B-B14F-4D97-AF65-F5344CB8AC3E}">
-        <p14:creationId xmlns:p14="http://schemas.microsoft.com/office/powerpoint/2010/main" val="2410304837"/>
-      </p:ext>
-    </p:extLst>
-  </p:cSld>
-  <p:clrMapOvr>
-    <a:masterClrMapping/>
-  </p:clrMapOvr>
-</p:sld>
-</file>
-
-<file path=ppt/slides/slide17.xml><?xml version="1.0" encoding="utf-8"?>
-<p:sld xmlns:a="http://schemas.openxmlformats.org/drawingml/2006/main" xmlns:r="http://schemas.openxmlformats.org/officeDocument/2006/relationships" xmlns:p="http://schemas.openxmlformats.org/presentationml/2006/main">
-  <p:cSld>
-    <p:spTree>
-      <p:nvGrpSpPr>
-        <p:cNvPr id="1" name=""/>
-        <p:cNvGrpSpPr/>
-        <p:nvPr/>
-      </p:nvGrpSpPr>
-      <p:grpSpPr>
-        <a:xfrm>
-          <a:off x="0" y="0"/>
-          <a:ext cx="0" cy="0"/>
-          <a:chOff x="0" y="0"/>
-          <a:chExt cx="0" cy="0"/>
-        </a:xfrm>
-      </p:grpSpPr>
-      <p:sp>
-        <p:nvSpPr>
-          <p:cNvPr id="2" name="Title 1">
-            <a:extLst>
-              <a:ext uri="{FF2B5EF4-FFF2-40B4-BE49-F238E27FC236}">
-                <a16:creationId xmlns:a16="http://schemas.microsoft.com/office/drawing/2014/main" id="{CC4A3FAA-0E02-4277-9A18-5E14BC20FA27}"/>
-              </a:ext>
-            </a:extLst>
-          </p:cNvPr>
-          <p:cNvSpPr>
-            <a:spLocks noGrp="1"/>
-          </p:cNvSpPr>
-          <p:nvPr>
-            <p:ph type="title"/>
-          </p:nvPr>
-        </p:nvSpPr>
-        <p:spPr/>
-        <p:txBody>
-          <a:bodyPr/>
-          <a:lstStyle/>
-          <a:p>
-            <a:r>
-              <a:rPr lang="en-US" dirty="0" err="1"/>
-              <a:t>Jaci’s</a:t>
-            </a:r>
-            <a:r>
-              <a:rPr lang="en-US" dirty="0"/>
-              <a:t> Pathfinding</a:t>
-            </a:r>
-          </a:p>
-        </p:txBody>
-      </p:sp>
-      <p:sp>
-        <p:nvSpPr>
-          <p:cNvPr id="3" name="Content Placeholder 2">
-            <a:extLst>
-              <a:ext uri="{FF2B5EF4-FFF2-40B4-BE49-F238E27FC236}">
-                <a16:creationId xmlns:a16="http://schemas.microsoft.com/office/drawing/2014/main" id="{B50147CF-DAA8-4BEB-A969-D6D9FECE042F}"/>
-              </a:ext>
-            </a:extLst>
-          </p:cNvPr>
-          <p:cNvSpPr>
-            <a:spLocks noGrp="1"/>
-          </p:cNvSpPr>
-          <p:nvPr>
-            <p:ph idx="1"/>
-          </p:nvPr>
-        </p:nvSpPr>
-        <p:spPr/>
-        <p:txBody>
-          <a:bodyPr>
-            <a:normAutofit/>
-          </a:bodyPr>
-          <a:lstStyle/>
-          <a:p>
-            <a:r>
-              <a:rPr lang="en-US" sz="3000" dirty="0"/>
-              <a:t>The most </a:t>
-            </a:r>
-            <a:r>
-              <a:rPr lang="en-US" sz="3000" dirty="0" err="1"/>
-              <a:t>populare</a:t>
-            </a:r>
-            <a:r>
-              <a:rPr lang="en-US" sz="3000" dirty="0"/>
-              <a:t> pathfinding in FRC.</a:t>
-            </a:r>
-          </a:p>
-          <a:p>
-            <a:r>
-              <a:rPr lang="en-US" sz="3000" dirty="0" err="1"/>
-              <a:t>Jaci</a:t>
-            </a:r>
-            <a:r>
-              <a:rPr lang="en-US" sz="3000" dirty="0"/>
-              <a:t> is on </a:t>
-            </a:r>
-            <a:r>
-              <a:rPr lang="en-US" sz="3000" dirty="0" err="1"/>
-              <a:t>Chiefdelphi’s</a:t>
-            </a:r>
-            <a:r>
-              <a:rPr lang="en-US" sz="3000" dirty="0"/>
-              <a:t> board all the time.</a:t>
-            </a:r>
-          </a:p>
-          <a:p>
-            <a:r>
-              <a:rPr lang="en-US" sz="3000" dirty="0"/>
-              <a:t>She loves fixing and making it better.</a:t>
-            </a:r>
-          </a:p>
-          <a:p>
-            <a:r>
-              <a:rPr lang="en-US" sz="3000" dirty="0"/>
-              <a:t>It may take a lot of work to get it running the way you want.</a:t>
-            </a:r>
-          </a:p>
-        </p:txBody>
-      </p:sp>
-      <p:sp>
-        <p:nvSpPr>
-          <p:cNvPr id="5" name="Footer Placeholder 4">
-            <a:extLst>
-              <a:ext uri="{FF2B5EF4-FFF2-40B4-BE49-F238E27FC236}">
-                <a16:creationId xmlns:a16="http://schemas.microsoft.com/office/drawing/2014/main" id="{371C134C-9F7D-4F5D-893E-14C6DB1B17A3}"/>
-              </a:ext>
-            </a:extLst>
-          </p:cNvPr>
-          <p:cNvSpPr>
-            <a:spLocks noGrp="1"/>
-          </p:cNvSpPr>
-          <p:nvPr>
-            <p:ph type="ftr" sz="quarter" idx="11"/>
-          </p:nvPr>
-        </p:nvSpPr>
-        <p:spPr>
-          <a:xfrm>
-            <a:off x="353291" y="6303818"/>
-            <a:ext cx="9081654" cy="374074"/>
-          </a:xfrm>
-        </p:spPr>
-        <p:txBody>
-          <a:bodyPr/>
-          <a:lstStyle/>
-          <a:p>
-            <a:r>
-              <a:rPr lang="en-US" sz="2400" dirty="0">
-                <a:solidFill>
-                  <a:schemeClr val="tx1"/>
-                </a:solidFill>
-              </a:rPr>
-              <a:t>https://github.com/JimWright4089/FIRSTWorkshops</a:t>
-            </a:r>
-          </a:p>
-        </p:txBody>
-      </p:sp>
-    </p:spTree>
-    <p:extLst>
-      <p:ext uri="{BB962C8B-B14F-4D97-AF65-F5344CB8AC3E}">
-        <p14:creationId xmlns:p14="http://schemas.microsoft.com/office/powerpoint/2010/main" val="2199144969"/>
-      </p:ext>
-    </p:extLst>
-  </p:cSld>
-  <p:clrMapOvr>
-    <a:masterClrMapping/>
-  </p:clrMapOvr>
-</p:sld>
-</file>
-
-<file path=ppt/slides/slide18.xml><?xml version="1.0" encoding="utf-8"?>
-<p:sld xmlns:a="http://schemas.openxmlformats.org/drawingml/2006/main" xmlns:r="http://schemas.openxmlformats.org/officeDocument/2006/relationships" xmlns:p="http://schemas.openxmlformats.org/presentationml/2006/main">
-  <p:cSld>
-    <p:spTree>
-      <p:nvGrpSpPr>
-        <p:cNvPr id="1" name=""/>
-        <p:cNvGrpSpPr/>
-        <p:nvPr/>
-      </p:nvGrpSpPr>
-      <p:grpSpPr>
-        <a:xfrm>
-          <a:off x="0" y="0"/>
-          <a:ext cx="0" cy="0"/>
-          <a:chOff x="0" y="0"/>
-          <a:chExt cx="0" cy="0"/>
-        </a:xfrm>
-      </p:grpSpPr>
-      <p:sp>
-        <p:nvSpPr>
-          <p:cNvPr id="2" name="Title 1">
-            <a:extLst>
-              <a:ext uri="{FF2B5EF4-FFF2-40B4-BE49-F238E27FC236}">
-                <a16:creationId xmlns:a16="http://schemas.microsoft.com/office/drawing/2014/main" id="{CC4A3FAA-0E02-4277-9A18-5E14BC20FA27}"/>
-              </a:ext>
-            </a:extLst>
-          </p:cNvPr>
-          <p:cNvSpPr>
-            <a:spLocks noGrp="1"/>
-          </p:cNvSpPr>
-          <p:nvPr>
-            <p:ph type="title"/>
-          </p:nvPr>
-        </p:nvSpPr>
-        <p:spPr/>
-        <p:txBody>
-          <a:bodyPr/>
-          <a:lstStyle/>
-          <a:p>
-            <a:r>
-              <a:rPr lang="en-US" dirty="0" err="1"/>
-              <a:t>Jaci’s</a:t>
-            </a:r>
-            <a:r>
-              <a:rPr lang="en-US" dirty="0"/>
-              <a:t> Pathfinding</a:t>
-            </a:r>
-          </a:p>
-        </p:txBody>
-      </p:sp>
-      <p:sp>
-        <p:nvSpPr>
-          <p:cNvPr id="3" name="Content Placeholder 2">
-            <a:extLst>
-              <a:ext uri="{FF2B5EF4-FFF2-40B4-BE49-F238E27FC236}">
-                <a16:creationId xmlns:a16="http://schemas.microsoft.com/office/drawing/2014/main" id="{B50147CF-DAA8-4BEB-A969-D6D9FECE042F}"/>
-              </a:ext>
-            </a:extLst>
-          </p:cNvPr>
-          <p:cNvSpPr>
-            <a:spLocks noGrp="1"/>
-          </p:cNvSpPr>
-          <p:nvPr>
-            <p:ph idx="1"/>
-          </p:nvPr>
-        </p:nvSpPr>
-        <p:spPr/>
-        <p:txBody>
-          <a:bodyPr>
-            <a:normAutofit/>
-          </a:bodyPr>
-          <a:lstStyle/>
-          <a:p>
-            <a:r>
-              <a:rPr lang="en-US" sz="3000" dirty="0"/>
-              <a:t>Unfortunately it’s written in C++</a:t>
-            </a:r>
-          </a:p>
-          <a:p>
-            <a:r>
-              <a:rPr lang="en-US" sz="3000" dirty="0"/>
-              <a:t>I’ve taken the C++ and wrote a tool in Visual Studio to take in a path.csv file an put out a path in java.</a:t>
-            </a:r>
-          </a:p>
-          <a:p>
-            <a:r>
-              <a:rPr lang="en-US" sz="3000" dirty="0"/>
-              <a:t>It’s in the </a:t>
-            </a:r>
-            <a:r>
-              <a:rPr lang="en-US" sz="3000" dirty="0" err="1"/>
-              <a:t>Github</a:t>
-            </a:r>
-            <a:r>
-              <a:rPr lang="en-US" sz="3000"/>
-              <a:t> project below.</a:t>
-            </a:r>
-            <a:endParaRPr lang="en-US" sz="3000" dirty="0"/>
-          </a:p>
-        </p:txBody>
-      </p:sp>
-      <p:sp>
-        <p:nvSpPr>
-          <p:cNvPr id="5" name="Footer Placeholder 4">
-            <a:extLst>
-              <a:ext uri="{FF2B5EF4-FFF2-40B4-BE49-F238E27FC236}">
-                <a16:creationId xmlns:a16="http://schemas.microsoft.com/office/drawing/2014/main" id="{371C134C-9F7D-4F5D-893E-14C6DB1B17A3}"/>
-              </a:ext>
-            </a:extLst>
-          </p:cNvPr>
-          <p:cNvSpPr>
-            <a:spLocks noGrp="1"/>
-          </p:cNvSpPr>
-          <p:nvPr>
-            <p:ph type="ftr" sz="quarter" idx="11"/>
-          </p:nvPr>
-        </p:nvSpPr>
-        <p:spPr>
-          <a:xfrm>
-            <a:off x="353291" y="6303818"/>
-            <a:ext cx="9081654" cy="374074"/>
-          </a:xfrm>
-        </p:spPr>
-        <p:txBody>
-          <a:bodyPr/>
-          <a:lstStyle/>
-          <a:p>
-            <a:r>
-              <a:rPr lang="en-US" sz="2400" dirty="0">
-                <a:solidFill>
-                  <a:schemeClr val="tx1"/>
-                </a:solidFill>
-              </a:rPr>
-              <a:t>https://github.com/JimWright4089/FIRSTWorkshops</a:t>
-            </a:r>
-          </a:p>
-        </p:txBody>
-      </p:sp>
-    </p:spTree>
-    <p:extLst>
-      <p:ext uri="{BB962C8B-B14F-4D97-AF65-F5344CB8AC3E}">
-        <p14:creationId xmlns:p14="http://schemas.microsoft.com/office/powerpoint/2010/main" val="1352459518"/>
-      </p:ext>
-    </p:extLst>
-  </p:cSld>
-  <p:clrMapOvr>
-    <a:masterClrMapping/>
-  </p:clrMapOvr>
-</p:sld>
-</file>
-
-<file path=ppt/slides/slide19.xml><?xml version="1.0" encoding="utf-8"?>
-<p:sld xmlns:a="http://schemas.openxmlformats.org/drawingml/2006/main" xmlns:r="http://schemas.openxmlformats.org/officeDocument/2006/relationships" xmlns:p="http://schemas.openxmlformats.org/presentationml/2006/main">
-  <p:cSld>
-    <p:spTree>
-      <p:nvGrpSpPr>
-        <p:cNvPr id="1" name=""/>
-        <p:cNvGrpSpPr/>
-        <p:nvPr/>
-      </p:nvGrpSpPr>
-      <p:grpSpPr>
-        <a:xfrm>
-          <a:off x="0" y="0"/>
-          <a:ext cx="0" cy="0"/>
-          <a:chOff x="0" y="0"/>
-          <a:chExt cx="0" cy="0"/>
-        </a:xfrm>
-      </p:grpSpPr>
-      <p:sp>
-        <p:nvSpPr>
-          <p:cNvPr id="2" name="Title 1">
-            <a:extLst>
-              <a:ext uri="{FF2B5EF4-FFF2-40B4-BE49-F238E27FC236}">
-                <a16:creationId xmlns:a16="http://schemas.microsoft.com/office/drawing/2014/main" id="{CC4A3FAA-0E02-4277-9A18-5E14BC20FA27}"/>
-              </a:ext>
-            </a:extLst>
-          </p:cNvPr>
-          <p:cNvSpPr>
-            <a:spLocks noGrp="1"/>
-          </p:cNvSpPr>
-          <p:nvPr>
-            <p:ph type="title"/>
-          </p:nvPr>
-        </p:nvSpPr>
-        <p:spPr/>
-        <p:txBody>
-          <a:bodyPr/>
-          <a:lstStyle/>
-          <a:p>
-            <a:r>
-              <a:rPr lang="en-US" dirty="0" err="1"/>
-              <a:t>Jaci’s</a:t>
-            </a:r>
-            <a:r>
-              <a:rPr lang="en-US" dirty="0"/>
-              <a:t> Pathfinding</a:t>
-            </a:r>
-          </a:p>
-        </p:txBody>
-      </p:sp>
-      <p:sp>
-        <p:nvSpPr>
-          <p:cNvPr id="3" name="Content Placeholder 2">
-            <a:extLst>
-              <a:ext uri="{FF2B5EF4-FFF2-40B4-BE49-F238E27FC236}">
-                <a16:creationId xmlns:a16="http://schemas.microsoft.com/office/drawing/2014/main" id="{B50147CF-DAA8-4BEB-A969-D6D9FECE042F}"/>
-              </a:ext>
-            </a:extLst>
-          </p:cNvPr>
-          <p:cNvSpPr>
-            <a:spLocks noGrp="1"/>
-          </p:cNvSpPr>
-          <p:nvPr>
-            <p:ph idx="1"/>
-          </p:nvPr>
-        </p:nvSpPr>
-        <p:spPr/>
-        <p:txBody>
-          <a:bodyPr>
-            <a:normAutofit fontScale="92500" lnSpcReduction="10000"/>
-          </a:bodyPr>
-          <a:lstStyle/>
-          <a:p>
-            <a:r>
-              <a:rPr lang="en-US" sz="3000" dirty="0"/>
-              <a:t>Unfortunately it’s written in C++</a:t>
-            </a:r>
-          </a:p>
-          <a:p>
-            <a:r>
-              <a:rPr lang="en-US" sz="3000" dirty="0"/>
-              <a:t>I’ve taken the C++ and wrote a tool in Visual Studio to take in a path.csv file an put out a path in java.</a:t>
-            </a:r>
-          </a:p>
-          <a:p>
-            <a:r>
-              <a:rPr lang="en-US" sz="3000" dirty="0"/>
-              <a:t>The units are what ever you say they are.  Feet, Inches, Centimeters, Furlongs, Parsec, or Meters.</a:t>
-            </a:r>
-          </a:p>
-          <a:p>
-            <a:r>
-              <a:rPr lang="en-US" sz="3000" dirty="0"/>
-              <a:t>Just be constant with </a:t>
-            </a:r>
-            <a:r>
-              <a:rPr lang="en-US" sz="3000"/>
-              <a:t>the units.</a:t>
-            </a:r>
-            <a:endParaRPr lang="en-US" sz="3000" dirty="0"/>
-          </a:p>
-        </p:txBody>
-      </p:sp>
-      <p:sp>
-        <p:nvSpPr>
-          <p:cNvPr id="5" name="Footer Placeholder 4">
-            <a:extLst>
-              <a:ext uri="{FF2B5EF4-FFF2-40B4-BE49-F238E27FC236}">
-                <a16:creationId xmlns:a16="http://schemas.microsoft.com/office/drawing/2014/main" id="{371C134C-9F7D-4F5D-893E-14C6DB1B17A3}"/>
-              </a:ext>
-            </a:extLst>
-          </p:cNvPr>
-          <p:cNvSpPr>
-            <a:spLocks noGrp="1"/>
-          </p:cNvSpPr>
-          <p:nvPr>
-            <p:ph type="ftr" sz="quarter" idx="11"/>
-          </p:nvPr>
-        </p:nvSpPr>
-        <p:spPr>
-          <a:xfrm>
-            <a:off x="353291" y="6303818"/>
-            <a:ext cx="9081654" cy="374074"/>
-          </a:xfrm>
-        </p:spPr>
-        <p:txBody>
-          <a:bodyPr/>
-          <a:lstStyle/>
-          <a:p>
-            <a:r>
-              <a:rPr lang="en-US" sz="2400" dirty="0">
-                <a:solidFill>
-                  <a:schemeClr val="tx1"/>
-                </a:solidFill>
-              </a:rPr>
-              <a:t>https://github.com/JimWright4089/FIRSTWorkshops</a:t>
-            </a:r>
-          </a:p>
-        </p:txBody>
-      </p:sp>
-    </p:spTree>
-    <p:extLst>
-      <p:ext uri="{BB962C8B-B14F-4D97-AF65-F5344CB8AC3E}">
-        <p14:creationId xmlns:p14="http://schemas.microsoft.com/office/powerpoint/2010/main" val="2664809480"/>
-      </p:ext>
-    </p:extLst>
-  </p:cSld>
-  <p:clrMapOvr>
-    <a:masterClrMapping/>
-  </p:clrMapOvr>
-</p:sld>
-</file>
-
 <file path=ppt/slides/slide2.xml><?xml version="1.0" encoding="utf-8"?>
 <p:sld xmlns:a="http://schemas.openxmlformats.org/drawingml/2006/main" xmlns:r="http://schemas.openxmlformats.org/officeDocument/2006/relationships" xmlns:p="http://schemas.openxmlformats.org/presentationml/2006/main">
   <p:cSld>
@@ -16136,1502 +13903,6 @@
     <p:extLst>
       <p:ext uri="{BB962C8B-B14F-4D97-AF65-F5344CB8AC3E}">
         <p14:creationId xmlns:p14="http://schemas.microsoft.com/office/powerpoint/2010/main" val="3369015981"/>
-      </p:ext>
-    </p:extLst>
-  </p:cSld>
-  <p:clrMapOvr>
-    <a:masterClrMapping/>
-  </p:clrMapOvr>
-</p:sld>
-</file>
-
-<file path=ppt/slides/slide20.xml><?xml version="1.0" encoding="utf-8"?>
-<p:sld xmlns:a="http://schemas.openxmlformats.org/drawingml/2006/main" xmlns:r="http://schemas.openxmlformats.org/officeDocument/2006/relationships" xmlns:p="http://schemas.openxmlformats.org/presentationml/2006/main">
-  <p:cSld>
-    <p:spTree>
-      <p:nvGrpSpPr>
-        <p:cNvPr id="1" name=""/>
-        <p:cNvGrpSpPr/>
-        <p:nvPr/>
-      </p:nvGrpSpPr>
-      <p:grpSpPr>
-        <a:xfrm>
-          <a:off x="0" y="0"/>
-          <a:ext cx="0" cy="0"/>
-          <a:chOff x="0" y="0"/>
-          <a:chExt cx="0" cy="0"/>
-        </a:xfrm>
-      </p:grpSpPr>
-      <p:sp>
-        <p:nvSpPr>
-          <p:cNvPr id="2" name="Title 1">
-            <a:extLst>
-              <a:ext uri="{FF2B5EF4-FFF2-40B4-BE49-F238E27FC236}">
-                <a16:creationId xmlns:a16="http://schemas.microsoft.com/office/drawing/2014/main" id="{CC4A3FAA-0E02-4277-9A18-5E14BC20FA27}"/>
-              </a:ext>
-            </a:extLst>
-          </p:cNvPr>
-          <p:cNvSpPr>
-            <a:spLocks noGrp="1"/>
-          </p:cNvSpPr>
-          <p:nvPr>
-            <p:ph type="title"/>
-          </p:nvPr>
-        </p:nvSpPr>
-        <p:spPr/>
-        <p:txBody>
-          <a:bodyPr/>
-          <a:lstStyle/>
-          <a:p>
-            <a:r>
-              <a:rPr lang="en-US" dirty="0" err="1"/>
-              <a:t>Jaci’s</a:t>
-            </a:r>
-            <a:r>
-              <a:rPr lang="en-US" dirty="0"/>
-              <a:t> Path.csv</a:t>
-            </a:r>
-          </a:p>
-        </p:txBody>
-      </p:sp>
-      <p:sp>
-        <p:nvSpPr>
-          <p:cNvPr id="3" name="Content Placeholder 2">
-            <a:extLst>
-              <a:ext uri="{FF2B5EF4-FFF2-40B4-BE49-F238E27FC236}">
-                <a16:creationId xmlns:a16="http://schemas.microsoft.com/office/drawing/2014/main" id="{B50147CF-DAA8-4BEB-A969-D6D9FECE042F}"/>
-              </a:ext>
-            </a:extLst>
-          </p:cNvPr>
-          <p:cNvSpPr>
-            <a:spLocks noGrp="1"/>
-          </p:cNvSpPr>
-          <p:nvPr>
-            <p:ph idx="1"/>
-          </p:nvPr>
-        </p:nvSpPr>
-        <p:spPr/>
-        <p:txBody>
-          <a:bodyPr>
-            <a:normAutofit fontScale="85000" lnSpcReduction="20000"/>
-          </a:bodyPr>
-          <a:lstStyle/>
-          <a:p>
-            <a:r>
-              <a:rPr lang="en-US" sz="3000" dirty="0"/>
-              <a:t>Name,Desc,Number,X,Y,Theta,X,Y,Theta,X,Y,Theta,X,Y,Theta,X,Y,Theta,X,Y,Theta,X,Y,Theta</a:t>
-            </a:r>
-          </a:p>
-          <a:p>
-            <a:r>
-              <a:rPr lang="en-US" sz="3000" dirty="0"/>
-              <a:t>Move2,Move two feet,2, 0,0,0, 24,0,0</a:t>
-            </a:r>
-          </a:p>
-          <a:p>
-            <a:r>
-              <a:rPr lang="en-US" sz="3000" dirty="0"/>
-              <a:t>Red11,Feed Switch from Front Start 1 aud,4, 16,280.25,0,</a:t>
-            </a:r>
-          </a:p>
-          <a:p>
-            <a:r>
-              <a:rPr lang="en-US" sz="3000" dirty="0"/>
-              <a:t>80,290.25,0,</a:t>
-            </a:r>
-          </a:p>
-          <a:p>
-            <a:r>
-              <a:rPr lang="en-US" sz="3000" dirty="0"/>
-              <a:t>110,290.25,-30,</a:t>
-            </a:r>
-          </a:p>
-          <a:p>
-            <a:r>
-              <a:rPr lang="en-US" sz="3000" dirty="0"/>
-              <a:t>128,234,-120</a:t>
-            </a:r>
-          </a:p>
-        </p:txBody>
-      </p:sp>
-      <p:sp>
-        <p:nvSpPr>
-          <p:cNvPr id="5" name="Footer Placeholder 4">
-            <a:extLst>
-              <a:ext uri="{FF2B5EF4-FFF2-40B4-BE49-F238E27FC236}">
-                <a16:creationId xmlns:a16="http://schemas.microsoft.com/office/drawing/2014/main" id="{371C134C-9F7D-4F5D-893E-14C6DB1B17A3}"/>
-              </a:ext>
-            </a:extLst>
-          </p:cNvPr>
-          <p:cNvSpPr>
-            <a:spLocks noGrp="1"/>
-          </p:cNvSpPr>
-          <p:nvPr>
-            <p:ph type="ftr" sz="quarter" idx="11"/>
-          </p:nvPr>
-        </p:nvSpPr>
-        <p:spPr>
-          <a:xfrm>
-            <a:off x="353291" y="6303818"/>
-            <a:ext cx="9081654" cy="374074"/>
-          </a:xfrm>
-        </p:spPr>
-        <p:txBody>
-          <a:bodyPr/>
-          <a:lstStyle/>
-          <a:p>
-            <a:r>
-              <a:rPr lang="en-US" sz="2400" dirty="0">
-                <a:solidFill>
-                  <a:schemeClr val="tx1"/>
-                </a:solidFill>
-              </a:rPr>
-              <a:t>https://github.com/JimWright4089/FIRSTWorkshops</a:t>
-            </a:r>
-          </a:p>
-        </p:txBody>
-      </p:sp>
-    </p:spTree>
-    <p:extLst>
-      <p:ext uri="{BB962C8B-B14F-4D97-AF65-F5344CB8AC3E}">
-        <p14:creationId xmlns:p14="http://schemas.microsoft.com/office/powerpoint/2010/main" val="52223572"/>
-      </p:ext>
-    </p:extLst>
-  </p:cSld>
-  <p:clrMapOvr>
-    <a:masterClrMapping/>
-  </p:clrMapOvr>
-</p:sld>
-</file>
-
-<file path=ppt/slides/slide21.xml><?xml version="1.0" encoding="utf-8"?>
-<p:sld xmlns:a="http://schemas.openxmlformats.org/drawingml/2006/main" xmlns:r="http://schemas.openxmlformats.org/officeDocument/2006/relationships" xmlns:p="http://schemas.openxmlformats.org/presentationml/2006/main">
-  <p:cSld>
-    <p:spTree>
-      <p:nvGrpSpPr>
-        <p:cNvPr id="1" name=""/>
-        <p:cNvGrpSpPr/>
-        <p:nvPr/>
-      </p:nvGrpSpPr>
-      <p:grpSpPr>
-        <a:xfrm>
-          <a:off x="0" y="0"/>
-          <a:ext cx="0" cy="0"/>
-          <a:chOff x="0" y="0"/>
-          <a:chExt cx="0" cy="0"/>
-        </a:xfrm>
-      </p:grpSpPr>
-      <p:sp>
-        <p:nvSpPr>
-          <p:cNvPr id="2" name="Title 1">
-            <a:extLst>
-              <a:ext uri="{FF2B5EF4-FFF2-40B4-BE49-F238E27FC236}">
-                <a16:creationId xmlns:a16="http://schemas.microsoft.com/office/drawing/2014/main" id="{CC4A3FAA-0E02-4277-9A18-5E14BC20FA27}"/>
-              </a:ext>
-            </a:extLst>
-          </p:cNvPr>
-          <p:cNvSpPr>
-            <a:spLocks noGrp="1"/>
-          </p:cNvSpPr>
-          <p:nvPr>
-            <p:ph type="title"/>
-          </p:nvPr>
-        </p:nvSpPr>
-        <p:spPr/>
-        <p:txBody>
-          <a:bodyPr/>
-          <a:lstStyle/>
-          <a:p>
-            <a:r>
-              <a:rPr lang="en-US" dirty="0" err="1"/>
-              <a:t>Jaci’s</a:t>
-            </a:r>
-            <a:r>
-              <a:rPr lang="en-US" dirty="0"/>
-              <a:t> Settings in the Visual Studio</a:t>
-            </a:r>
-          </a:p>
-        </p:txBody>
-      </p:sp>
-      <p:sp>
-        <p:nvSpPr>
-          <p:cNvPr id="3" name="Content Placeholder 2">
-            <a:extLst>
-              <a:ext uri="{FF2B5EF4-FFF2-40B4-BE49-F238E27FC236}">
-                <a16:creationId xmlns:a16="http://schemas.microsoft.com/office/drawing/2014/main" id="{B50147CF-DAA8-4BEB-A969-D6D9FECE042F}"/>
-              </a:ext>
-            </a:extLst>
-          </p:cNvPr>
-          <p:cNvSpPr>
-            <a:spLocks noGrp="1"/>
-          </p:cNvSpPr>
-          <p:nvPr>
-            <p:ph idx="1"/>
-          </p:nvPr>
-        </p:nvSpPr>
-        <p:spPr/>
-        <p:txBody>
-          <a:bodyPr>
-            <a:normAutofit/>
-          </a:bodyPr>
-          <a:lstStyle/>
-          <a:p>
-            <a:r>
-              <a:rPr lang="en-US" dirty="0"/>
-              <a:t>//----------------------------------------------------------------------------</a:t>
-            </a:r>
-          </a:p>
-          <a:p>
-            <a:r>
-              <a:rPr lang="en-US" dirty="0"/>
-              <a:t>//  Constants</a:t>
-            </a:r>
-          </a:p>
-          <a:p>
-            <a:r>
-              <a:rPr lang="en-US" dirty="0"/>
-              <a:t>//----------------------------------------------------------------------------</a:t>
-            </a:r>
-          </a:p>
-          <a:p>
-            <a:r>
-              <a:rPr lang="en-US" dirty="0"/>
-              <a:t>const double TIME_SLICE =    0.02;   /sec</a:t>
-            </a:r>
-          </a:p>
-          <a:p>
-            <a:r>
-              <a:rPr lang="fr-FR" dirty="0" err="1"/>
-              <a:t>const</a:t>
-            </a:r>
-            <a:r>
-              <a:rPr lang="fr-FR" dirty="0"/>
-              <a:t> double MAX_VEL    =   6.0;  /per sec</a:t>
-            </a:r>
-          </a:p>
-          <a:p>
-            <a:r>
-              <a:rPr lang="fr-FR" dirty="0" err="1"/>
-              <a:t>const</a:t>
-            </a:r>
-            <a:r>
-              <a:rPr lang="fr-FR" dirty="0"/>
-              <a:t> double MAX_ACCEL  =  10.0;</a:t>
-            </a:r>
-          </a:p>
-          <a:p>
-            <a:r>
-              <a:rPr lang="fr-FR" dirty="0" err="1"/>
-              <a:t>const</a:t>
-            </a:r>
-            <a:r>
-              <a:rPr lang="fr-FR" dirty="0"/>
-              <a:t> double MAX_JERK   = 100.0;</a:t>
-            </a:r>
-          </a:p>
-          <a:p>
-            <a:r>
-              <a:rPr lang="en-US" dirty="0"/>
-              <a:t>const double WHEEL_BASE_WIDTH = 8;</a:t>
-            </a:r>
-            <a:endParaRPr lang="en-US" sz="3000" dirty="0"/>
-          </a:p>
-        </p:txBody>
-      </p:sp>
-      <p:sp>
-        <p:nvSpPr>
-          <p:cNvPr id="5" name="Footer Placeholder 4">
-            <a:extLst>
-              <a:ext uri="{FF2B5EF4-FFF2-40B4-BE49-F238E27FC236}">
-                <a16:creationId xmlns:a16="http://schemas.microsoft.com/office/drawing/2014/main" id="{371C134C-9F7D-4F5D-893E-14C6DB1B17A3}"/>
-              </a:ext>
-            </a:extLst>
-          </p:cNvPr>
-          <p:cNvSpPr>
-            <a:spLocks noGrp="1"/>
-          </p:cNvSpPr>
-          <p:nvPr>
-            <p:ph type="ftr" sz="quarter" idx="11"/>
-          </p:nvPr>
-        </p:nvSpPr>
-        <p:spPr>
-          <a:xfrm>
-            <a:off x="353291" y="6303818"/>
-            <a:ext cx="9081654" cy="374074"/>
-          </a:xfrm>
-        </p:spPr>
-        <p:txBody>
-          <a:bodyPr/>
-          <a:lstStyle/>
-          <a:p>
-            <a:r>
-              <a:rPr lang="en-US" sz="2400" dirty="0">
-                <a:solidFill>
-                  <a:schemeClr val="tx1"/>
-                </a:solidFill>
-              </a:rPr>
-              <a:t>https://github.com/JimWright4089/FIRSTWorkshops</a:t>
-            </a:r>
-          </a:p>
-        </p:txBody>
-      </p:sp>
-    </p:spTree>
-    <p:extLst>
-      <p:ext uri="{BB962C8B-B14F-4D97-AF65-F5344CB8AC3E}">
-        <p14:creationId xmlns:p14="http://schemas.microsoft.com/office/powerpoint/2010/main" val="818825974"/>
-      </p:ext>
-    </p:extLst>
-  </p:cSld>
-  <p:clrMapOvr>
-    <a:masterClrMapping/>
-  </p:clrMapOvr>
-</p:sld>
-</file>
-
-<file path=ppt/slides/slide22.xml><?xml version="1.0" encoding="utf-8"?>
-<p:sld xmlns:a="http://schemas.openxmlformats.org/drawingml/2006/main" xmlns:r="http://schemas.openxmlformats.org/officeDocument/2006/relationships" xmlns:p="http://schemas.openxmlformats.org/presentationml/2006/main">
-  <p:cSld>
-    <p:spTree>
-      <p:nvGrpSpPr>
-        <p:cNvPr id="1" name=""/>
-        <p:cNvGrpSpPr/>
-        <p:nvPr/>
-      </p:nvGrpSpPr>
-      <p:grpSpPr>
-        <a:xfrm>
-          <a:off x="0" y="0"/>
-          <a:ext cx="0" cy="0"/>
-          <a:chOff x="0" y="0"/>
-          <a:chExt cx="0" cy="0"/>
-        </a:xfrm>
-      </p:grpSpPr>
-      <p:sp>
-        <p:nvSpPr>
-          <p:cNvPr id="2" name="Title 1">
-            <a:extLst>
-              <a:ext uri="{FF2B5EF4-FFF2-40B4-BE49-F238E27FC236}">
-                <a16:creationId xmlns:a16="http://schemas.microsoft.com/office/drawing/2014/main" id="{CC4A3FAA-0E02-4277-9A18-5E14BC20FA27}"/>
-              </a:ext>
-            </a:extLst>
-          </p:cNvPr>
-          <p:cNvSpPr>
-            <a:spLocks noGrp="1"/>
-          </p:cNvSpPr>
-          <p:nvPr>
-            <p:ph type="title"/>
-          </p:nvPr>
-        </p:nvSpPr>
-        <p:spPr/>
-        <p:txBody>
-          <a:bodyPr/>
-          <a:lstStyle/>
-          <a:p>
-            <a:r>
-              <a:rPr lang="en-US" dirty="0" err="1"/>
-              <a:t>Jaci’s</a:t>
-            </a:r>
-            <a:r>
-              <a:rPr lang="en-US" dirty="0"/>
-              <a:t> output</a:t>
-            </a:r>
-          </a:p>
-        </p:txBody>
-      </p:sp>
-      <p:sp>
-        <p:nvSpPr>
-          <p:cNvPr id="3" name="Content Placeholder 2">
-            <a:extLst>
-              <a:ext uri="{FF2B5EF4-FFF2-40B4-BE49-F238E27FC236}">
-                <a16:creationId xmlns:a16="http://schemas.microsoft.com/office/drawing/2014/main" id="{B50147CF-DAA8-4BEB-A969-D6D9FECE042F}"/>
-              </a:ext>
-            </a:extLst>
-          </p:cNvPr>
-          <p:cNvSpPr>
-            <a:spLocks noGrp="1"/>
-          </p:cNvSpPr>
-          <p:nvPr>
-            <p:ph idx="1"/>
-          </p:nvPr>
-        </p:nvSpPr>
-        <p:spPr/>
-        <p:txBody>
-          <a:bodyPr>
-            <a:normAutofit/>
-          </a:bodyPr>
-          <a:lstStyle/>
-          <a:p>
-            <a:r>
-              <a:rPr lang="en-US" sz="3000" dirty="0"/>
-              <a:t>The output is a .java file for every line in the CVS.  Subclass of Class.java</a:t>
-            </a:r>
-          </a:p>
-          <a:p>
-            <a:endParaRPr lang="en-US" sz="3000" dirty="0"/>
-          </a:p>
-        </p:txBody>
-      </p:sp>
-      <p:sp>
-        <p:nvSpPr>
-          <p:cNvPr id="5" name="Footer Placeholder 4">
-            <a:extLst>
-              <a:ext uri="{FF2B5EF4-FFF2-40B4-BE49-F238E27FC236}">
-                <a16:creationId xmlns:a16="http://schemas.microsoft.com/office/drawing/2014/main" id="{371C134C-9F7D-4F5D-893E-14C6DB1B17A3}"/>
-              </a:ext>
-            </a:extLst>
-          </p:cNvPr>
-          <p:cNvSpPr>
-            <a:spLocks noGrp="1"/>
-          </p:cNvSpPr>
-          <p:nvPr>
-            <p:ph type="ftr" sz="quarter" idx="11"/>
-          </p:nvPr>
-        </p:nvSpPr>
-        <p:spPr>
-          <a:xfrm>
-            <a:off x="353291" y="6303818"/>
-            <a:ext cx="9081654" cy="374074"/>
-          </a:xfrm>
-        </p:spPr>
-        <p:txBody>
-          <a:bodyPr/>
-          <a:lstStyle/>
-          <a:p>
-            <a:r>
-              <a:rPr lang="en-US" sz="2400" dirty="0">
-                <a:solidFill>
-                  <a:schemeClr val="tx1"/>
-                </a:solidFill>
-              </a:rPr>
-              <a:t>https://github.com/JimWright4089/FIRSTWorkshops</a:t>
-            </a:r>
-          </a:p>
-        </p:txBody>
-      </p:sp>
-    </p:spTree>
-    <p:extLst>
-      <p:ext uri="{BB962C8B-B14F-4D97-AF65-F5344CB8AC3E}">
-        <p14:creationId xmlns:p14="http://schemas.microsoft.com/office/powerpoint/2010/main" val="3758601502"/>
-      </p:ext>
-    </p:extLst>
-  </p:cSld>
-  <p:clrMapOvr>
-    <a:masterClrMapping/>
-  </p:clrMapOvr>
-</p:sld>
-</file>
-
-<file path=ppt/slides/slide23.xml><?xml version="1.0" encoding="utf-8"?>
-<p:sld xmlns:a="http://schemas.openxmlformats.org/drawingml/2006/main" xmlns:r="http://schemas.openxmlformats.org/officeDocument/2006/relationships" xmlns:p="http://schemas.openxmlformats.org/presentationml/2006/main">
-  <p:cSld>
-    <p:spTree>
-      <p:nvGrpSpPr>
-        <p:cNvPr id="1" name=""/>
-        <p:cNvGrpSpPr/>
-        <p:nvPr/>
-      </p:nvGrpSpPr>
-      <p:grpSpPr>
-        <a:xfrm>
-          <a:off x="0" y="0"/>
-          <a:ext cx="0" cy="0"/>
-          <a:chOff x="0" y="0"/>
-          <a:chExt cx="0" cy="0"/>
-        </a:xfrm>
-      </p:grpSpPr>
-      <p:sp>
-        <p:nvSpPr>
-          <p:cNvPr id="2" name="Title 1">
-            <a:extLst>
-              <a:ext uri="{FF2B5EF4-FFF2-40B4-BE49-F238E27FC236}">
-                <a16:creationId xmlns:a16="http://schemas.microsoft.com/office/drawing/2014/main" id="{CC4A3FAA-0E02-4277-9A18-5E14BC20FA27}"/>
-              </a:ext>
-            </a:extLst>
-          </p:cNvPr>
-          <p:cNvSpPr>
-            <a:spLocks noGrp="1"/>
-          </p:cNvSpPr>
-          <p:nvPr>
-            <p:ph type="title"/>
-          </p:nvPr>
-        </p:nvSpPr>
-        <p:spPr/>
-        <p:txBody>
-          <a:bodyPr/>
-          <a:lstStyle/>
-          <a:p>
-            <a:r>
-              <a:rPr lang="en-US" dirty="0"/>
-              <a:t>Classes</a:t>
-            </a:r>
-          </a:p>
-        </p:txBody>
-      </p:sp>
-      <p:sp>
-        <p:nvSpPr>
-          <p:cNvPr id="3" name="Content Placeholder 2">
-            <a:extLst>
-              <a:ext uri="{FF2B5EF4-FFF2-40B4-BE49-F238E27FC236}">
-                <a16:creationId xmlns:a16="http://schemas.microsoft.com/office/drawing/2014/main" id="{B50147CF-DAA8-4BEB-A969-D6D9FECE042F}"/>
-              </a:ext>
-            </a:extLst>
-          </p:cNvPr>
-          <p:cNvSpPr>
-            <a:spLocks noGrp="1"/>
-          </p:cNvSpPr>
-          <p:nvPr>
-            <p:ph idx="1"/>
-          </p:nvPr>
-        </p:nvSpPr>
-        <p:spPr/>
-        <p:txBody>
-          <a:bodyPr>
-            <a:normAutofit fontScale="55000" lnSpcReduction="20000"/>
-          </a:bodyPr>
-          <a:lstStyle/>
-          <a:p>
-            <a:r>
-              <a:rPr lang="en-US" sz="3000" dirty="0"/>
-              <a:t>Path.java</a:t>
-            </a:r>
-          </a:p>
-          <a:p>
-            <a:pPr lvl="1"/>
-            <a:r>
-              <a:rPr lang="en-US" sz="2800" dirty="0"/>
-              <a:t>This is the super class of every path.</a:t>
-            </a:r>
-            <a:endParaRPr lang="en-US" sz="3000" dirty="0"/>
-          </a:p>
-          <a:p>
-            <a:r>
-              <a:rPr lang="en-US" sz="3000" dirty="0"/>
-              <a:t> public double </a:t>
-            </a:r>
-            <a:r>
-              <a:rPr lang="en-US" sz="3000" dirty="0" err="1"/>
-              <a:t>kSpeed</a:t>
-            </a:r>
-            <a:r>
-              <a:rPr lang="en-US" sz="3000" dirty="0"/>
-              <a:t> = 14.0;</a:t>
-            </a:r>
-          </a:p>
-          <a:p>
-            <a:r>
-              <a:rPr lang="en-US" sz="3000" dirty="0"/>
-              <a:t>    public int </a:t>
-            </a:r>
-            <a:r>
-              <a:rPr lang="en-US" sz="3000" dirty="0" err="1"/>
-              <a:t>kNumPoints</a:t>
-            </a:r>
-            <a:r>
-              <a:rPr lang="en-US" sz="3000" dirty="0"/>
-              <a:t> =64;</a:t>
-            </a:r>
-          </a:p>
-          <a:p>
-            <a:r>
-              <a:rPr lang="en-US" sz="3000" dirty="0"/>
-              <a:t>    public double[][] </a:t>
-            </a:r>
-            <a:r>
-              <a:rPr lang="en-US" sz="3000" dirty="0" err="1"/>
-              <a:t>kPoints</a:t>
-            </a:r>
-            <a:r>
-              <a:rPr lang="en-US" sz="3000" dirty="0"/>
-              <a:t> = new double[][]{</a:t>
-            </a:r>
-          </a:p>
-          <a:p>
-            <a:r>
-              <a:rPr lang="en-US" sz="3000" dirty="0"/>
-              <a:t>            {1.941176, 1.941176, 0.015257, 16.016520, 50.750002, 16.020248, 36.750003},</a:t>
-            </a:r>
-          </a:p>
-          <a:p>
-            <a:r>
-              <a:rPr lang="en-US" sz="3000" dirty="0"/>
-              <a:t>            {3.488871, 4.275835, 0.079671, 16.086297, 50.750060, 16.105765, 36.750074},</a:t>
-            </a:r>
-          </a:p>
-          <a:p>
-            <a:r>
-              <a:rPr lang="en-US" sz="3000" dirty="0"/>
-              <a:t>The lines are, left speed, right speed, heading, and other the x and y location of the wheels.</a:t>
-            </a:r>
-          </a:p>
-          <a:p>
-            <a:endParaRPr lang="en-US" sz="3000" dirty="0"/>
-          </a:p>
-          <a:p>
-            <a:pPr marL="0" indent="0">
-              <a:buNone/>
-            </a:pPr>
-            <a:endParaRPr lang="en-US" sz="3000" dirty="0"/>
-          </a:p>
-        </p:txBody>
-      </p:sp>
-      <p:sp>
-        <p:nvSpPr>
-          <p:cNvPr id="5" name="Footer Placeholder 4">
-            <a:extLst>
-              <a:ext uri="{FF2B5EF4-FFF2-40B4-BE49-F238E27FC236}">
-                <a16:creationId xmlns:a16="http://schemas.microsoft.com/office/drawing/2014/main" id="{371C134C-9F7D-4F5D-893E-14C6DB1B17A3}"/>
-              </a:ext>
-            </a:extLst>
-          </p:cNvPr>
-          <p:cNvSpPr>
-            <a:spLocks noGrp="1"/>
-          </p:cNvSpPr>
-          <p:nvPr>
-            <p:ph type="ftr" sz="quarter" idx="11"/>
-          </p:nvPr>
-        </p:nvSpPr>
-        <p:spPr>
-          <a:xfrm>
-            <a:off x="353291" y="6303818"/>
-            <a:ext cx="9081654" cy="374074"/>
-          </a:xfrm>
-        </p:spPr>
-        <p:txBody>
-          <a:bodyPr/>
-          <a:lstStyle/>
-          <a:p>
-            <a:r>
-              <a:rPr lang="en-US" sz="2400" dirty="0">
-                <a:solidFill>
-                  <a:schemeClr val="tx1"/>
-                </a:solidFill>
-              </a:rPr>
-              <a:t>https://github.com/JimWright4089/FIRSTWorkshops</a:t>
-            </a:r>
-          </a:p>
-        </p:txBody>
-      </p:sp>
-    </p:spTree>
-    <p:extLst>
-      <p:ext uri="{BB962C8B-B14F-4D97-AF65-F5344CB8AC3E}">
-        <p14:creationId xmlns:p14="http://schemas.microsoft.com/office/powerpoint/2010/main" val="2817288444"/>
-      </p:ext>
-    </p:extLst>
-  </p:cSld>
-  <p:clrMapOvr>
-    <a:masterClrMapping/>
-  </p:clrMapOvr>
-</p:sld>
-</file>
-
-<file path=ppt/slides/slide24.xml><?xml version="1.0" encoding="utf-8"?>
-<p:sld xmlns:a="http://schemas.openxmlformats.org/drawingml/2006/main" xmlns:r="http://schemas.openxmlformats.org/officeDocument/2006/relationships" xmlns:p="http://schemas.openxmlformats.org/presentationml/2006/main">
-  <p:cSld>
-    <p:spTree>
-      <p:nvGrpSpPr>
-        <p:cNvPr id="1" name=""/>
-        <p:cNvGrpSpPr/>
-        <p:nvPr/>
-      </p:nvGrpSpPr>
-      <p:grpSpPr>
-        <a:xfrm>
-          <a:off x="0" y="0"/>
-          <a:ext cx="0" cy="0"/>
-          <a:chOff x="0" y="0"/>
-          <a:chExt cx="0" cy="0"/>
-        </a:xfrm>
-      </p:grpSpPr>
-      <p:sp>
-        <p:nvSpPr>
-          <p:cNvPr id="2" name="Title 1">
-            <a:extLst>
-              <a:ext uri="{FF2B5EF4-FFF2-40B4-BE49-F238E27FC236}">
-                <a16:creationId xmlns:a16="http://schemas.microsoft.com/office/drawing/2014/main" id="{CC4A3FAA-0E02-4277-9A18-5E14BC20FA27}"/>
-              </a:ext>
-            </a:extLst>
-          </p:cNvPr>
-          <p:cNvSpPr>
-            <a:spLocks noGrp="1"/>
-          </p:cNvSpPr>
-          <p:nvPr>
-            <p:ph type="title"/>
-          </p:nvPr>
-        </p:nvSpPr>
-        <p:spPr/>
-        <p:txBody>
-          <a:bodyPr/>
-          <a:lstStyle/>
-          <a:p>
-            <a:r>
-              <a:rPr lang="en-US" dirty="0"/>
-              <a:t>Classes</a:t>
-            </a:r>
-          </a:p>
-        </p:txBody>
-      </p:sp>
-      <p:sp>
-        <p:nvSpPr>
-          <p:cNvPr id="3" name="Content Placeholder 2">
-            <a:extLst>
-              <a:ext uri="{FF2B5EF4-FFF2-40B4-BE49-F238E27FC236}">
-                <a16:creationId xmlns:a16="http://schemas.microsoft.com/office/drawing/2014/main" id="{B50147CF-DAA8-4BEB-A969-D6D9FECE042F}"/>
-              </a:ext>
-            </a:extLst>
-          </p:cNvPr>
-          <p:cNvSpPr>
-            <a:spLocks noGrp="1"/>
-          </p:cNvSpPr>
-          <p:nvPr>
-            <p:ph idx="1"/>
-          </p:nvPr>
-        </p:nvSpPr>
-        <p:spPr/>
-        <p:txBody>
-          <a:bodyPr>
-            <a:normAutofit fontScale="77500" lnSpcReduction="20000"/>
-          </a:bodyPr>
-          <a:lstStyle/>
-          <a:p>
-            <a:r>
-              <a:rPr lang="en-US" sz="3000" dirty="0"/>
-              <a:t>DrivePathAction.java</a:t>
-            </a:r>
-          </a:p>
-          <a:p>
-            <a:pPr lvl="1"/>
-            <a:r>
-              <a:rPr lang="en-US" sz="2800" dirty="0"/>
-              <a:t>Constructor takes in a Path.</a:t>
-            </a:r>
-          </a:p>
-          <a:p>
-            <a:r>
-              <a:rPr lang="en-US" sz="3000" dirty="0" err="1"/>
-              <a:t>isFinished</a:t>
-            </a:r>
-            <a:r>
-              <a:rPr lang="en-US" sz="3000" dirty="0"/>
-              <a:t>()</a:t>
-            </a:r>
-          </a:p>
-          <a:p>
-            <a:pPr lvl="1"/>
-            <a:r>
-              <a:rPr lang="en-US" sz="2800" dirty="0"/>
-              <a:t>Checks to see if all the points have been run</a:t>
-            </a:r>
-          </a:p>
-          <a:p>
-            <a:r>
-              <a:rPr lang="en-US" sz="3000" dirty="0"/>
-              <a:t>end</a:t>
-            </a:r>
-          </a:p>
-          <a:p>
-            <a:pPr lvl="1"/>
-            <a:r>
-              <a:rPr lang="en-US" sz="2800" dirty="0"/>
-              <a:t>Stops the motors</a:t>
-            </a:r>
-          </a:p>
-          <a:p>
-            <a:r>
-              <a:rPr lang="en-US" sz="3000" dirty="0"/>
-              <a:t>Initialize</a:t>
-            </a:r>
-          </a:p>
-          <a:p>
-            <a:pPr lvl="1"/>
-            <a:r>
-              <a:rPr lang="en-US" sz="2800" dirty="0"/>
-              <a:t>Resets the count to 0</a:t>
-            </a:r>
-          </a:p>
-          <a:p>
-            <a:pPr marL="0" indent="0">
-              <a:buNone/>
-            </a:pPr>
-            <a:endParaRPr lang="en-US" sz="3000" dirty="0"/>
-          </a:p>
-        </p:txBody>
-      </p:sp>
-      <p:sp>
-        <p:nvSpPr>
-          <p:cNvPr id="5" name="Footer Placeholder 4">
-            <a:extLst>
-              <a:ext uri="{FF2B5EF4-FFF2-40B4-BE49-F238E27FC236}">
-                <a16:creationId xmlns:a16="http://schemas.microsoft.com/office/drawing/2014/main" id="{371C134C-9F7D-4F5D-893E-14C6DB1B17A3}"/>
-              </a:ext>
-            </a:extLst>
-          </p:cNvPr>
-          <p:cNvSpPr>
-            <a:spLocks noGrp="1"/>
-          </p:cNvSpPr>
-          <p:nvPr>
-            <p:ph type="ftr" sz="quarter" idx="11"/>
-          </p:nvPr>
-        </p:nvSpPr>
-        <p:spPr>
-          <a:xfrm>
-            <a:off x="353291" y="6303818"/>
-            <a:ext cx="9081654" cy="374074"/>
-          </a:xfrm>
-        </p:spPr>
-        <p:txBody>
-          <a:bodyPr/>
-          <a:lstStyle/>
-          <a:p>
-            <a:r>
-              <a:rPr lang="en-US" sz="2400" dirty="0">
-                <a:solidFill>
-                  <a:schemeClr val="tx1"/>
-                </a:solidFill>
-              </a:rPr>
-              <a:t>https://github.com/JimWright4089/FIRSTWorkshops</a:t>
-            </a:r>
-          </a:p>
-        </p:txBody>
-      </p:sp>
-      <p:sp>
-        <p:nvSpPr>
-          <p:cNvPr id="4" name="Rectangle 1">
-            <a:extLst>
-              <a:ext uri="{FF2B5EF4-FFF2-40B4-BE49-F238E27FC236}">
-                <a16:creationId xmlns:a16="http://schemas.microsoft.com/office/drawing/2014/main" id="{87129B67-A605-44B6-814D-6176EC8C3D96}"/>
-              </a:ext>
-            </a:extLst>
-          </p:cNvPr>
-          <p:cNvSpPr>
-            <a:spLocks noChangeArrowheads="1"/>
-          </p:cNvSpPr>
-          <p:nvPr/>
-        </p:nvSpPr>
-        <p:spPr bwMode="auto">
-          <a:xfrm>
-            <a:off x="0" y="0"/>
-            <a:ext cx="12192000" cy="457200"/>
-          </a:xfrm>
-          <a:prstGeom prst="rect">
-            <a:avLst/>
-          </a:prstGeom>
-          <a:solidFill>
-            <a:srgbClr val="FFFFFF"/>
-          </a:solidFill>
-          <a:ln>
-            <a:noFill/>
-          </a:ln>
-          <a:effectLst/>
-          <a:extLst>
-            <a:ext uri="{91240B29-F687-4F45-9708-019B960494DF}">
-              <a14:hiddenLine xmlns:a14="http://schemas.microsoft.com/office/drawing/2010/main" w="9525">
-                <a:solidFill>
-                  <a:schemeClr val="tx1"/>
-                </a:solidFill>
-                <a:miter lim="800000"/>
-                <a:headEnd/>
-                <a:tailEnd/>
-              </a14:hiddenLine>
-            </a:ext>
-            <a:ext uri="{AF507438-7753-43E0-B8FC-AC1667EBCBE1}">
-              <a14:hiddenEffects xmlns:a14="http://schemas.microsoft.com/office/drawing/2010/main">
-                <a:effectLst>
-                  <a:outerShdw dist="35921" dir="2700000" algn="ctr" rotWithShape="0">
-                    <a:schemeClr val="bg2"/>
-                  </a:outerShdw>
-                </a:effectLst>
-              </a14:hiddenEffects>
-            </a:ext>
-          </a:extLst>
-        </p:spPr>
-        <p:txBody>
-          <a:bodyPr vert="horz" wrap="none" lIns="91440" tIns="45720" rIns="91440" bIns="45720" numCol="1" anchor="ctr" anchorCtr="0" compatLnSpc="1">
-            <a:prstTxWarp prst="textNoShape">
-              <a:avLst/>
-            </a:prstTxWarp>
-            <a:spAutoFit/>
-          </a:bodyPr>
-          <a:lstStyle/>
-          <a:p>
-            <a:pPr marL="0" marR="0" lvl="0" indent="0" algn="l" defTabSz="914400" rtl="0" eaLnBrk="0" fontAlgn="base" latinLnBrk="0" hangingPunct="0">
-              <a:lnSpc>
-                <a:spcPct val="100000"/>
-              </a:lnSpc>
-              <a:spcBef>
-                <a:spcPct val="0"/>
-              </a:spcBef>
-              <a:spcAft>
-                <a:spcPct val="0"/>
-              </a:spcAft>
-              <a:buClrTx/>
-              <a:buSzTx/>
-              <a:buFontTx/>
-              <a:buNone/>
-              <a:tabLst/>
-            </a:pPr>
-            <a:r>
-              <a:rPr kumimoji="0" lang="en-US" altLang="en-US" sz="1200" b="0" i="0" u="none" strike="noStrike" cap="none" normalizeH="0" baseline="0">
-                <a:ln>
-                  <a:noFill/>
-                </a:ln>
-                <a:solidFill>
-                  <a:srgbClr val="000000"/>
-                </a:solidFill>
-                <a:effectLst/>
-                <a:latin typeface="Source Code Pro" panose="020B0509030403020204" pitchFamily="49" charset="0"/>
-              </a:rPr>
-              <a:t>DrivePathAction</a:t>
-            </a:r>
-            <a:endParaRPr kumimoji="0" lang="en-US" altLang="en-US" sz="1800" b="0" i="0" u="none" strike="noStrike" cap="none" normalizeH="0" baseline="0">
-              <a:ln>
-                <a:noFill/>
-              </a:ln>
-              <a:solidFill>
-                <a:schemeClr val="tx1"/>
-              </a:solidFill>
-              <a:effectLst/>
-              <a:latin typeface="Arial" panose="020B0604020202020204" pitchFamily="34" charset="0"/>
-            </a:endParaRPr>
-          </a:p>
-        </p:txBody>
-      </p:sp>
-    </p:spTree>
-    <p:extLst>
-      <p:ext uri="{BB962C8B-B14F-4D97-AF65-F5344CB8AC3E}">
-        <p14:creationId xmlns:p14="http://schemas.microsoft.com/office/powerpoint/2010/main" val="1541088708"/>
-      </p:ext>
-    </p:extLst>
-  </p:cSld>
-  <p:clrMapOvr>
-    <a:masterClrMapping/>
-  </p:clrMapOvr>
-</p:sld>
-</file>
-
-<file path=ppt/slides/slide25.xml><?xml version="1.0" encoding="utf-8"?>
-<p:sld xmlns:a="http://schemas.openxmlformats.org/drawingml/2006/main" xmlns:r="http://schemas.openxmlformats.org/officeDocument/2006/relationships" xmlns:p="http://schemas.openxmlformats.org/presentationml/2006/main">
-  <p:cSld>
-    <p:spTree>
-      <p:nvGrpSpPr>
-        <p:cNvPr id="1" name=""/>
-        <p:cNvGrpSpPr/>
-        <p:nvPr/>
-      </p:nvGrpSpPr>
-      <p:grpSpPr>
-        <a:xfrm>
-          <a:off x="0" y="0"/>
-          <a:ext cx="0" cy="0"/>
-          <a:chOff x="0" y="0"/>
-          <a:chExt cx="0" cy="0"/>
-        </a:xfrm>
-      </p:grpSpPr>
-      <p:sp>
-        <p:nvSpPr>
-          <p:cNvPr id="2" name="Title 1">
-            <a:extLst>
-              <a:ext uri="{FF2B5EF4-FFF2-40B4-BE49-F238E27FC236}">
-                <a16:creationId xmlns:a16="http://schemas.microsoft.com/office/drawing/2014/main" id="{CC4A3FAA-0E02-4277-9A18-5E14BC20FA27}"/>
-              </a:ext>
-            </a:extLst>
-          </p:cNvPr>
-          <p:cNvSpPr>
-            <a:spLocks noGrp="1"/>
-          </p:cNvSpPr>
-          <p:nvPr>
-            <p:ph type="title"/>
-          </p:nvPr>
-        </p:nvSpPr>
-        <p:spPr/>
-        <p:txBody>
-          <a:bodyPr/>
-          <a:lstStyle/>
-          <a:p>
-            <a:r>
-              <a:rPr lang="en-US" dirty="0"/>
-              <a:t>Classes</a:t>
-            </a:r>
-          </a:p>
-        </p:txBody>
-      </p:sp>
-      <p:sp>
-        <p:nvSpPr>
-          <p:cNvPr id="3" name="Content Placeholder 2">
-            <a:extLst>
-              <a:ext uri="{FF2B5EF4-FFF2-40B4-BE49-F238E27FC236}">
-                <a16:creationId xmlns:a16="http://schemas.microsoft.com/office/drawing/2014/main" id="{B50147CF-DAA8-4BEB-A969-D6D9FECE042F}"/>
-              </a:ext>
-            </a:extLst>
-          </p:cNvPr>
-          <p:cNvSpPr>
-            <a:spLocks noGrp="1"/>
-          </p:cNvSpPr>
-          <p:nvPr>
-            <p:ph idx="1"/>
-          </p:nvPr>
-        </p:nvSpPr>
-        <p:spPr/>
-        <p:txBody>
-          <a:bodyPr>
-            <a:normAutofit fontScale="92500" lnSpcReduction="20000"/>
-          </a:bodyPr>
-          <a:lstStyle/>
-          <a:p>
-            <a:r>
-              <a:rPr lang="en-US" sz="3000" dirty="0"/>
-              <a:t>DrivePathAction.java</a:t>
-            </a:r>
-          </a:p>
-          <a:p>
-            <a:r>
-              <a:rPr lang="en-US" sz="3000" dirty="0"/>
-              <a:t>execute</a:t>
-            </a:r>
-          </a:p>
-          <a:p>
-            <a:pPr lvl="1"/>
-            <a:r>
-              <a:rPr lang="en-US" sz="2800" dirty="0"/>
-              <a:t>Takes the motors and the gyro and adjusts the speed.</a:t>
-            </a:r>
-          </a:p>
-          <a:p>
-            <a:pPr lvl="1"/>
-            <a:r>
-              <a:rPr lang="en-US" sz="2800" dirty="0"/>
-              <a:t>Should be run every at the speed we said in the settings (0.02 sec)</a:t>
-            </a:r>
-          </a:p>
-          <a:p>
-            <a:pPr lvl="1"/>
-            <a:r>
-              <a:rPr lang="en-US" sz="3000" dirty="0"/>
-              <a:t>Important constant:  DIST_TO_REAL_DIST_CONST </a:t>
-            </a:r>
-          </a:p>
-          <a:p>
-            <a:pPr marL="0" indent="0">
-              <a:buNone/>
-            </a:pPr>
-            <a:endParaRPr lang="en-US" sz="3000" dirty="0"/>
-          </a:p>
-        </p:txBody>
-      </p:sp>
-      <p:sp>
-        <p:nvSpPr>
-          <p:cNvPr id="5" name="Footer Placeholder 4">
-            <a:extLst>
-              <a:ext uri="{FF2B5EF4-FFF2-40B4-BE49-F238E27FC236}">
-                <a16:creationId xmlns:a16="http://schemas.microsoft.com/office/drawing/2014/main" id="{371C134C-9F7D-4F5D-893E-14C6DB1B17A3}"/>
-              </a:ext>
-            </a:extLst>
-          </p:cNvPr>
-          <p:cNvSpPr>
-            <a:spLocks noGrp="1"/>
-          </p:cNvSpPr>
-          <p:nvPr>
-            <p:ph type="ftr" sz="quarter" idx="11"/>
-          </p:nvPr>
-        </p:nvSpPr>
-        <p:spPr>
-          <a:xfrm>
-            <a:off x="353291" y="6303818"/>
-            <a:ext cx="9081654" cy="374074"/>
-          </a:xfrm>
-        </p:spPr>
-        <p:txBody>
-          <a:bodyPr/>
-          <a:lstStyle/>
-          <a:p>
-            <a:r>
-              <a:rPr lang="en-US" sz="2400" dirty="0">
-                <a:solidFill>
-                  <a:schemeClr val="tx1"/>
-                </a:solidFill>
-              </a:rPr>
-              <a:t>https://github.com/JimWright4089/FIRSTWorkshops</a:t>
-            </a:r>
-          </a:p>
-        </p:txBody>
-      </p:sp>
-    </p:spTree>
-    <p:extLst>
-      <p:ext uri="{BB962C8B-B14F-4D97-AF65-F5344CB8AC3E}">
-        <p14:creationId xmlns:p14="http://schemas.microsoft.com/office/powerpoint/2010/main" val="2853441399"/>
-      </p:ext>
-    </p:extLst>
-  </p:cSld>
-  <p:clrMapOvr>
-    <a:masterClrMapping/>
-  </p:clrMapOvr>
-</p:sld>
-</file>
-
-<file path=ppt/slides/slide26.xml><?xml version="1.0" encoding="utf-8"?>
-<p:sld xmlns:a="http://schemas.openxmlformats.org/drawingml/2006/main" xmlns:r="http://schemas.openxmlformats.org/officeDocument/2006/relationships" xmlns:p="http://schemas.openxmlformats.org/presentationml/2006/main">
-  <p:cSld>
-    <p:spTree>
-      <p:nvGrpSpPr>
-        <p:cNvPr id="1" name=""/>
-        <p:cNvGrpSpPr/>
-        <p:nvPr/>
-      </p:nvGrpSpPr>
-      <p:grpSpPr>
-        <a:xfrm>
-          <a:off x="0" y="0"/>
-          <a:ext cx="0" cy="0"/>
-          <a:chOff x="0" y="0"/>
-          <a:chExt cx="0" cy="0"/>
-        </a:xfrm>
-      </p:grpSpPr>
-      <p:sp>
-        <p:nvSpPr>
-          <p:cNvPr id="2" name="Title 1">
-            <a:extLst>
-              <a:ext uri="{FF2B5EF4-FFF2-40B4-BE49-F238E27FC236}">
-                <a16:creationId xmlns:a16="http://schemas.microsoft.com/office/drawing/2014/main" id="{CC4A3FAA-0E02-4277-9A18-5E14BC20FA27}"/>
-              </a:ext>
-            </a:extLst>
-          </p:cNvPr>
-          <p:cNvSpPr>
-            <a:spLocks noGrp="1"/>
-          </p:cNvSpPr>
-          <p:nvPr>
-            <p:ph type="title"/>
-          </p:nvPr>
-        </p:nvSpPr>
-        <p:spPr/>
-        <p:txBody>
-          <a:bodyPr/>
-          <a:lstStyle/>
-          <a:p>
-            <a:r>
-              <a:rPr lang="en-US" dirty="0"/>
-              <a:t>DIST_TO_REAL_DIST_CONST</a:t>
-            </a:r>
-          </a:p>
-        </p:txBody>
-      </p:sp>
-      <p:sp>
-        <p:nvSpPr>
-          <p:cNvPr id="3" name="Content Placeholder 2">
-            <a:extLst>
-              <a:ext uri="{FF2B5EF4-FFF2-40B4-BE49-F238E27FC236}">
-                <a16:creationId xmlns:a16="http://schemas.microsoft.com/office/drawing/2014/main" id="{B50147CF-DAA8-4BEB-A969-D6D9FECE042F}"/>
-              </a:ext>
-            </a:extLst>
-          </p:cNvPr>
-          <p:cNvSpPr>
-            <a:spLocks noGrp="1"/>
-          </p:cNvSpPr>
-          <p:nvPr>
-            <p:ph idx="1"/>
-          </p:nvPr>
-        </p:nvSpPr>
-        <p:spPr/>
-        <p:txBody>
-          <a:bodyPr>
-            <a:normAutofit/>
-          </a:bodyPr>
-          <a:lstStyle/>
-          <a:p>
-            <a:r>
-              <a:rPr lang="en-US" sz="3000" dirty="0"/>
-              <a:t>It takes </a:t>
-            </a:r>
-            <a:r>
-              <a:rPr lang="en-US" sz="3000" dirty="0" err="1"/>
-              <a:t>Jaci’s</a:t>
-            </a:r>
-            <a:r>
-              <a:rPr lang="en-US" sz="3000" dirty="0"/>
-              <a:t> units and translates them into your robot units.</a:t>
-            </a:r>
-          </a:p>
-          <a:p>
-            <a:r>
-              <a:rPr lang="en-US" sz="3000" dirty="0"/>
-              <a:t>Make a path that moves 2 feet.</a:t>
-            </a:r>
-          </a:p>
-          <a:p>
-            <a:r>
-              <a:rPr lang="en-US" sz="3000" dirty="0"/>
-              <a:t>Run that path on your robot, adjusting this const until your robot moves 2 feet.</a:t>
-            </a:r>
-          </a:p>
-          <a:p>
-            <a:pPr marL="0" indent="0">
-              <a:buNone/>
-            </a:pPr>
-            <a:endParaRPr lang="en-US" sz="3000" dirty="0"/>
-          </a:p>
-        </p:txBody>
-      </p:sp>
-      <p:sp>
-        <p:nvSpPr>
-          <p:cNvPr id="5" name="Footer Placeholder 4">
-            <a:extLst>
-              <a:ext uri="{FF2B5EF4-FFF2-40B4-BE49-F238E27FC236}">
-                <a16:creationId xmlns:a16="http://schemas.microsoft.com/office/drawing/2014/main" id="{371C134C-9F7D-4F5D-893E-14C6DB1B17A3}"/>
-              </a:ext>
-            </a:extLst>
-          </p:cNvPr>
-          <p:cNvSpPr>
-            <a:spLocks noGrp="1"/>
-          </p:cNvSpPr>
-          <p:nvPr>
-            <p:ph type="ftr" sz="quarter" idx="11"/>
-          </p:nvPr>
-        </p:nvSpPr>
-        <p:spPr>
-          <a:xfrm>
-            <a:off x="353291" y="6303818"/>
-            <a:ext cx="9081654" cy="374074"/>
-          </a:xfrm>
-        </p:spPr>
-        <p:txBody>
-          <a:bodyPr/>
-          <a:lstStyle/>
-          <a:p>
-            <a:r>
-              <a:rPr lang="en-US" sz="2400" dirty="0">
-                <a:solidFill>
-                  <a:schemeClr val="tx1"/>
-                </a:solidFill>
-              </a:rPr>
-              <a:t>https://github.com/JimWright4089/FIRSTWorkshops</a:t>
-            </a:r>
-          </a:p>
-        </p:txBody>
-      </p:sp>
-    </p:spTree>
-    <p:extLst>
-      <p:ext uri="{BB962C8B-B14F-4D97-AF65-F5344CB8AC3E}">
-        <p14:creationId xmlns:p14="http://schemas.microsoft.com/office/powerpoint/2010/main" val="1247019354"/>
-      </p:ext>
-    </p:extLst>
-  </p:cSld>
-  <p:clrMapOvr>
-    <a:masterClrMapping/>
-  </p:clrMapOvr>
-</p:sld>
-</file>
-
-<file path=ppt/slides/slide27.xml><?xml version="1.0" encoding="utf-8"?>
-<p:sld xmlns:a="http://schemas.openxmlformats.org/drawingml/2006/main" xmlns:r="http://schemas.openxmlformats.org/officeDocument/2006/relationships" xmlns:p="http://schemas.openxmlformats.org/presentationml/2006/main">
-  <p:cSld>
-    <p:spTree>
-      <p:nvGrpSpPr>
-        <p:cNvPr id="1" name=""/>
-        <p:cNvGrpSpPr/>
-        <p:nvPr/>
-      </p:nvGrpSpPr>
-      <p:grpSpPr>
-        <a:xfrm>
-          <a:off x="0" y="0"/>
-          <a:ext cx="0" cy="0"/>
-          <a:chOff x="0" y="0"/>
-          <a:chExt cx="0" cy="0"/>
-        </a:xfrm>
-      </p:grpSpPr>
-      <p:sp>
-        <p:nvSpPr>
-          <p:cNvPr id="2" name="Title 1">
-            <a:extLst>
-              <a:ext uri="{FF2B5EF4-FFF2-40B4-BE49-F238E27FC236}">
-                <a16:creationId xmlns:a16="http://schemas.microsoft.com/office/drawing/2014/main" id="{CC4A3FAA-0E02-4277-9A18-5E14BC20FA27}"/>
-              </a:ext>
-            </a:extLst>
-          </p:cNvPr>
-          <p:cNvSpPr>
-            <a:spLocks noGrp="1"/>
-          </p:cNvSpPr>
-          <p:nvPr>
-            <p:ph type="title"/>
-          </p:nvPr>
-        </p:nvSpPr>
-        <p:spPr/>
-        <p:txBody>
-          <a:bodyPr/>
-          <a:lstStyle/>
-          <a:p>
-            <a:r>
-              <a:rPr lang="en-US" dirty="0"/>
-              <a:t>Questions</a:t>
-            </a:r>
-          </a:p>
-        </p:txBody>
-      </p:sp>
-      <p:sp>
-        <p:nvSpPr>
-          <p:cNvPr id="3" name="Content Placeholder 2">
-            <a:extLst>
-              <a:ext uri="{FF2B5EF4-FFF2-40B4-BE49-F238E27FC236}">
-                <a16:creationId xmlns:a16="http://schemas.microsoft.com/office/drawing/2014/main" id="{B50147CF-DAA8-4BEB-A969-D6D9FECE042F}"/>
-              </a:ext>
-            </a:extLst>
-          </p:cNvPr>
-          <p:cNvSpPr>
-            <a:spLocks noGrp="1"/>
-          </p:cNvSpPr>
-          <p:nvPr>
-            <p:ph idx="1"/>
-          </p:nvPr>
-        </p:nvSpPr>
-        <p:spPr/>
-        <p:txBody>
-          <a:bodyPr>
-            <a:normAutofit/>
-          </a:bodyPr>
-          <a:lstStyle/>
-          <a:p>
-            <a:pPr marL="0" indent="0">
-              <a:buNone/>
-            </a:pPr>
-            <a:endParaRPr lang="en-US" sz="3000" dirty="0"/>
-          </a:p>
-        </p:txBody>
-      </p:sp>
-      <p:sp>
-        <p:nvSpPr>
-          <p:cNvPr id="5" name="Footer Placeholder 4">
-            <a:extLst>
-              <a:ext uri="{FF2B5EF4-FFF2-40B4-BE49-F238E27FC236}">
-                <a16:creationId xmlns:a16="http://schemas.microsoft.com/office/drawing/2014/main" id="{371C134C-9F7D-4F5D-893E-14C6DB1B17A3}"/>
-              </a:ext>
-            </a:extLst>
-          </p:cNvPr>
-          <p:cNvSpPr>
-            <a:spLocks noGrp="1"/>
-          </p:cNvSpPr>
-          <p:nvPr>
-            <p:ph type="ftr" sz="quarter" idx="11"/>
-          </p:nvPr>
-        </p:nvSpPr>
-        <p:spPr>
-          <a:xfrm>
-            <a:off x="353291" y="6303818"/>
-            <a:ext cx="9081654" cy="374074"/>
-          </a:xfrm>
-        </p:spPr>
-        <p:txBody>
-          <a:bodyPr/>
-          <a:lstStyle/>
-          <a:p>
-            <a:r>
-              <a:rPr lang="en-US" sz="2400" dirty="0">
-                <a:solidFill>
-                  <a:schemeClr val="tx1"/>
-                </a:solidFill>
-              </a:rPr>
-              <a:t>https://github.com/JimWright4089/FIRSTWorkshops</a:t>
-            </a:r>
-          </a:p>
-        </p:txBody>
-      </p:sp>
-      <p:sp>
-        <p:nvSpPr>
-          <p:cNvPr id="4" name="Rectangle 1">
-            <a:extLst>
-              <a:ext uri="{FF2B5EF4-FFF2-40B4-BE49-F238E27FC236}">
-                <a16:creationId xmlns:a16="http://schemas.microsoft.com/office/drawing/2014/main" id="{87129B67-A605-44B6-814D-6176EC8C3D96}"/>
-              </a:ext>
-            </a:extLst>
-          </p:cNvPr>
-          <p:cNvSpPr>
-            <a:spLocks noChangeArrowheads="1"/>
-          </p:cNvSpPr>
-          <p:nvPr/>
-        </p:nvSpPr>
-        <p:spPr bwMode="auto">
-          <a:xfrm>
-            <a:off x="0" y="0"/>
-            <a:ext cx="12192000" cy="457200"/>
-          </a:xfrm>
-          <a:prstGeom prst="rect">
-            <a:avLst/>
-          </a:prstGeom>
-          <a:solidFill>
-            <a:srgbClr val="FFFFFF"/>
-          </a:solidFill>
-          <a:ln>
-            <a:noFill/>
-          </a:ln>
-          <a:effectLst/>
-          <a:extLst>
-            <a:ext uri="{91240B29-F687-4F45-9708-019B960494DF}">
-              <a14:hiddenLine xmlns:a14="http://schemas.microsoft.com/office/drawing/2010/main" w="9525">
-                <a:solidFill>
-                  <a:schemeClr val="tx1"/>
-                </a:solidFill>
-                <a:miter lim="800000"/>
-                <a:headEnd/>
-                <a:tailEnd/>
-              </a14:hiddenLine>
-            </a:ext>
-            <a:ext uri="{AF507438-7753-43E0-B8FC-AC1667EBCBE1}">
-              <a14:hiddenEffects xmlns:a14="http://schemas.microsoft.com/office/drawing/2010/main">
-                <a:effectLst>
-                  <a:outerShdw dist="35921" dir="2700000" algn="ctr" rotWithShape="0">
-                    <a:schemeClr val="bg2"/>
-                  </a:outerShdw>
-                </a:effectLst>
-              </a14:hiddenEffects>
-            </a:ext>
-          </a:extLst>
-        </p:spPr>
-        <p:txBody>
-          <a:bodyPr vert="horz" wrap="none" lIns="91440" tIns="45720" rIns="91440" bIns="45720" numCol="1" anchor="ctr" anchorCtr="0" compatLnSpc="1">
-            <a:prstTxWarp prst="textNoShape">
-              <a:avLst/>
-            </a:prstTxWarp>
-            <a:spAutoFit/>
-          </a:bodyPr>
-          <a:lstStyle/>
-          <a:p>
-            <a:pPr marL="0" marR="0" lvl="0" indent="0" algn="l" defTabSz="914400" rtl="0" eaLnBrk="0" fontAlgn="base" latinLnBrk="0" hangingPunct="0">
-              <a:lnSpc>
-                <a:spcPct val="100000"/>
-              </a:lnSpc>
-              <a:spcBef>
-                <a:spcPct val="0"/>
-              </a:spcBef>
-              <a:spcAft>
-                <a:spcPct val="0"/>
-              </a:spcAft>
-              <a:buClrTx/>
-              <a:buSzTx/>
-              <a:buFontTx/>
-              <a:buNone/>
-              <a:tabLst/>
-            </a:pPr>
-            <a:r>
-              <a:rPr kumimoji="0" lang="en-US" altLang="en-US" sz="1200" b="0" i="0" u="none" strike="noStrike" cap="none" normalizeH="0" baseline="0">
-                <a:ln>
-                  <a:noFill/>
-                </a:ln>
-                <a:solidFill>
-                  <a:srgbClr val="000000"/>
-                </a:solidFill>
-                <a:effectLst/>
-                <a:latin typeface="Source Code Pro" panose="020B0509030403020204" pitchFamily="49" charset="0"/>
-              </a:rPr>
-              <a:t>DrivePathAction</a:t>
-            </a:r>
-            <a:endParaRPr kumimoji="0" lang="en-US" altLang="en-US" sz="1800" b="0" i="0" u="none" strike="noStrike" cap="none" normalizeH="0" baseline="0">
-              <a:ln>
-                <a:noFill/>
-              </a:ln>
-              <a:solidFill>
-                <a:schemeClr val="tx1"/>
-              </a:solidFill>
-              <a:effectLst/>
-              <a:latin typeface="Arial" panose="020B0604020202020204" pitchFamily="34" charset="0"/>
-            </a:endParaRPr>
-          </a:p>
-        </p:txBody>
-      </p:sp>
-    </p:spTree>
-    <p:extLst>
-      <p:ext uri="{BB962C8B-B14F-4D97-AF65-F5344CB8AC3E}">
-        <p14:creationId xmlns:p14="http://schemas.microsoft.com/office/powerpoint/2010/main" val="2282294600"/>
       </p:ext>
     </p:extLst>
   </p:cSld>
@@ -17999,7 +14270,7 @@
         <p:spPr/>
         <p:txBody>
           <a:bodyPr>
-            <a:normAutofit fontScale="92500"/>
+            <a:normAutofit fontScale="92500" lnSpcReduction="20000"/>
           </a:bodyPr>
           <a:lstStyle/>
           <a:p>
@@ -18014,21 +14285,17 @@
           </a:p>
           <a:p>
             <a:r>
-              <a:rPr lang="en-US" sz="3200">
+              <a:rPr lang="en-US" sz="3200" dirty="0">
                 <a:hlinkClick r:id="rId2"/>
               </a:rPr>
               <a:t>https://github.com/FIRST-Tech-Challenge/FtcRobotController</a:t>
             </a:r>
-            <a:endParaRPr lang="en-US" sz="3200"/>
-          </a:p>
-          <a:p>
-            <a:r>
-              <a:rPr lang="en-US" sz="3200"/>
-              <a:t>You </a:t>
-            </a:r>
+            <a:endParaRPr lang="en-US" sz="3200" dirty="0"/>
+          </a:p>
+          <a:p>
             <a:r>
               <a:rPr lang="en-US" sz="3200" dirty="0"/>
-              <a:t>can download and use it from </a:t>
+              <a:t>You can download and use it from </a:t>
             </a:r>
             <a:r>
               <a:rPr lang="en-US" sz="3200" dirty="0" err="1"/>
@@ -18050,7 +14317,13 @@
             </a:r>
             <a:r>
               <a:rPr lang="en-US" sz="3200" dirty="0"/>
-              <a:t> project.  This lets your team check in code,</a:t>
+              <a:t> project.  This lets your team check in code.</a:t>
+            </a:r>
+          </a:p>
+          <a:p>
+            <a:r>
+              <a:rPr lang="en-US" sz="3200" dirty="0"/>
+              <a:t>Clone this project onto your hard drive.</a:t>
             </a:r>
           </a:p>
           <a:p>
@@ -18148,7 +14421,7 @@
           <a:p>
             <a:r>
               <a:rPr lang="en-US" dirty="0"/>
-              <a:t>Gyro</a:t>
+              <a:t>FTC Project </a:t>
             </a:r>
           </a:p>
         </p:txBody>
@@ -18169,37 +14442,45 @@
             <p:ph idx="1"/>
           </p:nvPr>
         </p:nvSpPr>
-        <p:spPr/>
+        <p:spPr>
+          <a:xfrm>
+            <a:off x="1154955" y="2603500"/>
+            <a:ext cx="6841564" cy="3416300"/>
+          </a:xfrm>
+        </p:spPr>
         <p:txBody>
           <a:bodyPr>
-            <a:normAutofit/>
+            <a:normAutofit fontScale="92500"/>
           </a:bodyPr>
           <a:lstStyle/>
           <a:p>
             <a:r>
               <a:rPr lang="en-US" sz="3200" dirty="0"/>
-              <a:t>The gyro on the Rev Expansion Hub is a BNO055IMU.  It’s Adafruit’s gyro.</a:t>
+              <a:t>In Android Studio choose open.</a:t>
             </a:r>
           </a:p>
           <a:p>
             <a:r>
               <a:rPr lang="en-US" sz="3200" dirty="0"/>
-              <a:t>Other gyro major gyro is MPU-9250, it’s </a:t>
+              <a:t>Find the cloned project, it will have a little </a:t>
             </a:r>
             <a:r>
               <a:rPr lang="en-US" sz="3200" dirty="0" err="1"/>
-              <a:t>Sparkfun’s</a:t>
+              <a:t>Andriod</a:t>
             </a:r>
             <a:r>
               <a:rPr lang="en-US" sz="3200" dirty="0"/>
-              <a:t> gyro.</a:t>
+              <a:t> symbol on it.</a:t>
             </a:r>
           </a:p>
           <a:p>
             <a:r>
               <a:rPr lang="en-US" sz="3200" dirty="0"/>
-              <a:t>There are trade off.  The biggest pro for the BNO is, the code is already written.</a:t>
-            </a:r>
+              <a:t>It will take a while, to get the code and all of the libraries loaded the first time. </a:t>
+            </a:r>
+          </a:p>
+          <a:p>
+            <a:endParaRPr lang="en-US" sz="3200" dirty="0"/>
           </a:p>
         </p:txBody>
       </p:sp>
@@ -18208,7 +14489,7 @@
           <p:cNvPr id="5" name="Footer Placeholder 4">
             <a:extLst>
               <a:ext uri="{FF2B5EF4-FFF2-40B4-BE49-F238E27FC236}">
-                <a16:creationId xmlns:a16="http://schemas.microsoft.com/office/drawing/2014/main" id="{82484588-9CFE-4A0D-93C3-72A99A666C57}"/>
+                <a16:creationId xmlns:a16="http://schemas.microsoft.com/office/drawing/2014/main" id="{EC952921-544E-4F77-8675-F6260F7DB676}"/>
               </a:ext>
             </a:extLst>
           </p:cNvPr>
@@ -18221,7 +14502,7 @@
         </p:nvSpPr>
         <p:spPr>
           <a:xfrm>
-            <a:off x="200892" y="6262255"/>
+            <a:off x="145474" y="6359237"/>
             <a:ext cx="9081654" cy="374074"/>
           </a:xfrm>
         </p:spPr>
@@ -18240,10 +14521,40 @@
           </a:p>
         </p:txBody>
       </p:sp>
+      <p:pic>
+        <p:nvPicPr>
+          <p:cNvPr id="8" name="Picture 7" descr="Graphical user interface, application, Teams&#10;&#10;Description automatically generated">
+            <a:extLst>
+              <a:ext uri="{FF2B5EF4-FFF2-40B4-BE49-F238E27FC236}">
+                <a16:creationId xmlns:a16="http://schemas.microsoft.com/office/drawing/2014/main" id="{18DFB24C-9C2C-1D56-E65C-14AA23E594FD}"/>
+              </a:ext>
+            </a:extLst>
+          </p:cNvPr>
+          <p:cNvPicPr>
+            <a:picLocks noChangeAspect="1"/>
+          </p:cNvPicPr>
+          <p:nvPr/>
+        </p:nvPicPr>
+        <p:blipFill>
+          <a:blip r:embed="rId2"/>
+          <a:stretch>
+            <a:fillRect/>
+          </a:stretch>
+        </p:blipFill>
+        <p:spPr>
+          <a:xfrm>
+            <a:off x="8083410" y="2744701"/>
+            <a:ext cx="3665913" cy="3133898"/>
+          </a:xfrm>
+          <a:prstGeom prst="rect">
+            <a:avLst/>
+          </a:prstGeom>
+        </p:spPr>
+      </p:pic>
     </p:spTree>
     <p:extLst>
       <p:ext uri="{BB962C8B-B14F-4D97-AF65-F5344CB8AC3E}">
-        <p14:creationId xmlns:p14="http://schemas.microsoft.com/office/powerpoint/2010/main" val="3606440120"/>
+        <p14:creationId xmlns:p14="http://schemas.microsoft.com/office/powerpoint/2010/main" val="3484894759"/>
       </p:ext>
     </p:extLst>
   </p:cSld>
@@ -18293,7 +14604,7 @@
           <a:p>
             <a:r>
               <a:rPr lang="en-US" dirty="0"/>
-              <a:t>Gyro Setup</a:t>
+              <a:t>Your Code here! </a:t>
             </a:r>
           </a:p>
         </p:txBody>
@@ -18314,110 +14625,34 @@
             <p:ph idx="1"/>
           </p:nvPr>
         </p:nvSpPr>
-        <p:spPr/>
+        <p:spPr>
+          <a:xfrm>
+            <a:off x="1154955" y="2603500"/>
+            <a:ext cx="6841564" cy="3416300"/>
+          </a:xfrm>
+        </p:spPr>
         <p:txBody>
           <a:bodyPr>
-            <a:normAutofit fontScale="62500" lnSpcReduction="20000"/>
+            <a:normAutofit/>
           </a:bodyPr>
           <a:lstStyle/>
           <a:p>
-            <a:pPr marL="0" indent="0">
-              <a:buNone/>
-            </a:pPr>
             <a:r>
               <a:rPr lang="en-US" sz="3200" dirty="0"/>
-              <a:t>BNO055IMU.Parameters parameters = new BNO055IMU.Parameters();       </a:t>
-            </a:r>
-          </a:p>
-          <a:p>
-            <a:pPr marL="0" indent="0">
-              <a:buNone/>
-            </a:pPr>
-            <a:r>
-              <a:rPr lang="en-US" sz="3200" dirty="0" err="1"/>
-              <a:t>parameters.angleUnit</a:t>
-            </a:r>
+              <a:t>Once everything is loaded, the explorer will be on the left.</a:t>
+            </a:r>
+          </a:p>
+          <a:p>
             <a:r>
               <a:rPr lang="en-US" sz="3200" dirty="0"/>
-              <a:t> = BNO055IMU.AngleUnit.DEGREES;       </a:t>
-            </a:r>
-          </a:p>
-          <a:p>
-            <a:pPr marL="0" indent="0">
-              <a:buNone/>
-            </a:pPr>
-            <a:r>
-              <a:rPr lang="en-US" sz="3200" dirty="0"/>
-              <a:t> </a:t>
-            </a:r>
-            <a:r>
-              <a:rPr lang="en-US" sz="3200" dirty="0" err="1"/>
-              <a:t>parameters.accelUnit</a:t>
-            </a:r>
-            <a:r>
-              <a:rPr lang="en-US" sz="3200" dirty="0"/>
-              <a:t>=BNO055IMU.AccelUnit.METERS_PERSEC_PERSEC;       </a:t>
-            </a:r>
-          </a:p>
-          <a:p>
-            <a:pPr marL="0" indent="0">
-              <a:buNone/>
-            </a:pPr>
-            <a:r>
-              <a:rPr lang="en-US" sz="3200" dirty="0" err="1"/>
-              <a:t>parameters.calibrationDataFile</a:t>
-            </a:r>
-            <a:r>
-              <a:rPr lang="en-US" sz="3200" dirty="0"/>
-              <a:t> = "BNO055IMUCalibration.json";       </a:t>
-            </a:r>
-          </a:p>
-          <a:p>
-            <a:pPr marL="0" indent="0">
-              <a:buNone/>
-            </a:pPr>
-            <a:r>
-              <a:rPr lang="en-US" sz="3200" dirty="0" err="1"/>
-              <a:t>parameters.loggingEnabled</a:t>
-            </a:r>
-            <a:r>
-              <a:rPr lang="en-US" sz="3200" dirty="0"/>
-              <a:t>      = true;        </a:t>
-            </a:r>
-          </a:p>
-          <a:p>
-            <a:pPr marL="0" indent="0">
-              <a:buNone/>
-            </a:pPr>
-            <a:r>
-              <a:rPr lang="en-US" sz="3200" dirty="0" err="1"/>
-              <a:t>parameters.loggingTag</a:t>
-            </a:r>
-            <a:r>
-              <a:rPr lang="en-US" sz="3200" dirty="0"/>
-              <a:t>          = "IMU";   </a:t>
-            </a:r>
-          </a:p>
-          <a:p>
-            <a:pPr marL="0" indent="0">
-              <a:buNone/>
-            </a:pPr>
-            <a:r>
-              <a:rPr lang="en-US" sz="3200" dirty="0" err="1"/>
-              <a:t>parameters.accelerationIntegrationAlgorithm</a:t>
-            </a:r>
-            <a:r>
-              <a:rPr lang="en-US" sz="3200" dirty="0"/>
-              <a:t> = new </a:t>
-            </a:r>
-            <a:r>
-              <a:rPr lang="en-US" sz="3200" dirty="0" err="1"/>
-              <a:t>JustLoggingAccelerationIntegrator</a:t>
-            </a:r>
-            <a:r>
-              <a:rPr lang="en-US" sz="3200" dirty="0"/>
-              <a:t>();  </a:t>
-            </a:r>
+              <a:t>Open up the Team Code directory.</a:t>
+            </a:r>
+          </a:p>
+          <a:p>
+            <a:endParaRPr lang="en-US" sz="3200" dirty="0"/>
+          </a:p>
+          <a:p>
+            <a:endParaRPr lang="en-US" sz="3200" dirty="0"/>
           </a:p>
         </p:txBody>
       </p:sp>
@@ -18426,7 +14661,7 @@
           <p:cNvPr id="5" name="Footer Placeholder 4">
             <a:extLst>
               <a:ext uri="{FF2B5EF4-FFF2-40B4-BE49-F238E27FC236}">
-                <a16:creationId xmlns:a16="http://schemas.microsoft.com/office/drawing/2014/main" id="{82484588-9CFE-4A0D-93C3-72A99A666C57}"/>
+                <a16:creationId xmlns:a16="http://schemas.microsoft.com/office/drawing/2014/main" id="{EC952921-544E-4F77-8675-F6260F7DB676}"/>
               </a:ext>
             </a:extLst>
           </p:cNvPr>
@@ -18439,7 +14674,7 @@
         </p:nvSpPr>
         <p:spPr>
           <a:xfrm>
-            <a:off x="200892" y="6262255"/>
+            <a:off x="145474" y="6359237"/>
             <a:ext cx="9081654" cy="374074"/>
           </a:xfrm>
         </p:spPr>
@@ -18458,10 +14693,40 @@
           </a:p>
         </p:txBody>
       </p:sp>
+      <p:pic>
+        <p:nvPicPr>
+          <p:cNvPr id="6" name="Picture 5" descr="Graphical user interface, text&#10;&#10;Description automatically generated">
+            <a:extLst>
+              <a:ext uri="{FF2B5EF4-FFF2-40B4-BE49-F238E27FC236}">
+                <a16:creationId xmlns:a16="http://schemas.microsoft.com/office/drawing/2014/main" id="{B99EF704-2624-4731-0FB1-E35C8C364C25}"/>
+              </a:ext>
+            </a:extLst>
+          </p:cNvPr>
+          <p:cNvPicPr>
+            <a:picLocks noChangeAspect="1"/>
+          </p:cNvPicPr>
+          <p:nvPr/>
+        </p:nvPicPr>
+        <p:blipFill>
+          <a:blip r:embed="rId2"/>
+          <a:stretch>
+            <a:fillRect/>
+          </a:stretch>
+        </p:blipFill>
+        <p:spPr>
+          <a:xfrm>
+            <a:off x="7996519" y="2590053"/>
+            <a:ext cx="3350029" cy="3067396"/>
+          </a:xfrm>
+          <a:prstGeom prst="rect">
+            <a:avLst/>
+          </a:prstGeom>
+        </p:spPr>
+      </p:pic>
     </p:spTree>
     <p:extLst>
       <p:ext uri="{BB962C8B-B14F-4D97-AF65-F5344CB8AC3E}">
-        <p14:creationId xmlns:p14="http://schemas.microsoft.com/office/powerpoint/2010/main" val="3410826976"/>
+        <p14:creationId xmlns:p14="http://schemas.microsoft.com/office/powerpoint/2010/main" val="4204400113"/>
       </p:ext>
     </p:extLst>
   </p:cSld>
@@ -18511,7 +14776,7 @@
           <a:p>
             <a:r>
               <a:rPr lang="en-US" dirty="0"/>
-              <a:t>Gyro Setup</a:t>
+              <a:t>Samples</a:t>
             </a:r>
           </a:p>
         </p:txBody>
@@ -18532,66 +14797,33 @@
             <p:ph idx="1"/>
           </p:nvPr>
         </p:nvSpPr>
-        <p:spPr/>
+        <p:spPr>
+          <a:xfrm>
+            <a:off x="1154955" y="2603500"/>
+            <a:ext cx="6841564" cy="3416300"/>
+          </a:xfrm>
+        </p:spPr>
         <p:txBody>
           <a:bodyPr>
             <a:normAutofit/>
           </a:bodyPr>
           <a:lstStyle/>
           <a:p>
-            <a:pPr marL="0" indent="0">
-              <a:buNone/>
-            </a:pPr>
-            <a:r>
-              <a:rPr lang="en-US" sz="3200" dirty="0" err="1"/>
-              <a:t>imu</a:t>
-            </a:r>
             <a:r>
               <a:rPr lang="en-US" sz="3200" dirty="0"/>
-              <a:t> = </a:t>
-            </a:r>
-            <a:r>
-              <a:rPr lang="en-US" sz="3200" dirty="0" err="1"/>
-              <a:t>hardwareMap.get</a:t>
-            </a:r>
-            <a:r>
-              <a:rPr lang="en-US" sz="3200" dirty="0"/>
-              <a:t>(BNO055IMU.class, "</a:t>
-            </a:r>
-            <a:r>
-              <a:rPr lang="en-US" sz="3200" dirty="0" err="1"/>
-              <a:t>imu</a:t>
-            </a:r>
-            <a:r>
-              <a:rPr lang="en-US" sz="3200" dirty="0"/>
-              <a:t>");        </a:t>
-            </a:r>
-          </a:p>
-          <a:p>
-            <a:pPr marL="0" indent="0">
-              <a:buNone/>
-            </a:pPr>
-            <a:r>
-              <a:rPr lang="en-US" sz="3200" dirty="0" err="1"/>
-              <a:t>imu.initialize</a:t>
-            </a:r>
-            <a:r>
-              <a:rPr lang="en-US" sz="3200" dirty="0"/>
-              <a:t>(parameters);</a:t>
-            </a:r>
-          </a:p>
-          <a:p>
-            <a:pPr marL="0" indent="0">
-              <a:buNone/>
-            </a:pPr>
-            <a:r>
-              <a:rPr lang="en-US" sz="3200" dirty="0" err="1"/>
-              <a:t>imu.startAccelerationIntegration</a:t>
-            </a:r>
-            <a:r>
-              <a:rPr lang="en-US" sz="3200" dirty="0"/>
-              <a:t>(new Position(), new Velocity(), 1000);</a:t>
-            </a:r>
+              <a:t>In the example folder there are, well, examples of code.  Copy those to </a:t>
+            </a:r>
+            <a:r>
+              <a:rPr lang="en-US" sz="3200"/>
+              <a:t>your Team code.</a:t>
+            </a:r>
+            <a:endParaRPr lang="en-US" sz="3200" dirty="0"/>
+          </a:p>
+          <a:p>
+            <a:endParaRPr lang="en-US" sz="3200" dirty="0"/>
+          </a:p>
+          <a:p>
+            <a:endParaRPr lang="en-US" sz="3200" dirty="0"/>
           </a:p>
         </p:txBody>
       </p:sp>
@@ -18600,7 +14832,7 @@
           <p:cNvPr id="5" name="Footer Placeholder 4">
             <a:extLst>
               <a:ext uri="{FF2B5EF4-FFF2-40B4-BE49-F238E27FC236}">
-                <a16:creationId xmlns:a16="http://schemas.microsoft.com/office/drawing/2014/main" id="{82484588-9CFE-4A0D-93C3-72A99A666C57}"/>
+                <a16:creationId xmlns:a16="http://schemas.microsoft.com/office/drawing/2014/main" id="{EC952921-544E-4F77-8675-F6260F7DB676}"/>
               </a:ext>
             </a:extLst>
           </p:cNvPr>
@@ -18613,7 +14845,7 @@
         </p:nvSpPr>
         <p:spPr>
           <a:xfrm>
-            <a:off x="200892" y="6262255"/>
+            <a:off x="145474" y="6359237"/>
             <a:ext cx="9081654" cy="374074"/>
           </a:xfrm>
         </p:spPr>
@@ -18632,227 +14864,40 @@
           </a:p>
         </p:txBody>
       </p:sp>
+      <p:pic>
+        <p:nvPicPr>
+          <p:cNvPr id="7" name="Picture 6" descr="Text&#10;&#10;Description automatically generated with medium confidence">
+            <a:extLst>
+              <a:ext uri="{FF2B5EF4-FFF2-40B4-BE49-F238E27FC236}">
+                <a16:creationId xmlns:a16="http://schemas.microsoft.com/office/drawing/2014/main" id="{10A4FE45-2D8D-8073-9483-EEFD7EC87C4E}"/>
+              </a:ext>
+            </a:extLst>
+          </p:cNvPr>
+          <p:cNvPicPr>
+            <a:picLocks noChangeAspect="1"/>
+          </p:cNvPicPr>
+          <p:nvPr/>
+        </p:nvPicPr>
+        <p:blipFill>
+          <a:blip r:embed="rId2"/>
+          <a:stretch>
+            <a:fillRect/>
+          </a:stretch>
+        </p:blipFill>
+        <p:spPr>
+          <a:xfrm>
+            <a:off x="8147043" y="2599018"/>
+            <a:ext cx="3266902" cy="3117273"/>
+          </a:xfrm>
+          <a:prstGeom prst="rect">
+            <a:avLst/>
+          </a:prstGeom>
+        </p:spPr>
+      </p:pic>
     </p:spTree>
     <p:extLst>
       <p:ext uri="{BB962C8B-B14F-4D97-AF65-F5344CB8AC3E}">
-        <p14:creationId xmlns:p14="http://schemas.microsoft.com/office/powerpoint/2010/main" val="4146518602"/>
-      </p:ext>
-    </p:extLst>
-  </p:cSld>
-  <p:clrMapOvr>
-    <a:masterClrMapping/>
-  </p:clrMapOvr>
-</p:sld>
-</file>
-
-<file path=ppt/slides/slide9.xml><?xml version="1.0" encoding="utf-8"?>
-<p:sld xmlns:a="http://schemas.openxmlformats.org/drawingml/2006/main" xmlns:r="http://schemas.openxmlformats.org/officeDocument/2006/relationships" xmlns:p="http://schemas.openxmlformats.org/presentationml/2006/main">
-  <p:cSld>
-    <p:spTree>
-      <p:nvGrpSpPr>
-        <p:cNvPr id="1" name=""/>
-        <p:cNvGrpSpPr/>
-        <p:nvPr/>
-      </p:nvGrpSpPr>
-      <p:grpSpPr>
-        <a:xfrm>
-          <a:off x="0" y="0"/>
-          <a:ext cx="0" cy="0"/>
-          <a:chOff x="0" y="0"/>
-          <a:chExt cx="0" cy="0"/>
-        </a:xfrm>
-      </p:grpSpPr>
-      <p:sp>
-        <p:nvSpPr>
-          <p:cNvPr id="2" name="Title 1">
-            <a:extLst>
-              <a:ext uri="{FF2B5EF4-FFF2-40B4-BE49-F238E27FC236}">
-                <a16:creationId xmlns:a16="http://schemas.microsoft.com/office/drawing/2014/main" id="{CC4A3FAA-0E02-4277-9A18-5E14BC20FA27}"/>
-              </a:ext>
-            </a:extLst>
-          </p:cNvPr>
-          <p:cNvSpPr>
-            <a:spLocks noGrp="1"/>
-          </p:cNvSpPr>
-          <p:nvPr>
-            <p:ph type="title"/>
-          </p:nvPr>
-        </p:nvSpPr>
-        <p:spPr/>
-        <p:txBody>
-          <a:bodyPr/>
-          <a:lstStyle/>
-          <a:p>
-            <a:r>
-              <a:rPr lang="en-US" dirty="0"/>
-              <a:t>Gyro get data</a:t>
-            </a:r>
-          </a:p>
-        </p:txBody>
-      </p:sp>
-      <p:sp>
-        <p:nvSpPr>
-          <p:cNvPr id="3" name="Content Placeholder 2">
-            <a:extLst>
-              <a:ext uri="{FF2B5EF4-FFF2-40B4-BE49-F238E27FC236}">
-                <a16:creationId xmlns:a16="http://schemas.microsoft.com/office/drawing/2014/main" id="{B50147CF-DAA8-4BEB-A969-D6D9FECE042F}"/>
-              </a:ext>
-            </a:extLst>
-          </p:cNvPr>
-          <p:cNvSpPr>
-            <a:spLocks noGrp="1"/>
-          </p:cNvSpPr>
-          <p:nvPr>
-            <p:ph idx="1"/>
-          </p:nvPr>
-        </p:nvSpPr>
-        <p:spPr/>
-        <p:txBody>
-          <a:bodyPr>
-            <a:normAutofit fontScale="70000" lnSpcReduction="20000"/>
-          </a:bodyPr>
-          <a:lstStyle/>
-          <a:p>
-            <a:pPr marL="0" indent="0">
-              <a:buNone/>
-            </a:pPr>
-            <a:r>
-              <a:rPr lang="en-US" sz="3200" dirty="0" err="1"/>
-              <a:t>telemetry.addAction</a:t>
-            </a:r>
-            <a:r>
-              <a:rPr lang="en-US" sz="3200" dirty="0"/>
-              <a:t>(new Runnable() </a:t>
-            </a:r>
-          </a:p>
-          <a:p>
-            <a:pPr marL="0" indent="0">
-              <a:buNone/>
-            </a:pPr>
-            <a:r>
-              <a:rPr lang="en-US" sz="3200" dirty="0"/>
-              <a:t>{	@Override public void run()</a:t>
-            </a:r>
-          </a:p>
-          <a:p>
-            <a:pPr marL="0" indent="0">
-              <a:buNone/>
-            </a:pPr>
-            <a:r>
-              <a:rPr lang="en-US" sz="3200" dirty="0"/>
-              <a:t>  {	</a:t>
-            </a:r>
-          </a:p>
-          <a:p>
-            <a:pPr marL="0" indent="0">
-              <a:buNone/>
-            </a:pPr>
-            <a:r>
-              <a:rPr lang="en-US" sz="3200" dirty="0"/>
-              <a:t>	angles   = </a:t>
-            </a:r>
-            <a:r>
-              <a:rPr lang="en-US" sz="3200" dirty="0" err="1"/>
-              <a:t>imu.getAngularOrientation</a:t>
-            </a:r>
-            <a:r>
-              <a:rPr lang="en-US" sz="3200" dirty="0"/>
-              <a:t>(</a:t>
-            </a:r>
-            <a:r>
-              <a:rPr lang="en-US" sz="3200" dirty="0" err="1"/>
-              <a:t>AxesReference.INTRINSIC</a:t>
-            </a:r>
-            <a:r>
-              <a:rPr lang="en-US" sz="3200" dirty="0"/>
-              <a:t>, </a:t>
-            </a:r>
-            <a:r>
-              <a:rPr lang="en-US" sz="3200" dirty="0" err="1"/>
-              <a:t>AxesOrder.ZYX</a:t>
-            </a:r>
-            <a:r>
-              <a:rPr lang="en-US" sz="3200" dirty="0"/>
-              <a:t>, </a:t>
-            </a:r>
-            <a:r>
-              <a:rPr lang="en-US" sz="3200" dirty="0" err="1"/>
-              <a:t>AngleUnit.DEGREES</a:t>
-            </a:r>
-            <a:r>
-              <a:rPr lang="en-US" sz="3200" dirty="0"/>
-              <a:t>);                gravity  = </a:t>
-            </a:r>
-            <a:r>
-              <a:rPr lang="en-US" sz="3200" dirty="0" err="1"/>
-              <a:t>imu.getGravity</a:t>
-            </a:r>
-            <a:r>
-              <a:rPr lang="en-US" sz="3200" dirty="0"/>
-              <a:t>();                </a:t>
-            </a:r>
-          </a:p>
-          <a:p>
-            <a:pPr marL="0" indent="0">
-              <a:buNone/>
-            </a:pPr>
-            <a:r>
-              <a:rPr lang="en-US" sz="3200" dirty="0"/>
-              <a:t>  }            </a:t>
-            </a:r>
-          </a:p>
-          <a:p>
-            <a:pPr marL="0" indent="0">
-              <a:buNone/>
-            </a:pPr>
-            <a:r>
-              <a:rPr lang="en-US" sz="3200" dirty="0"/>
-              <a:t>});</a:t>
-            </a:r>
-          </a:p>
-        </p:txBody>
-      </p:sp>
-      <p:sp>
-        <p:nvSpPr>
-          <p:cNvPr id="5" name="Footer Placeholder 4">
-            <a:extLst>
-              <a:ext uri="{FF2B5EF4-FFF2-40B4-BE49-F238E27FC236}">
-                <a16:creationId xmlns:a16="http://schemas.microsoft.com/office/drawing/2014/main" id="{82484588-9CFE-4A0D-93C3-72A99A666C57}"/>
-              </a:ext>
-            </a:extLst>
-          </p:cNvPr>
-          <p:cNvSpPr>
-            <a:spLocks noGrp="1"/>
-          </p:cNvSpPr>
-          <p:nvPr>
-            <p:ph type="ftr" sz="quarter" idx="11"/>
-          </p:nvPr>
-        </p:nvSpPr>
-        <p:spPr>
-          <a:xfrm>
-            <a:off x="200892" y="6262255"/>
-            <a:ext cx="9081654" cy="374074"/>
-          </a:xfrm>
-        </p:spPr>
-        <p:txBody>
-          <a:bodyPr/>
-          <a:lstStyle/>
-          <a:p>
-            <a:r>
-              <a:rPr lang="en-US" sz="2400" dirty="0">
-                <a:solidFill>
-                  <a:schemeClr val="tx1"/>
-                </a:solidFill>
-              </a:rPr>
-              <a:t>https://github.com/JimWright4089/FIRSTWorkshops</a:t>
-            </a:r>
-          </a:p>
-        </p:txBody>
-      </p:sp>
-    </p:spTree>
-    <p:extLst>
-      <p:ext uri="{BB962C8B-B14F-4D97-AF65-F5344CB8AC3E}">
-        <p14:creationId xmlns:p14="http://schemas.microsoft.com/office/powerpoint/2010/main" val="2810293477"/>
+        <p14:creationId xmlns:p14="http://schemas.microsoft.com/office/powerpoint/2010/main" val="2523055091"/>
       </p:ext>
     </p:extLst>
   </p:cSld>

</xml_diff>

<commit_message>
Finish the Advanced slides
</commit_message>
<xml_diff>
--- a/FTC/2022/Advanced FTC Code.pptx
+++ b/FTC/2022/Advanced FTC Code.pptx
@@ -5,7 +5,7 @@
     <p:sldMasterId id="2147483648" r:id="rId1"/>
   </p:sldMasterIdLst>
   <p:notesMasterIdLst>
-    <p:notesMasterId r:id="rId11"/>
+    <p:notesMasterId r:id="rId21"/>
   </p:notesMasterIdLst>
   <p:sldIdLst>
     <p:sldId id="256" r:id="rId2"/>
@@ -17,6 +17,16 @@
     <p:sldId id="294" r:id="rId8"/>
     <p:sldId id="295" r:id="rId9"/>
     <p:sldId id="296" r:id="rId10"/>
+    <p:sldId id="297" r:id="rId11"/>
+    <p:sldId id="298" r:id="rId12"/>
+    <p:sldId id="299" r:id="rId13"/>
+    <p:sldId id="300" r:id="rId14"/>
+    <p:sldId id="301" r:id="rId15"/>
+    <p:sldId id="302" r:id="rId16"/>
+    <p:sldId id="303" r:id="rId17"/>
+    <p:sldId id="304" r:id="rId18"/>
+    <p:sldId id="305" r:id="rId19"/>
+    <p:sldId id="306" r:id="rId20"/>
   </p:sldIdLst>
   <p:sldSz cx="12192000" cy="6858000"/>
   <p:notesSz cx="6858000" cy="9144000"/>
@@ -205,7 +215,7 @@
           <a:p>
             <a:fld id="{911961E1-36B2-4545-A428-4604CE04AE58}" type="datetimeFigureOut">
               <a:rPr lang="en-US" smtClean="0"/>
-              <a:t>9/8/2022</a:t>
+              <a:t>9/9/2022</a:t>
             </a:fld>
             <a:endParaRPr lang="en-US"/>
           </a:p>
@@ -807,7 +817,7 @@
           <a:p>
             <a:fld id="{70143B14-6FD6-4C3F-B41D-D1B3BBC4FA41}" type="datetime1">
               <a:rPr lang="en-US" smtClean="0"/>
-              <a:t>9/8/2022</a:t>
+              <a:t>9/9/2022</a:t>
             </a:fld>
             <a:endParaRPr lang="en-US" dirty="0"/>
           </a:p>
@@ -1895,7 +1905,7 @@
           <a:p>
             <a:fld id="{2B3D5EFB-A2C5-49D5-83DC-90D30FB6350F}" type="datetime1">
               <a:rPr lang="en-US" smtClean="0"/>
-              <a:t>9/8/2022</a:t>
+              <a:t>9/9/2022</a:t>
             </a:fld>
             <a:endParaRPr lang="en-US" dirty="0"/>
           </a:p>
@@ -2875,7 +2885,7 @@
           <a:p>
             <a:fld id="{E58E18E1-6780-40CE-8A5F-0004DB02BD3D}" type="datetime1">
               <a:rPr lang="en-US" smtClean="0"/>
-              <a:t>9/8/2022</a:t>
+              <a:t>9/9/2022</a:t>
             </a:fld>
             <a:endParaRPr lang="en-US" dirty="0"/>
           </a:p>
@@ -4009,7 +4019,7 @@
           <a:p>
             <a:fld id="{AF6E6664-D1E6-4911-8A5C-DFA0FDC32B64}" type="datetime1">
               <a:rPr lang="en-US" smtClean="0"/>
-              <a:t>9/8/2022</a:t>
+              <a:t>9/9/2022</a:t>
             </a:fld>
             <a:endParaRPr lang="en-US" dirty="0"/>
           </a:p>
@@ -5042,7 +5052,7 @@
           <a:p>
             <a:fld id="{4938A52B-7BE6-46A0-AD7C-CEC9A349768E}" type="datetime1">
               <a:rPr lang="en-US" smtClean="0"/>
-              <a:t>9/8/2022</a:t>
+              <a:t>9/9/2022</a:t>
             </a:fld>
             <a:endParaRPr lang="en-US" dirty="0"/>
           </a:p>
@@ -5702,7 +5712,7 @@
           <a:p>
             <a:fld id="{BE4C9737-CE51-4F51-BABA-CAF573690BBB}" type="datetime1">
               <a:rPr lang="en-US" smtClean="0"/>
-              <a:t>9/8/2022</a:t>
+              <a:t>9/9/2022</a:t>
             </a:fld>
             <a:endParaRPr lang="en-US" dirty="0"/>
           </a:p>
@@ -6563,7 +6573,7 @@
           <a:p>
             <a:fld id="{A3749039-AD51-429C-B706-FC67C689CF3E}" type="datetime1">
               <a:rPr lang="en-US" smtClean="0"/>
-              <a:t>9/8/2022</a:t>
+              <a:t>9/9/2022</a:t>
             </a:fld>
             <a:endParaRPr lang="en-US" dirty="0"/>
           </a:p>
@@ -6753,7 +6763,7 @@
           <a:p>
             <a:fld id="{0A214581-BD7F-4B76-99F4-F78CC7335177}" type="datetime1">
               <a:rPr lang="en-US" smtClean="0"/>
-              <a:t>9/8/2022</a:t>
+              <a:t>9/9/2022</a:t>
             </a:fld>
             <a:endParaRPr lang="en-US" dirty="0"/>
           </a:p>
@@ -7725,7 +7735,7 @@
           <a:p>
             <a:fld id="{BA2D0570-9893-41B0-A739-7CC187D21629}" type="datetime1">
               <a:rPr lang="en-US" smtClean="0"/>
-              <a:t>9/8/2022</a:t>
+              <a:t>9/9/2022</a:t>
             </a:fld>
             <a:endParaRPr lang="en-US" dirty="0"/>
           </a:p>
@@ -7936,7 +7946,7 @@
           <a:p>
             <a:fld id="{092AE90E-617A-4487-96E2-AC54A68C24CC}" type="datetime1">
               <a:rPr lang="en-US" smtClean="0"/>
-              <a:t>9/8/2022</a:t>
+              <a:t>9/9/2022</a:t>
             </a:fld>
             <a:endParaRPr lang="en-US" dirty="0"/>
           </a:p>
@@ -8970,7 +8980,7 @@
           <a:p>
             <a:fld id="{AD59F5E3-52CF-40B3-971A-0177BE517F27}" type="datetime1">
               <a:rPr lang="en-US" smtClean="0"/>
-              <a:t>9/8/2022</a:t>
+              <a:t>9/9/2022</a:t>
             </a:fld>
             <a:endParaRPr lang="en-US" dirty="0"/>
           </a:p>
@@ -9242,7 +9252,7 @@
           <a:p>
             <a:fld id="{8E68928C-558B-4A91-AFD5-2440D4F890D6}" type="datetime1">
               <a:rPr lang="en-US" smtClean="0"/>
-              <a:t>9/8/2022</a:t>
+              <a:t>9/9/2022</a:t>
             </a:fld>
             <a:endParaRPr lang="en-US" dirty="0"/>
           </a:p>
@@ -9652,7 +9662,7 @@
           <a:p>
             <a:fld id="{ADB96B63-DB89-4BB8-A2A3-39E54310E666}" type="datetime1">
               <a:rPr lang="en-US" smtClean="0"/>
-              <a:t>9/8/2022</a:t>
+              <a:t>9/9/2022</a:t>
             </a:fld>
             <a:endParaRPr lang="en-US" dirty="0"/>
           </a:p>
@@ -9779,7 +9789,7 @@
           <a:p>
             <a:fld id="{B58A7B8E-B30A-437B-AE1A-A807AC72042F}" type="datetime1">
               <a:rPr lang="en-US" smtClean="0"/>
-              <a:t>9/8/2022</a:t>
+              <a:t>9/9/2022</a:t>
             </a:fld>
             <a:endParaRPr lang="en-US" dirty="0"/>
           </a:p>
@@ -9874,7 +9884,7 @@
           <a:p>
             <a:fld id="{4C2DFFE7-1D42-49A0-9E58-D6359F32F7C4}" type="datetime1">
               <a:rPr lang="en-US" smtClean="0"/>
-              <a:t>9/8/2022</a:t>
+              <a:t>9/9/2022</a:t>
             </a:fld>
             <a:endParaRPr lang="en-US" dirty="0"/>
           </a:p>
@@ -10955,7 +10965,7 @@
           <a:p>
             <a:fld id="{CF1F63B9-BD7C-4B4F-9081-EB50A19ABBEB}" type="datetime1">
               <a:rPr lang="en-US" smtClean="0"/>
-              <a:t>9/8/2022</a:t>
+              <a:t>9/9/2022</a:t>
             </a:fld>
             <a:endParaRPr lang="en-US" dirty="0"/>
           </a:p>
@@ -12063,7 +12073,7 @@
           <a:p>
             <a:fld id="{F66E1E34-30AA-4002-8333-378BFCACDCDA}" type="datetime1">
               <a:rPr lang="en-US" smtClean="0"/>
-              <a:t>9/8/2022</a:t>
+              <a:t>9/9/2022</a:t>
             </a:fld>
             <a:endParaRPr lang="en-US" dirty="0"/>
           </a:p>
@@ -13060,7 +13070,7 @@
           <a:p>
             <a:fld id="{79356669-9559-4BB2-8014-6E405E98D5F1}" type="datetime1">
               <a:rPr lang="en-US" smtClean="0"/>
-              <a:t>9/8/2022</a:t>
+              <a:t>9/9/2022</a:t>
             </a:fld>
             <a:endParaRPr lang="en-US" dirty="0"/>
           </a:p>
@@ -13747,6 +13757,1637 @@
     <p:extLst>
       <p:ext uri="{BB962C8B-B14F-4D97-AF65-F5344CB8AC3E}">
         <p14:creationId xmlns:p14="http://schemas.microsoft.com/office/powerpoint/2010/main" val="2876675954"/>
+      </p:ext>
+    </p:extLst>
+  </p:cSld>
+  <p:clrMapOvr>
+    <a:masterClrMapping/>
+  </p:clrMapOvr>
+</p:sld>
+</file>
+
+<file path=ppt/slides/slide10.xml><?xml version="1.0" encoding="utf-8"?>
+<p:sld xmlns:a="http://schemas.openxmlformats.org/drawingml/2006/main" xmlns:r="http://schemas.openxmlformats.org/officeDocument/2006/relationships" xmlns:p="http://schemas.openxmlformats.org/presentationml/2006/main">
+  <p:cSld>
+    <p:spTree>
+      <p:nvGrpSpPr>
+        <p:cNvPr id="1" name=""/>
+        <p:cNvGrpSpPr/>
+        <p:nvPr/>
+      </p:nvGrpSpPr>
+      <p:grpSpPr>
+        <a:xfrm>
+          <a:off x="0" y="0"/>
+          <a:ext cx="0" cy="0"/>
+          <a:chOff x="0" y="0"/>
+          <a:chExt cx="0" cy="0"/>
+        </a:xfrm>
+      </p:grpSpPr>
+      <p:sp>
+        <p:nvSpPr>
+          <p:cNvPr id="2" name="Title 1">
+            <a:extLst>
+              <a:ext uri="{FF2B5EF4-FFF2-40B4-BE49-F238E27FC236}">
+                <a16:creationId xmlns:a16="http://schemas.microsoft.com/office/drawing/2014/main" id="{CC4A3FAA-0E02-4277-9A18-5E14BC20FA27}"/>
+              </a:ext>
+            </a:extLst>
+          </p:cNvPr>
+          <p:cNvSpPr>
+            <a:spLocks noGrp="1"/>
+          </p:cNvSpPr>
+          <p:nvPr>
+            <p:ph type="title"/>
+          </p:nvPr>
+        </p:nvSpPr>
+        <p:spPr/>
+        <p:txBody>
+          <a:bodyPr/>
+          <a:lstStyle/>
+          <a:p>
+            <a:r>
+              <a:rPr lang="en-US" dirty="0"/>
+              <a:t>Setup the PC</a:t>
+            </a:r>
+          </a:p>
+        </p:txBody>
+      </p:sp>
+      <p:sp>
+        <p:nvSpPr>
+          <p:cNvPr id="3" name="Content Placeholder 2">
+            <a:extLst>
+              <a:ext uri="{FF2B5EF4-FFF2-40B4-BE49-F238E27FC236}">
+                <a16:creationId xmlns:a16="http://schemas.microsoft.com/office/drawing/2014/main" id="{B50147CF-DAA8-4BEB-A969-D6D9FECE042F}"/>
+              </a:ext>
+            </a:extLst>
+          </p:cNvPr>
+          <p:cNvSpPr>
+            <a:spLocks noGrp="1"/>
+          </p:cNvSpPr>
+          <p:nvPr>
+            <p:ph idx="1"/>
+          </p:nvPr>
+        </p:nvSpPr>
+        <p:spPr>
+          <a:xfrm>
+            <a:off x="1154954" y="2603500"/>
+            <a:ext cx="9970245" cy="3416300"/>
+          </a:xfrm>
+        </p:spPr>
+        <p:txBody>
+          <a:bodyPr>
+            <a:normAutofit/>
+          </a:bodyPr>
+          <a:lstStyle/>
+          <a:p>
+            <a:r>
+              <a:rPr lang="en-US" sz="3200" dirty="0"/>
+              <a:t>It needs node.js</a:t>
+            </a:r>
+          </a:p>
+          <a:p>
+            <a:pPr lvl="1"/>
+            <a:r>
+              <a:rPr lang="en-US" sz="3000" dirty="0"/>
+              <a:t>https://nodejs.org/en/download/</a:t>
+            </a:r>
+          </a:p>
+          <a:p>
+            <a:r>
+              <a:rPr lang="en-US" sz="3200" dirty="0"/>
+              <a:t>It also needs yarn.</a:t>
+            </a:r>
+          </a:p>
+          <a:p>
+            <a:pPr lvl="1"/>
+            <a:r>
+              <a:rPr lang="en-US" sz="3000" dirty="0"/>
+              <a:t>After node is installed, open a command prompt and type ‘</a:t>
+            </a:r>
+            <a:r>
+              <a:rPr lang="en-US" sz="3000" dirty="0" err="1"/>
+              <a:t>npm</a:t>
+            </a:r>
+            <a:r>
+              <a:rPr lang="en-US" sz="3000" dirty="0"/>
+              <a:t> install --global yarn’</a:t>
+            </a:r>
+          </a:p>
+          <a:p>
+            <a:endParaRPr lang="en-US" sz="3400" dirty="0"/>
+          </a:p>
+        </p:txBody>
+      </p:sp>
+      <p:sp>
+        <p:nvSpPr>
+          <p:cNvPr id="5" name="Footer Placeholder 4">
+            <a:extLst>
+              <a:ext uri="{FF2B5EF4-FFF2-40B4-BE49-F238E27FC236}">
+                <a16:creationId xmlns:a16="http://schemas.microsoft.com/office/drawing/2014/main" id="{EC952921-544E-4F77-8675-F6260F7DB676}"/>
+              </a:ext>
+            </a:extLst>
+          </p:cNvPr>
+          <p:cNvSpPr>
+            <a:spLocks noGrp="1"/>
+          </p:cNvSpPr>
+          <p:nvPr>
+            <p:ph type="ftr" sz="quarter" idx="11"/>
+          </p:nvPr>
+        </p:nvSpPr>
+        <p:spPr>
+          <a:xfrm>
+            <a:off x="145474" y="6359237"/>
+            <a:ext cx="9081654" cy="374074"/>
+          </a:xfrm>
+        </p:spPr>
+        <p:txBody>
+          <a:bodyPr/>
+          <a:lstStyle/>
+          <a:p>
+            <a:r>
+              <a:rPr lang="en-US" sz="2400" dirty="0">
+                <a:solidFill>
+                  <a:schemeClr val="tx1"/>
+                </a:solidFill>
+              </a:rPr>
+              <a:t>https://github.com/JimWright4089/FIRSTWorkshops</a:t>
+            </a:r>
+          </a:p>
+        </p:txBody>
+      </p:sp>
+    </p:spTree>
+    <p:extLst>
+      <p:ext uri="{BB962C8B-B14F-4D97-AF65-F5344CB8AC3E}">
+        <p14:creationId xmlns:p14="http://schemas.microsoft.com/office/powerpoint/2010/main" val="2198793408"/>
+      </p:ext>
+    </p:extLst>
+  </p:cSld>
+  <p:clrMapOvr>
+    <a:masterClrMapping/>
+  </p:clrMapOvr>
+</p:sld>
+</file>
+
+<file path=ppt/slides/slide11.xml><?xml version="1.0" encoding="utf-8"?>
+<p:sld xmlns:a="http://schemas.openxmlformats.org/drawingml/2006/main" xmlns:r="http://schemas.openxmlformats.org/officeDocument/2006/relationships" xmlns:p="http://schemas.openxmlformats.org/presentationml/2006/main">
+  <p:cSld>
+    <p:spTree>
+      <p:nvGrpSpPr>
+        <p:cNvPr id="1" name=""/>
+        <p:cNvGrpSpPr/>
+        <p:nvPr/>
+      </p:nvGrpSpPr>
+      <p:grpSpPr>
+        <a:xfrm>
+          <a:off x="0" y="0"/>
+          <a:ext cx="0" cy="0"/>
+          <a:chOff x="0" y="0"/>
+          <a:chExt cx="0" cy="0"/>
+        </a:xfrm>
+      </p:grpSpPr>
+      <p:sp>
+        <p:nvSpPr>
+          <p:cNvPr id="2" name="Title 1">
+            <a:extLst>
+              <a:ext uri="{FF2B5EF4-FFF2-40B4-BE49-F238E27FC236}">
+                <a16:creationId xmlns:a16="http://schemas.microsoft.com/office/drawing/2014/main" id="{CC4A3FAA-0E02-4277-9A18-5E14BC20FA27}"/>
+              </a:ext>
+            </a:extLst>
+          </p:cNvPr>
+          <p:cNvSpPr>
+            <a:spLocks noGrp="1"/>
+          </p:cNvSpPr>
+          <p:nvPr>
+            <p:ph type="title"/>
+          </p:nvPr>
+        </p:nvSpPr>
+        <p:spPr/>
+        <p:txBody>
+          <a:bodyPr/>
+          <a:lstStyle/>
+          <a:p>
+            <a:r>
+              <a:rPr lang="en-US" dirty="0" err="1"/>
+              <a:t>build.dependencies.gradle</a:t>
+            </a:r>
+            <a:endParaRPr lang="en-US" dirty="0"/>
+          </a:p>
+        </p:txBody>
+      </p:sp>
+      <p:sp>
+        <p:nvSpPr>
+          <p:cNvPr id="3" name="Content Placeholder 2">
+            <a:extLst>
+              <a:ext uri="{FF2B5EF4-FFF2-40B4-BE49-F238E27FC236}">
+                <a16:creationId xmlns:a16="http://schemas.microsoft.com/office/drawing/2014/main" id="{B50147CF-DAA8-4BEB-A969-D6D9FECE042F}"/>
+              </a:ext>
+            </a:extLst>
+          </p:cNvPr>
+          <p:cNvSpPr>
+            <a:spLocks noGrp="1"/>
+          </p:cNvSpPr>
+          <p:nvPr>
+            <p:ph idx="1"/>
+          </p:nvPr>
+        </p:nvSpPr>
+        <p:spPr>
+          <a:xfrm>
+            <a:off x="1154954" y="2603500"/>
+            <a:ext cx="9970245" cy="3416300"/>
+          </a:xfrm>
+        </p:spPr>
+        <p:txBody>
+          <a:bodyPr>
+            <a:normAutofit fontScale="70000" lnSpcReduction="20000"/>
+          </a:bodyPr>
+          <a:lstStyle/>
+          <a:p>
+            <a:r>
+              <a:rPr lang="en-US" sz="3400" dirty="0"/>
+              <a:t>repositories {</a:t>
+            </a:r>
+          </a:p>
+          <a:p>
+            <a:r>
+              <a:rPr lang="en-US" sz="3400" dirty="0"/>
+              <a:t>    </a:t>
+            </a:r>
+            <a:r>
+              <a:rPr lang="en-US" sz="3400" dirty="0" err="1"/>
+              <a:t>mavenCentral</a:t>
+            </a:r>
+            <a:r>
+              <a:rPr lang="en-US" sz="3400" dirty="0"/>
+              <a:t>()</a:t>
+            </a:r>
+          </a:p>
+          <a:p>
+            <a:r>
+              <a:rPr lang="en-US" sz="3400" dirty="0"/>
+              <a:t>    google() // Needed for </a:t>
+            </a:r>
+            <a:r>
+              <a:rPr lang="en-US" sz="3400" dirty="0" err="1"/>
+              <a:t>androidx</a:t>
+            </a:r>
+            <a:endParaRPr lang="en-US" sz="3400" dirty="0"/>
+          </a:p>
+          <a:p>
+            <a:r>
+              <a:rPr lang="en-US" sz="3400" dirty="0"/>
+              <a:t>    </a:t>
+            </a:r>
+            <a:r>
+              <a:rPr lang="en-US" sz="3400" dirty="0" err="1"/>
+              <a:t>flatDir</a:t>
+            </a:r>
+            <a:r>
+              <a:rPr lang="en-US" sz="3400" dirty="0"/>
+              <a:t> {</a:t>
+            </a:r>
+          </a:p>
+          <a:p>
+            <a:r>
+              <a:rPr lang="en-US" sz="3400" dirty="0"/>
+              <a:t>        </a:t>
+            </a:r>
+            <a:r>
+              <a:rPr lang="en-US" sz="3400" dirty="0" err="1"/>
+              <a:t>dirs</a:t>
+            </a:r>
+            <a:r>
+              <a:rPr lang="en-US" sz="3400" dirty="0"/>
+              <a:t> </a:t>
+            </a:r>
+            <a:r>
+              <a:rPr lang="en-US" sz="3400" dirty="0" err="1"/>
+              <a:t>rootProject.file</a:t>
+            </a:r>
+            <a:r>
+              <a:rPr lang="en-US" sz="3400" dirty="0"/>
+              <a:t>('libs')</a:t>
+            </a:r>
+          </a:p>
+          <a:p>
+            <a:r>
+              <a:rPr lang="en-US" sz="3400" dirty="0"/>
+              <a:t>    }</a:t>
+            </a:r>
+          </a:p>
+          <a:p>
+            <a:r>
+              <a:rPr lang="en-US" sz="3400" dirty="0"/>
+              <a:t>    </a:t>
+            </a:r>
+            <a:r>
+              <a:rPr lang="en-US" sz="3400" dirty="0">
+                <a:highlight>
+                  <a:srgbClr val="FFFF00"/>
+                </a:highlight>
+              </a:rPr>
+              <a:t>maven { </a:t>
+            </a:r>
+            <a:r>
+              <a:rPr lang="en-US" sz="3400" dirty="0" err="1">
+                <a:highlight>
+                  <a:srgbClr val="FFFF00"/>
+                </a:highlight>
+              </a:rPr>
+              <a:t>url</a:t>
+            </a:r>
+            <a:r>
+              <a:rPr lang="en-US" sz="3400" dirty="0">
+                <a:highlight>
+                  <a:srgbClr val="FFFF00"/>
+                </a:highlight>
+              </a:rPr>
+              <a:t> = 'https://maven.brott.dev/' }</a:t>
+            </a:r>
+          </a:p>
+          <a:p>
+            <a:r>
+              <a:rPr lang="en-US" sz="3400" dirty="0"/>
+              <a:t>}</a:t>
+            </a:r>
+          </a:p>
+        </p:txBody>
+      </p:sp>
+      <p:sp>
+        <p:nvSpPr>
+          <p:cNvPr id="5" name="Footer Placeholder 4">
+            <a:extLst>
+              <a:ext uri="{FF2B5EF4-FFF2-40B4-BE49-F238E27FC236}">
+                <a16:creationId xmlns:a16="http://schemas.microsoft.com/office/drawing/2014/main" id="{EC952921-544E-4F77-8675-F6260F7DB676}"/>
+              </a:ext>
+            </a:extLst>
+          </p:cNvPr>
+          <p:cNvSpPr>
+            <a:spLocks noGrp="1"/>
+          </p:cNvSpPr>
+          <p:nvPr>
+            <p:ph type="ftr" sz="quarter" idx="11"/>
+          </p:nvPr>
+        </p:nvSpPr>
+        <p:spPr>
+          <a:xfrm>
+            <a:off x="145474" y="6359237"/>
+            <a:ext cx="9081654" cy="374074"/>
+          </a:xfrm>
+        </p:spPr>
+        <p:txBody>
+          <a:bodyPr/>
+          <a:lstStyle/>
+          <a:p>
+            <a:r>
+              <a:rPr lang="en-US" sz="2400" dirty="0">
+                <a:solidFill>
+                  <a:schemeClr val="tx1"/>
+                </a:solidFill>
+              </a:rPr>
+              <a:t>https://github.com/JimWright4089/FIRSTWorkshops</a:t>
+            </a:r>
+          </a:p>
+        </p:txBody>
+      </p:sp>
+    </p:spTree>
+    <p:extLst>
+      <p:ext uri="{BB962C8B-B14F-4D97-AF65-F5344CB8AC3E}">
+        <p14:creationId xmlns:p14="http://schemas.microsoft.com/office/powerpoint/2010/main" val="346285461"/>
+      </p:ext>
+    </p:extLst>
+  </p:cSld>
+  <p:clrMapOvr>
+    <a:masterClrMapping/>
+  </p:clrMapOvr>
+</p:sld>
+</file>
+
+<file path=ppt/slides/slide12.xml><?xml version="1.0" encoding="utf-8"?>
+<p:sld xmlns:a="http://schemas.openxmlformats.org/drawingml/2006/main" xmlns:r="http://schemas.openxmlformats.org/officeDocument/2006/relationships" xmlns:p="http://schemas.openxmlformats.org/presentationml/2006/main">
+  <p:cSld>
+    <p:spTree>
+      <p:nvGrpSpPr>
+        <p:cNvPr id="1" name=""/>
+        <p:cNvGrpSpPr/>
+        <p:nvPr/>
+      </p:nvGrpSpPr>
+      <p:grpSpPr>
+        <a:xfrm>
+          <a:off x="0" y="0"/>
+          <a:ext cx="0" cy="0"/>
+          <a:chOff x="0" y="0"/>
+          <a:chExt cx="0" cy="0"/>
+        </a:xfrm>
+      </p:grpSpPr>
+      <p:sp>
+        <p:nvSpPr>
+          <p:cNvPr id="2" name="Title 1">
+            <a:extLst>
+              <a:ext uri="{FF2B5EF4-FFF2-40B4-BE49-F238E27FC236}">
+                <a16:creationId xmlns:a16="http://schemas.microsoft.com/office/drawing/2014/main" id="{CC4A3FAA-0E02-4277-9A18-5E14BC20FA27}"/>
+              </a:ext>
+            </a:extLst>
+          </p:cNvPr>
+          <p:cNvSpPr>
+            <a:spLocks noGrp="1"/>
+          </p:cNvSpPr>
+          <p:nvPr>
+            <p:ph type="title"/>
+          </p:nvPr>
+        </p:nvSpPr>
+        <p:spPr/>
+        <p:txBody>
+          <a:bodyPr/>
+          <a:lstStyle/>
+          <a:p>
+            <a:r>
+              <a:rPr lang="en-US" dirty="0" err="1"/>
+              <a:t>build.dependencies.gradle</a:t>
+            </a:r>
+            <a:endParaRPr lang="en-US" dirty="0"/>
+          </a:p>
+        </p:txBody>
+      </p:sp>
+      <p:sp>
+        <p:nvSpPr>
+          <p:cNvPr id="3" name="Content Placeholder 2">
+            <a:extLst>
+              <a:ext uri="{FF2B5EF4-FFF2-40B4-BE49-F238E27FC236}">
+                <a16:creationId xmlns:a16="http://schemas.microsoft.com/office/drawing/2014/main" id="{B50147CF-DAA8-4BEB-A969-D6D9FECE042F}"/>
+              </a:ext>
+            </a:extLst>
+          </p:cNvPr>
+          <p:cNvSpPr>
+            <a:spLocks noGrp="1"/>
+          </p:cNvSpPr>
+          <p:nvPr>
+            <p:ph idx="1"/>
+          </p:nvPr>
+        </p:nvSpPr>
+        <p:spPr>
+          <a:xfrm>
+            <a:off x="1154954" y="2603500"/>
+            <a:ext cx="9970245" cy="3416300"/>
+          </a:xfrm>
+        </p:spPr>
+        <p:txBody>
+          <a:bodyPr>
+            <a:normAutofit/>
+          </a:bodyPr>
+          <a:lstStyle/>
+          <a:p>
+            <a:r>
+              <a:rPr lang="en-US" sz="2000" dirty="0"/>
+              <a:t>    implementation 'org.tensorflow:tensorflow-lite-task-vision:0.2.0'</a:t>
+            </a:r>
+          </a:p>
+          <a:p>
+            <a:r>
+              <a:rPr lang="en-US" sz="2000" dirty="0"/>
+              <a:t>    implementation 'androidx.appcompat:appcompat:1.2.0'</a:t>
+            </a:r>
+          </a:p>
+          <a:p>
+            <a:r>
+              <a:rPr lang="en-US" sz="2000" dirty="0"/>
+              <a:t>    implementation 'org.firstinspires.ftc:gameAssets-FreightFrenzy:1.0.0'</a:t>
+            </a:r>
+          </a:p>
+          <a:p>
+            <a:r>
+              <a:rPr lang="en-US" sz="2000" dirty="0"/>
+              <a:t>    </a:t>
+            </a:r>
+            <a:r>
+              <a:rPr lang="en-US" sz="2000" dirty="0">
+                <a:highlight>
+                  <a:srgbClr val="FFFF00"/>
+                </a:highlight>
+              </a:rPr>
+              <a:t>implementation 'com.acmerobotics.dashboard:dashboard:0.4.4'</a:t>
+            </a:r>
+          </a:p>
+          <a:p>
+            <a:r>
+              <a:rPr lang="en-US" sz="2000" dirty="0"/>
+              <a:t>}</a:t>
+            </a:r>
+          </a:p>
+        </p:txBody>
+      </p:sp>
+      <p:sp>
+        <p:nvSpPr>
+          <p:cNvPr id="5" name="Footer Placeholder 4">
+            <a:extLst>
+              <a:ext uri="{FF2B5EF4-FFF2-40B4-BE49-F238E27FC236}">
+                <a16:creationId xmlns:a16="http://schemas.microsoft.com/office/drawing/2014/main" id="{EC952921-544E-4F77-8675-F6260F7DB676}"/>
+              </a:ext>
+            </a:extLst>
+          </p:cNvPr>
+          <p:cNvSpPr>
+            <a:spLocks noGrp="1"/>
+          </p:cNvSpPr>
+          <p:nvPr>
+            <p:ph type="ftr" sz="quarter" idx="11"/>
+          </p:nvPr>
+        </p:nvSpPr>
+        <p:spPr>
+          <a:xfrm>
+            <a:off x="145474" y="6359237"/>
+            <a:ext cx="9081654" cy="374074"/>
+          </a:xfrm>
+        </p:spPr>
+        <p:txBody>
+          <a:bodyPr/>
+          <a:lstStyle/>
+          <a:p>
+            <a:r>
+              <a:rPr lang="en-US" sz="2400" dirty="0">
+                <a:solidFill>
+                  <a:schemeClr val="tx1"/>
+                </a:solidFill>
+              </a:rPr>
+              <a:t>https://github.com/JimWright4089/FIRSTWorkshops</a:t>
+            </a:r>
+          </a:p>
+        </p:txBody>
+      </p:sp>
+    </p:spTree>
+    <p:extLst>
+      <p:ext uri="{BB962C8B-B14F-4D97-AF65-F5344CB8AC3E}">
+        <p14:creationId xmlns:p14="http://schemas.microsoft.com/office/powerpoint/2010/main" val="332460612"/>
+      </p:ext>
+    </p:extLst>
+  </p:cSld>
+  <p:clrMapOvr>
+    <a:masterClrMapping/>
+  </p:clrMapOvr>
+</p:sld>
+</file>
+
+<file path=ppt/slides/slide13.xml><?xml version="1.0" encoding="utf-8"?>
+<p:sld xmlns:a="http://schemas.openxmlformats.org/drawingml/2006/main" xmlns:r="http://schemas.openxmlformats.org/officeDocument/2006/relationships" xmlns:p="http://schemas.openxmlformats.org/presentationml/2006/main">
+  <p:cSld>
+    <p:spTree>
+      <p:nvGrpSpPr>
+        <p:cNvPr id="1" name=""/>
+        <p:cNvGrpSpPr/>
+        <p:nvPr/>
+      </p:nvGrpSpPr>
+      <p:grpSpPr>
+        <a:xfrm>
+          <a:off x="0" y="0"/>
+          <a:ext cx="0" cy="0"/>
+          <a:chOff x="0" y="0"/>
+          <a:chExt cx="0" cy="0"/>
+        </a:xfrm>
+      </p:grpSpPr>
+      <p:sp>
+        <p:nvSpPr>
+          <p:cNvPr id="2" name="Title 1">
+            <a:extLst>
+              <a:ext uri="{FF2B5EF4-FFF2-40B4-BE49-F238E27FC236}">
+                <a16:creationId xmlns:a16="http://schemas.microsoft.com/office/drawing/2014/main" id="{CC4A3FAA-0E02-4277-9A18-5E14BC20FA27}"/>
+              </a:ext>
+            </a:extLst>
+          </p:cNvPr>
+          <p:cNvSpPr>
+            <a:spLocks noGrp="1"/>
+          </p:cNvSpPr>
+          <p:nvPr>
+            <p:ph type="title"/>
+          </p:nvPr>
+        </p:nvSpPr>
+        <p:spPr/>
+        <p:txBody>
+          <a:bodyPr/>
+          <a:lstStyle/>
+          <a:p>
+            <a:r>
+              <a:rPr lang="en-US" dirty="0"/>
+              <a:t>Adding more code to your code.</a:t>
+            </a:r>
+          </a:p>
+        </p:txBody>
+      </p:sp>
+      <p:sp>
+        <p:nvSpPr>
+          <p:cNvPr id="3" name="Content Placeholder 2">
+            <a:extLst>
+              <a:ext uri="{FF2B5EF4-FFF2-40B4-BE49-F238E27FC236}">
+                <a16:creationId xmlns:a16="http://schemas.microsoft.com/office/drawing/2014/main" id="{B50147CF-DAA8-4BEB-A969-D6D9FECE042F}"/>
+              </a:ext>
+            </a:extLst>
+          </p:cNvPr>
+          <p:cNvSpPr>
+            <a:spLocks noGrp="1"/>
+          </p:cNvSpPr>
+          <p:nvPr>
+            <p:ph idx="1"/>
+          </p:nvPr>
+        </p:nvSpPr>
+        <p:spPr>
+          <a:xfrm>
+            <a:off x="1154954" y="2603500"/>
+            <a:ext cx="9970245" cy="3416300"/>
+          </a:xfrm>
+        </p:spPr>
+        <p:txBody>
+          <a:bodyPr>
+            <a:normAutofit/>
+          </a:bodyPr>
+          <a:lstStyle/>
+          <a:p>
+            <a:r>
+              <a:rPr lang="en-US" sz="2000" dirty="0"/>
+              <a:t>import </a:t>
+            </a:r>
+            <a:r>
+              <a:rPr lang="en-US" sz="2000" dirty="0" err="1"/>
+              <a:t>com.acmerobotics.dashboard</a:t>
+            </a:r>
+            <a:r>
+              <a:rPr lang="en-US" sz="2000" dirty="0"/>
+              <a:t>.*;</a:t>
+            </a:r>
+          </a:p>
+          <a:p>
+            <a:endParaRPr lang="en-US" sz="2000" dirty="0"/>
+          </a:p>
+          <a:p>
+            <a:r>
+              <a:rPr lang="en-US" sz="2000" dirty="0"/>
+              <a:t> // Declare </a:t>
+            </a:r>
+            <a:r>
+              <a:rPr lang="en-US" sz="2000" dirty="0" err="1"/>
+              <a:t>OpMode</a:t>
+            </a:r>
+            <a:r>
+              <a:rPr lang="en-US" sz="2000" dirty="0"/>
+              <a:t> members.</a:t>
+            </a:r>
+          </a:p>
+          <a:p>
+            <a:r>
+              <a:rPr lang="en-US" sz="2000" dirty="0"/>
+              <a:t>    </a:t>
+            </a:r>
+            <a:r>
+              <a:rPr lang="en-US" sz="2000" dirty="0" err="1"/>
+              <a:t>FtcDashboard</a:t>
+            </a:r>
+            <a:r>
+              <a:rPr lang="en-US" sz="2000" dirty="0"/>
+              <a:t> dashboard = </a:t>
+            </a:r>
+            <a:r>
+              <a:rPr lang="en-US" sz="2000" dirty="0" err="1"/>
+              <a:t>FtcDashboard.getInstance</a:t>
+            </a:r>
+            <a:r>
+              <a:rPr lang="en-US" sz="2000" dirty="0"/>
+              <a:t>();</a:t>
+            </a:r>
+          </a:p>
+          <a:p>
+            <a:endParaRPr lang="en-US" sz="2000" dirty="0"/>
+          </a:p>
+          <a:p>
+            <a:r>
+              <a:rPr lang="en-US" sz="2000" dirty="0"/>
+              <a:t> public void </a:t>
+            </a:r>
+            <a:r>
+              <a:rPr lang="en-US" sz="2000" dirty="0" err="1"/>
+              <a:t>init</a:t>
+            </a:r>
+            <a:r>
+              <a:rPr lang="en-US" sz="2000" dirty="0"/>
+              <a:t>() {</a:t>
+            </a:r>
+          </a:p>
+          <a:p>
+            <a:r>
+              <a:rPr lang="en-US" sz="2000" dirty="0"/>
+              <a:t>       telemetry = </a:t>
+            </a:r>
+            <a:r>
+              <a:rPr lang="en-US" sz="2000" dirty="0" err="1"/>
+              <a:t>dashboard.getTelemetry</a:t>
+            </a:r>
+            <a:r>
+              <a:rPr lang="en-US" sz="2000" dirty="0"/>
+              <a:t>();</a:t>
+            </a:r>
+          </a:p>
+        </p:txBody>
+      </p:sp>
+      <p:sp>
+        <p:nvSpPr>
+          <p:cNvPr id="5" name="Footer Placeholder 4">
+            <a:extLst>
+              <a:ext uri="{FF2B5EF4-FFF2-40B4-BE49-F238E27FC236}">
+                <a16:creationId xmlns:a16="http://schemas.microsoft.com/office/drawing/2014/main" id="{EC952921-544E-4F77-8675-F6260F7DB676}"/>
+              </a:ext>
+            </a:extLst>
+          </p:cNvPr>
+          <p:cNvSpPr>
+            <a:spLocks noGrp="1"/>
+          </p:cNvSpPr>
+          <p:nvPr>
+            <p:ph type="ftr" sz="quarter" idx="11"/>
+          </p:nvPr>
+        </p:nvSpPr>
+        <p:spPr>
+          <a:xfrm>
+            <a:off x="145474" y="6359237"/>
+            <a:ext cx="9081654" cy="374074"/>
+          </a:xfrm>
+        </p:spPr>
+        <p:txBody>
+          <a:bodyPr/>
+          <a:lstStyle/>
+          <a:p>
+            <a:r>
+              <a:rPr lang="en-US" sz="2400" dirty="0">
+                <a:solidFill>
+                  <a:schemeClr val="tx1"/>
+                </a:solidFill>
+              </a:rPr>
+              <a:t>https://github.com/JimWright4089/FIRSTWorkshops</a:t>
+            </a:r>
+          </a:p>
+        </p:txBody>
+      </p:sp>
+    </p:spTree>
+    <p:extLst>
+      <p:ext uri="{BB962C8B-B14F-4D97-AF65-F5344CB8AC3E}">
+        <p14:creationId xmlns:p14="http://schemas.microsoft.com/office/powerpoint/2010/main" val="1807842002"/>
+      </p:ext>
+    </p:extLst>
+  </p:cSld>
+  <p:clrMapOvr>
+    <a:masterClrMapping/>
+  </p:clrMapOvr>
+</p:sld>
+</file>
+
+<file path=ppt/slides/slide14.xml><?xml version="1.0" encoding="utf-8"?>
+<p:sld xmlns:a="http://schemas.openxmlformats.org/drawingml/2006/main" xmlns:r="http://schemas.openxmlformats.org/officeDocument/2006/relationships" xmlns:p="http://schemas.openxmlformats.org/presentationml/2006/main">
+  <p:cSld>
+    <p:spTree>
+      <p:nvGrpSpPr>
+        <p:cNvPr id="1" name=""/>
+        <p:cNvGrpSpPr/>
+        <p:nvPr/>
+      </p:nvGrpSpPr>
+      <p:grpSpPr>
+        <a:xfrm>
+          <a:off x="0" y="0"/>
+          <a:ext cx="0" cy="0"/>
+          <a:chOff x="0" y="0"/>
+          <a:chExt cx="0" cy="0"/>
+        </a:xfrm>
+      </p:grpSpPr>
+      <p:sp>
+        <p:nvSpPr>
+          <p:cNvPr id="2" name="Title 1">
+            <a:extLst>
+              <a:ext uri="{FF2B5EF4-FFF2-40B4-BE49-F238E27FC236}">
+                <a16:creationId xmlns:a16="http://schemas.microsoft.com/office/drawing/2014/main" id="{CC4A3FAA-0E02-4277-9A18-5E14BC20FA27}"/>
+              </a:ext>
+            </a:extLst>
+          </p:cNvPr>
+          <p:cNvSpPr>
+            <a:spLocks noGrp="1"/>
+          </p:cNvSpPr>
+          <p:nvPr>
+            <p:ph type="title"/>
+          </p:nvPr>
+        </p:nvSpPr>
+        <p:spPr/>
+        <p:txBody>
+          <a:bodyPr/>
+          <a:lstStyle/>
+          <a:p>
+            <a:r>
+              <a:rPr lang="en-US" dirty="0"/>
+              <a:t>Here is where I did odd things</a:t>
+            </a:r>
+          </a:p>
+        </p:txBody>
+      </p:sp>
+      <p:sp>
+        <p:nvSpPr>
+          <p:cNvPr id="3" name="Content Placeholder 2">
+            <a:extLst>
+              <a:ext uri="{FF2B5EF4-FFF2-40B4-BE49-F238E27FC236}">
+                <a16:creationId xmlns:a16="http://schemas.microsoft.com/office/drawing/2014/main" id="{B50147CF-DAA8-4BEB-A969-D6D9FECE042F}"/>
+              </a:ext>
+            </a:extLst>
+          </p:cNvPr>
+          <p:cNvSpPr>
+            <a:spLocks noGrp="1"/>
+          </p:cNvSpPr>
+          <p:nvPr>
+            <p:ph idx="1"/>
+          </p:nvPr>
+        </p:nvSpPr>
+        <p:spPr>
+          <a:xfrm>
+            <a:off x="1154954" y="2603500"/>
+            <a:ext cx="9970245" cy="3416300"/>
+          </a:xfrm>
+        </p:spPr>
+        <p:txBody>
+          <a:bodyPr>
+            <a:normAutofit/>
+          </a:bodyPr>
+          <a:lstStyle/>
+          <a:p>
+            <a:r>
+              <a:rPr lang="en-US" sz="2400" dirty="0"/>
+              <a:t>I could not get the import:</a:t>
+            </a:r>
+          </a:p>
+          <a:p>
+            <a:pPr lvl="1"/>
+            <a:r>
+              <a:rPr lang="en-US" sz="2200" dirty="0"/>
+              <a:t>import </a:t>
+            </a:r>
+            <a:r>
+              <a:rPr lang="en-US" sz="2200" dirty="0" err="1"/>
+              <a:t>com.acmerobotics.dashboard</a:t>
+            </a:r>
+            <a:r>
+              <a:rPr lang="en-US" sz="2200" dirty="0"/>
+              <a:t>.*;</a:t>
+            </a:r>
+          </a:p>
+          <a:p>
+            <a:r>
+              <a:rPr lang="en-US" sz="2400" dirty="0"/>
+              <a:t>It’s really hard to describe what I did.  I sort of did a bunch of weird things.</a:t>
+            </a:r>
+          </a:p>
+          <a:p>
+            <a:r>
+              <a:rPr lang="en-US" sz="2400" dirty="0"/>
+              <a:t>The thing I think made the difference was to clone the dashboard repo, open it in the same project as </a:t>
+            </a:r>
+            <a:r>
+              <a:rPr lang="en-US" sz="2400" dirty="0" err="1"/>
+              <a:t>FTCRobotController</a:t>
+            </a:r>
+            <a:endParaRPr lang="en-US" sz="2400" dirty="0"/>
+          </a:p>
+          <a:p>
+            <a:endParaRPr lang="en-US" sz="2400" dirty="0"/>
+          </a:p>
+          <a:p>
+            <a:endParaRPr lang="en-US" sz="2400" dirty="0"/>
+          </a:p>
+        </p:txBody>
+      </p:sp>
+      <p:sp>
+        <p:nvSpPr>
+          <p:cNvPr id="5" name="Footer Placeholder 4">
+            <a:extLst>
+              <a:ext uri="{FF2B5EF4-FFF2-40B4-BE49-F238E27FC236}">
+                <a16:creationId xmlns:a16="http://schemas.microsoft.com/office/drawing/2014/main" id="{EC952921-544E-4F77-8675-F6260F7DB676}"/>
+              </a:ext>
+            </a:extLst>
+          </p:cNvPr>
+          <p:cNvSpPr>
+            <a:spLocks noGrp="1"/>
+          </p:cNvSpPr>
+          <p:nvPr>
+            <p:ph type="ftr" sz="quarter" idx="11"/>
+          </p:nvPr>
+        </p:nvSpPr>
+        <p:spPr>
+          <a:xfrm>
+            <a:off x="145474" y="6359237"/>
+            <a:ext cx="9081654" cy="374074"/>
+          </a:xfrm>
+        </p:spPr>
+        <p:txBody>
+          <a:bodyPr/>
+          <a:lstStyle/>
+          <a:p>
+            <a:r>
+              <a:rPr lang="en-US" sz="2400" dirty="0">
+                <a:solidFill>
+                  <a:schemeClr val="tx1"/>
+                </a:solidFill>
+              </a:rPr>
+              <a:t>https://github.com/JimWright4089/FIRSTWorkshops</a:t>
+            </a:r>
+          </a:p>
+        </p:txBody>
+      </p:sp>
+    </p:spTree>
+    <p:extLst>
+      <p:ext uri="{BB962C8B-B14F-4D97-AF65-F5344CB8AC3E}">
+        <p14:creationId xmlns:p14="http://schemas.microsoft.com/office/powerpoint/2010/main" val="2278696708"/>
+      </p:ext>
+    </p:extLst>
+  </p:cSld>
+  <p:clrMapOvr>
+    <a:masterClrMapping/>
+  </p:clrMapOvr>
+</p:sld>
+</file>
+
+<file path=ppt/slides/slide15.xml><?xml version="1.0" encoding="utf-8"?>
+<p:sld xmlns:a="http://schemas.openxmlformats.org/drawingml/2006/main" xmlns:r="http://schemas.openxmlformats.org/officeDocument/2006/relationships" xmlns:p="http://schemas.openxmlformats.org/presentationml/2006/main">
+  <p:cSld>
+    <p:spTree>
+      <p:nvGrpSpPr>
+        <p:cNvPr id="1" name=""/>
+        <p:cNvGrpSpPr/>
+        <p:nvPr/>
+      </p:nvGrpSpPr>
+      <p:grpSpPr>
+        <a:xfrm>
+          <a:off x="0" y="0"/>
+          <a:ext cx="0" cy="0"/>
+          <a:chOff x="0" y="0"/>
+          <a:chExt cx="0" cy="0"/>
+        </a:xfrm>
+      </p:grpSpPr>
+      <p:sp>
+        <p:nvSpPr>
+          <p:cNvPr id="2" name="Title 1">
+            <a:extLst>
+              <a:ext uri="{FF2B5EF4-FFF2-40B4-BE49-F238E27FC236}">
+                <a16:creationId xmlns:a16="http://schemas.microsoft.com/office/drawing/2014/main" id="{CC4A3FAA-0E02-4277-9A18-5E14BC20FA27}"/>
+              </a:ext>
+            </a:extLst>
+          </p:cNvPr>
+          <p:cNvSpPr>
+            <a:spLocks noGrp="1"/>
+          </p:cNvSpPr>
+          <p:nvPr>
+            <p:ph type="title"/>
+          </p:nvPr>
+        </p:nvSpPr>
+        <p:spPr/>
+        <p:txBody>
+          <a:bodyPr/>
+          <a:lstStyle/>
+          <a:p>
+            <a:r>
+              <a:rPr lang="en-US" dirty="0"/>
+              <a:t>Here is where I did odd things</a:t>
+            </a:r>
+          </a:p>
+        </p:txBody>
+      </p:sp>
+      <p:sp>
+        <p:nvSpPr>
+          <p:cNvPr id="3" name="Content Placeholder 2">
+            <a:extLst>
+              <a:ext uri="{FF2B5EF4-FFF2-40B4-BE49-F238E27FC236}">
+                <a16:creationId xmlns:a16="http://schemas.microsoft.com/office/drawing/2014/main" id="{B50147CF-DAA8-4BEB-A969-D6D9FECE042F}"/>
+              </a:ext>
+            </a:extLst>
+          </p:cNvPr>
+          <p:cNvSpPr>
+            <a:spLocks noGrp="1"/>
+          </p:cNvSpPr>
+          <p:nvPr>
+            <p:ph idx="1"/>
+          </p:nvPr>
+        </p:nvSpPr>
+        <p:spPr>
+          <a:xfrm>
+            <a:off x="1154954" y="2603500"/>
+            <a:ext cx="9970245" cy="3416300"/>
+          </a:xfrm>
+        </p:spPr>
+        <p:txBody>
+          <a:bodyPr>
+            <a:normAutofit lnSpcReduction="10000"/>
+          </a:bodyPr>
+          <a:lstStyle/>
+          <a:p>
+            <a:r>
+              <a:rPr lang="en-US" sz="2400" dirty="0"/>
+              <a:t>I then build the whole thing as which Android Studio told me to update things.</a:t>
+            </a:r>
+          </a:p>
+          <a:p>
+            <a:r>
+              <a:rPr lang="en-US" sz="2400" dirty="0"/>
+              <a:t>I updated the things.</a:t>
+            </a:r>
+          </a:p>
+          <a:p>
+            <a:r>
+              <a:rPr lang="en-US" sz="2400" dirty="0"/>
+              <a:t>Then the dashboard code stopped building, and I closed it.</a:t>
+            </a:r>
+          </a:p>
+          <a:p>
+            <a:r>
+              <a:rPr lang="en-US" sz="2400" dirty="0"/>
+              <a:t>After that the import, well, imported.</a:t>
+            </a:r>
+          </a:p>
+          <a:p>
+            <a:endParaRPr lang="en-US" sz="2400" dirty="0"/>
+          </a:p>
+          <a:p>
+            <a:r>
+              <a:rPr lang="en-US" sz="2400" dirty="0"/>
+              <a:t>I would scrape everything off my machine and start again but it’s 11pm last night.</a:t>
+            </a:r>
+          </a:p>
+          <a:p>
+            <a:endParaRPr lang="en-US" sz="2400" dirty="0"/>
+          </a:p>
+          <a:p>
+            <a:endParaRPr lang="en-US" sz="2400" dirty="0"/>
+          </a:p>
+        </p:txBody>
+      </p:sp>
+      <p:sp>
+        <p:nvSpPr>
+          <p:cNvPr id="5" name="Footer Placeholder 4">
+            <a:extLst>
+              <a:ext uri="{FF2B5EF4-FFF2-40B4-BE49-F238E27FC236}">
+                <a16:creationId xmlns:a16="http://schemas.microsoft.com/office/drawing/2014/main" id="{EC952921-544E-4F77-8675-F6260F7DB676}"/>
+              </a:ext>
+            </a:extLst>
+          </p:cNvPr>
+          <p:cNvSpPr>
+            <a:spLocks noGrp="1"/>
+          </p:cNvSpPr>
+          <p:nvPr>
+            <p:ph type="ftr" sz="quarter" idx="11"/>
+          </p:nvPr>
+        </p:nvSpPr>
+        <p:spPr>
+          <a:xfrm>
+            <a:off x="145474" y="6359237"/>
+            <a:ext cx="9081654" cy="374074"/>
+          </a:xfrm>
+        </p:spPr>
+        <p:txBody>
+          <a:bodyPr/>
+          <a:lstStyle/>
+          <a:p>
+            <a:r>
+              <a:rPr lang="en-US" sz="2400" dirty="0">
+                <a:solidFill>
+                  <a:schemeClr val="tx1"/>
+                </a:solidFill>
+              </a:rPr>
+              <a:t>https://github.com/JimWright4089/FIRSTWorkshops</a:t>
+            </a:r>
+          </a:p>
+        </p:txBody>
+      </p:sp>
+    </p:spTree>
+    <p:extLst>
+      <p:ext uri="{BB962C8B-B14F-4D97-AF65-F5344CB8AC3E}">
+        <p14:creationId xmlns:p14="http://schemas.microsoft.com/office/powerpoint/2010/main" val="188685163"/>
+      </p:ext>
+    </p:extLst>
+  </p:cSld>
+  <p:clrMapOvr>
+    <a:masterClrMapping/>
+  </p:clrMapOvr>
+</p:sld>
+</file>
+
+<file path=ppt/slides/slide16.xml><?xml version="1.0" encoding="utf-8"?>
+<p:sld xmlns:a="http://schemas.openxmlformats.org/drawingml/2006/main" xmlns:r="http://schemas.openxmlformats.org/officeDocument/2006/relationships" xmlns:p="http://schemas.openxmlformats.org/presentationml/2006/main">
+  <p:cSld>
+    <p:spTree>
+      <p:nvGrpSpPr>
+        <p:cNvPr id="1" name=""/>
+        <p:cNvGrpSpPr/>
+        <p:nvPr/>
+      </p:nvGrpSpPr>
+      <p:grpSpPr>
+        <a:xfrm>
+          <a:off x="0" y="0"/>
+          <a:ext cx="0" cy="0"/>
+          <a:chOff x="0" y="0"/>
+          <a:chExt cx="0" cy="0"/>
+        </a:xfrm>
+      </p:grpSpPr>
+      <p:sp>
+        <p:nvSpPr>
+          <p:cNvPr id="2" name="Title 1">
+            <a:extLst>
+              <a:ext uri="{FF2B5EF4-FFF2-40B4-BE49-F238E27FC236}">
+                <a16:creationId xmlns:a16="http://schemas.microsoft.com/office/drawing/2014/main" id="{CC4A3FAA-0E02-4277-9A18-5E14BC20FA27}"/>
+              </a:ext>
+            </a:extLst>
+          </p:cNvPr>
+          <p:cNvSpPr>
+            <a:spLocks noGrp="1"/>
+          </p:cNvSpPr>
+          <p:nvPr>
+            <p:ph type="title"/>
+          </p:nvPr>
+        </p:nvSpPr>
+        <p:spPr/>
+        <p:txBody>
+          <a:bodyPr/>
+          <a:lstStyle/>
+          <a:p>
+            <a:r>
+              <a:rPr lang="en-US" dirty="0"/>
+              <a:t>The dashboard web site.</a:t>
+            </a:r>
+          </a:p>
+        </p:txBody>
+      </p:sp>
+      <p:sp>
+        <p:nvSpPr>
+          <p:cNvPr id="3" name="Content Placeholder 2">
+            <a:extLst>
+              <a:ext uri="{FF2B5EF4-FFF2-40B4-BE49-F238E27FC236}">
+                <a16:creationId xmlns:a16="http://schemas.microsoft.com/office/drawing/2014/main" id="{B50147CF-DAA8-4BEB-A969-D6D9FECE042F}"/>
+              </a:ext>
+            </a:extLst>
+          </p:cNvPr>
+          <p:cNvSpPr>
+            <a:spLocks noGrp="1"/>
+          </p:cNvSpPr>
+          <p:nvPr>
+            <p:ph idx="1"/>
+          </p:nvPr>
+        </p:nvSpPr>
+        <p:spPr>
+          <a:xfrm>
+            <a:off x="1154954" y="2603500"/>
+            <a:ext cx="9970245" cy="3416300"/>
+          </a:xfrm>
+        </p:spPr>
+        <p:txBody>
+          <a:bodyPr>
+            <a:normAutofit/>
+          </a:bodyPr>
+          <a:lstStyle/>
+          <a:p>
+            <a:r>
+              <a:rPr lang="en-US" sz="3400" dirty="0"/>
+              <a:t>Navigate to 192.168.49.1:8080/dash with a phone RC or 192.168.43.1:8080/dash with a Control Hub.</a:t>
+            </a:r>
+          </a:p>
+          <a:p>
+            <a:endParaRPr lang="en-US" sz="3400" dirty="0"/>
+          </a:p>
+        </p:txBody>
+      </p:sp>
+      <p:sp>
+        <p:nvSpPr>
+          <p:cNvPr id="5" name="Footer Placeholder 4">
+            <a:extLst>
+              <a:ext uri="{FF2B5EF4-FFF2-40B4-BE49-F238E27FC236}">
+                <a16:creationId xmlns:a16="http://schemas.microsoft.com/office/drawing/2014/main" id="{EC952921-544E-4F77-8675-F6260F7DB676}"/>
+              </a:ext>
+            </a:extLst>
+          </p:cNvPr>
+          <p:cNvSpPr>
+            <a:spLocks noGrp="1"/>
+          </p:cNvSpPr>
+          <p:nvPr>
+            <p:ph type="ftr" sz="quarter" idx="11"/>
+          </p:nvPr>
+        </p:nvSpPr>
+        <p:spPr>
+          <a:xfrm>
+            <a:off x="145474" y="6359237"/>
+            <a:ext cx="9081654" cy="374074"/>
+          </a:xfrm>
+        </p:spPr>
+        <p:txBody>
+          <a:bodyPr/>
+          <a:lstStyle/>
+          <a:p>
+            <a:r>
+              <a:rPr lang="en-US" sz="2400" dirty="0">
+                <a:solidFill>
+                  <a:schemeClr val="tx1"/>
+                </a:solidFill>
+              </a:rPr>
+              <a:t>https://github.com/JimWright4089/FIRSTWorkshops</a:t>
+            </a:r>
+          </a:p>
+        </p:txBody>
+      </p:sp>
+    </p:spTree>
+    <p:extLst>
+      <p:ext uri="{BB962C8B-B14F-4D97-AF65-F5344CB8AC3E}">
+        <p14:creationId xmlns:p14="http://schemas.microsoft.com/office/powerpoint/2010/main" val="3278590885"/>
+      </p:ext>
+    </p:extLst>
+  </p:cSld>
+  <p:clrMapOvr>
+    <a:masterClrMapping/>
+  </p:clrMapOvr>
+</p:sld>
+</file>
+
+<file path=ppt/slides/slide17.xml><?xml version="1.0" encoding="utf-8"?>
+<p:sld xmlns:a="http://schemas.openxmlformats.org/drawingml/2006/main" xmlns:r="http://schemas.openxmlformats.org/officeDocument/2006/relationships" xmlns:p="http://schemas.openxmlformats.org/presentationml/2006/main">
+  <p:cSld>
+    <p:spTree>
+      <p:nvGrpSpPr>
+        <p:cNvPr id="1" name=""/>
+        <p:cNvGrpSpPr/>
+        <p:nvPr/>
+      </p:nvGrpSpPr>
+      <p:grpSpPr>
+        <a:xfrm>
+          <a:off x="0" y="0"/>
+          <a:ext cx="0" cy="0"/>
+          <a:chOff x="0" y="0"/>
+          <a:chExt cx="0" cy="0"/>
+        </a:xfrm>
+      </p:grpSpPr>
+      <p:sp>
+        <p:nvSpPr>
+          <p:cNvPr id="2" name="Title 1">
+            <a:extLst>
+              <a:ext uri="{FF2B5EF4-FFF2-40B4-BE49-F238E27FC236}">
+                <a16:creationId xmlns:a16="http://schemas.microsoft.com/office/drawing/2014/main" id="{CC4A3FAA-0E02-4277-9A18-5E14BC20FA27}"/>
+              </a:ext>
+            </a:extLst>
+          </p:cNvPr>
+          <p:cNvSpPr>
+            <a:spLocks noGrp="1"/>
+          </p:cNvSpPr>
+          <p:nvPr>
+            <p:ph type="title"/>
+          </p:nvPr>
+        </p:nvSpPr>
+        <p:spPr/>
+        <p:txBody>
+          <a:bodyPr/>
+          <a:lstStyle/>
+          <a:p>
+            <a:r>
+              <a:rPr lang="en-US" dirty="0"/>
+              <a:t>The dashboard web site.</a:t>
+            </a:r>
+          </a:p>
+        </p:txBody>
+      </p:sp>
+      <p:sp>
+        <p:nvSpPr>
+          <p:cNvPr id="5" name="Footer Placeholder 4">
+            <a:extLst>
+              <a:ext uri="{FF2B5EF4-FFF2-40B4-BE49-F238E27FC236}">
+                <a16:creationId xmlns:a16="http://schemas.microsoft.com/office/drawing/2014/main" id="{EC952921-544E-4F77-8675-F6260F7DB676}"/>
+              </a:ext>
+            </a:extLst>
+          </p:cNvPr>
+          <p:cNvSpPr>
+            <a:spLocks noGrp="1"/>
+          </p:cNvSpPr>
+          <p:nvPr>
+            <p:ph type="ftr" sz="quarter" idx="11"/>
+          </p:nvPr>
+        </p:nvSpPr>
+        <p:spPr>
+          <a:xfrm>
+            <a:off x="145474" y="6359237"/>
+            <a:ext cx="9081654" cy="374074"/>
+          </a:xfrm>
+        </p:spPr>
+        <p:txBody>
+          <a:bodyPr/>
+          <a:lstStyle/>
+          <a:p>
+            <a:r>
+              <a:rPr lang="en-US" sz="2400" dirty="0">
+                <a:solidFill>
+                  <a:schemeClr val="tx1"/>
+                </a:solidFill>
+              </a:rPr>
+              <a:t>https://github.com/JimWright4089/FIRSTWorkshops</a:t>
+            </a:r>
+          </a:p>
+        </p:txBody>
+      </p:sp>
+      <p:pic>
+        <p:nvPicPr>
+          <p:cNvPr id="8" name="Picture 7">
+            <a:extLst>
+              <a:ext uri="{FF2B5EF4-FFF2-40B4-BE49-F238E27FC236}">
+                <a16:creationId xmlns:a16="http://schemas.microsoft.com/office/drawing/2014/main" id="{5B6270D8-4AD3-54F0-D136-E9B238EA9211}"/>
+              </a:ext>
+            </a:extLst>
+          </p:cNvPr>
+          <p:cNvPicPr>
+            <a:picLocks noChangeAspect="1"/>
+          </p:cNvPicPr>
+          <p:nvPr/>
+        </p:nvPicPr>
+        <p:blipFill>
+          <a:blip r:embed="rId2"/>
+          <a:stretch>
+            <a:fillRect/>
+          </a:stretch>
+        </p:blipFill>
+        <p:spPr>
+          <a:xfrm>
+            <a:off x="943740" y="1929293"/>
+            <a:ext cx="8283388" cy="4429944"/>
+          </a:xfrm>
+          <a:prstGeom prst="rect">
+            <a:avLst/>
+          </a:prstGeom>
+        </p:spPr>
+      </p:pic>
+    </p:spTree>
+    <p:extLst>
+      <p:ext uri="{BB962C8B-B14F-4D97-AF65-F5344CB8AC3E}">
+        <p14:creationId xmlns:p14="http://schemas.microsoft.com/office/powerpoint/2010/main" val="413548381"/>
+      </p:ext>
+    </p:extLst>
+  </p:cSld>
+  <p:clrMapOvr>
+    <a:masterClrMapping/>
+  </p:clrMapOvr>
+</p:sld>
+</file>
+
+<file path=ppt/slides/slide18.xml><?xml version="1.0" encoding="utf-8"?>
+<p:sld xmlns:a="http://schemas.openxmlformats.org/drawingml/2006/main" xmlns:r="http://schemas.openxmlformats.org/officeDocument/2006/relationships" xmlns:p="http://schemas.openxmlformats.org/presentationml/2006/main">
+  <p:cSld>
+    <p:spTree>
+      <p:nvGrpSpPr>
+        <p:cNvPr id="1" name=""/>
+        <p:cNvGrpSpPr/>
+        <p:nvPr/>
+      </p:nvGrpSpPr>
+      <p:grpSpPr>
+        <a:xfrm>
+          <a:off x="0" y="0"/>
+          <a:ext cx="0" cy="0"/>
+          <a:chOff x="0" y="0"/>
+          <a:chExt cx="0" cy="0"/>
+        </a:xfrm>
+      </p:grpSpPr>
+      <p:sp>
+        <p:nvSpPr>
+          <p:cNvPr id="2" name="Title 1">
+            <a:extLst>
+              <a:ext uri="{FF2B5EF4-FFF2-40B4-BE49-F238E27FC236}">
+                <a16:creationId xmlns:a16="http://schemas.microsoft.com/office/drawing/2014/main" id="{CC4A3FAA-0E02-4277-9A18-5E14BC20FA27}"/>
+              </a:ext>
+            </a:extLst>
+          </p:cNvPr>
+          <p:cNvSpPr>
+            <a:spLocks noGrp="1"/>
+          </p:cNvSpPr>
+          <p:nvPr>
+            <p:ph type="title"/>
+          </p:nvPr>
+        </p:nvSpPr>
+        <p:spPr/>
+        <p:txBody>
+          <a:bodyPr/>
+          <a:lstStyle/>
+          <a:p>
+            <a:r>
+              <a:rPr lang="en-US" dirty="0"/>
+              <a:t>FTC Road Runner</a:t>
+            </a:r>
+          </a:p>
+        </p:txBody>
+      </p:sp>
+      <p:sp>
+        <p:nvSpPr>
+          <p:cNvPr id="3" name="Content Placeholder 2">
+            <a:extLst>
+              <a:ext uri="{FF2B5EF4-FFF2-40B4-BE49-F238E27FC236}">
+                <a16:creationId xmlns:a16="http://schemas.microsoft.com/office/drawing/2014/main" id="{B50147CF-DAA8-4BEB-A969-D6D9FECE042F}"/>
+              </a:ext>
+            </a:extLst>
+          </p:cNvPr>
+          <p:cNvSpPr>
+            <a:spLocks noGrp="1"/>
+          </p:cNvSpPr>
+          <p:nvPr>
+            <p:ph idx="1"/>
+          </p:nvPr>
+        </p:nvSpPr>
+        <p:spPr>
+          <a:xfrm>
+            <a:off x="1154954" y="2603500"/>
+            <a:ext cx="9970245" cy="3416300"/>
+          </a:xfrm>
+        </p:spPr>
+        <p:txBody>
+          <a:bodyPr>
+            <a:normAutofit/>
+          </a:bodyPr>
+          <a:lstStyle/>
+          <a:p>
+            <a:r>
+              <a:rPr lang="en-US" sz="3400" dirty="0"/>
+              <a:t>Hey, oh, look at the time….</a:t>
+            </a:r>
+          </a:p>
+          <a:p>
+            <a:r>
+              <a:rPr lang="en-US" sz="3400" dirty="0"/>
+              <a:t>There is something called Road Runner.</a:t>
+            </a:r>
+          </a:p>
+          <a:p>
+            <a:r>
+              <a:rPr lang="en-US" sz="3400" dirty="0"/>
+              <a:t>It’s a path planning app.</a:t>
+            </a:r>
+          </a:p>
+          <a:p>
+            <a:r>
+              <a:rPr lang="en-US" sz="3400" dirty="0"/>
+              <a:t>When you combine Road Runner and Dashboard it looks like the following:</a:t>
+            </a:r>
+          </a:p>
+          <a:p>
+            <a:endParaRPr lang="en-US" sz="3400" dirty="0"/>
+          </a:p>
+        </p:txBody>
+      </p:sp>
+      <p:sp>
+        <p:nvSpPr>
+          <p:cNvPr id="5" name="Footer Placeholder 4">
+            <a:extLst>
+              <a:ext uri="{FF2B5EF4-FFF2-40B4-BE49-F238E27FC236}">
+                <a16:creationId xmlns:a16="http://schemas.microsoft.com/office/drawing/2014/main" id="{EC952921-544E-4F77-8675-F6260F7DB676}"/>
+              </a:ext>
+            </a:extLst>
+          </p:cNvPr>
+          <p:cNvSpPr>
+            <a:spLocks noGrp="1"/>
+          </p:cNvSpPr>
+          <p:nvPr>
+            <p:ph type="ftr" sz="quarter" idx="11"/>
+          </p:nvPr>
+        </p:nvSpPr>
+        <p:spPr>
+          <a:xfrm>
+            <a:off x="145474" y="6359237"/>
+            <a:ext cx="9081654" cy="374074"/>
+          </a:xfrm>
+        </p:spPr>
+        <p:txBody>
+          <a:bodyPr/>
+          <a:lstStyle/>
+          <a:p>
+            <a:r>
+              <a:rPr lang="en-US" sz="2400" dirty="0">
+                <a:solidFill>
+                  <a:schemeClr val="tx1"/>
+                </a:solidFill>
+              </a:rPr>
+              <a:t>https://github.com/JimWright4089/FIRSTWorkshops</a:t>
+            </a:r>
+          </a:p>
+        </p:txBody>
+      </p:sp>
+    </p:spTree>
+    <p:extLst>
+      <p:ext uri="{BB962C8B-B14F-4D97-AF65-F5344CB8AC3E}">
+        <p14:creationId xmlns:p14="http://schemas.microsoft.com/office/powerpoint/2010/main" val="544814281"/>
+      </p:ext>
+    </p:extLst>
+  </p:cSld>
+  <p:clrMapOvr>
+    <a:masterClrMapping/>
+  </p:clrMapOvr>
+</p:sld>
+</file>
+
+<file path=ppt/slides/slide19.xml><?xml version="1.0" encoding="utf-8"?>
+<p:sld xmlns:a="http://schemas.openxmlformats.org/drawingml/2006/main" xmlns:r="http://schemas.openxmlformats.org/officeDocument/2006/relationships" xmlns:p="http://schemas.openxmlformats.org/presentationml/2006/main">
+  <p:cSld>
+    <p:spTree>
+      <p:nvGrpSpPr>
+        <p:cNvPr id="1" name=""/>
+        <p:cNvGrpSpPr/>
+        <p:nvPr/>
+      </p:nvGrpSpPr>
+      <p:grpSpPr>
+        <a:xfrm>
+          <a:off x="0" y="0"/>
+          <a:ext cx="0" cy="0"/>
+          <a:chOff x="0" y="0"/>
+          <a:chExt cx="0" cy="0"/>
+        </a:xfrm>
+      </p:grpSpPr>
+      <p:sp>
+        <p:nvSpPr>
+          <p:cNvPr id="2" name="Title 1">
+            <a:extLst>
+              <a:ext uri="{FF2B5EF4-FFF2-40B4-BE49-F238E27FC236}">
+                <a16:creationId xmlns:a16="http://schemas.microsoft.com/office/drawing/2014/main" id="{CC4A3FAA-0E02-4277-9A18-5E14BC20FA27}"/>
+              </a:ext>
+            </a:extLst>
+          </p:cNvPr>
+          <p:cNvSpPr>
+            <a:spLocks noGrp="1"/>
+          </p:cNvSpPr>
+          <p:nvPr>
+            <p:ph type="title"/>
+          </p:nvPr>
+        </p:nvSpPr>
+        <p:spPr/>
+        <p:txBody>
+          <a:bodyPr/>
+          <a:lstStyle/>
+          <a:p>
+            <a:r>
+              <a:rPr lang="en-US" dirty="0"/>
+              <a:t>FTC Road Runner</a:t>
+            </a:r>
+          </a:p>
+        </p:txBody>
+      </p:sp>
+      <p:sp>
+        <p:nvSpPr>
+          <p:cNvPr id="5" name="Footer Placeholder 4">
+            <a:extLst>
+              <a:ext uri="{FF2B5EF4-FFF2-40B4-BE49-F238E27FC236}">
+                <a16:creationId xmlns:a16="http://schemas.microsoft.com/office/drawing/2014/main" id="{EC952921-544E-4F77-8675-F6260F7DB676}"/>
+              </a:ext>
+            </a:extLst>
+          </p:cNvPr>
+          <p:cNvSpPr>
+            <a:spLocks noGrp="1"/>
+          </p:cNvSpPr>
+          <p:nvPr>
+            <p:ph type="ftr" sz="quarter" idx="11"/>
+          </p:nvPr>
+        </p:nvSpPr>
+        <p:spPr>
+          <a:xfrm>
+            <a:off x="145474" y="6359237"/>
+            <a:ext cx="9081654" cy="374074"/>
+          </a:xfrm>
+        </p:spPr>
+        <p:txBody>
+          <a:bodyPr/>
+          <a:lstStyle/>
+          <a:p>
+            <a:r>
+              <a:rPr lang="en-US" sz="2400" dirty="0">
+                <a:solidFill>
+                  <a:schemeClr val="tx1"/>
+                </a:solidFill>
+              </a:rPr>
+              <a:t>https://github.com/JimWright4089/FIRSTWorkshops</a:t>
+            </a:r>
+          </a:p>
+        </p:txBody>
+      </p:sp>
+      <p:pic>
+        <p:nvPicPr>
+          <p:cNvPr id="8" name="Picture 7" descr="Graphical user interface, histogram&#10;&#10;Description automatically generated">
+            <a:extLst>
+              <a:ext uri="{FF2B5EF4-FFF2-40B4-BE49-F238E27FC236}">
+                <a16:creationId xmlns:a16="http://schemas.microsoft.com/office/drawing/2014/main" id="{4D67387D-8990-2033-AFBF-35612B9AEE2F}"/>
+              </a:ext>
+            </a:extLst>
+          </p:cNvPr>
+          <p:cNvPicPr>
+            <a:picLocks noChangeAspect="1"/>
+          </p:cNvPicPr>
+          <p:nvPr/>
+        </p:nvPicPr>
+        <p:blipFill>
+          <a:blip r:embed="rId2"/>
+          <a:stretch>
+            <a:fillRect/>
+          </a:stretch>
+        </p:blipFill>
+        <p:spPr>
+          <a:xfrm>
+            <a:off x="1954306" y="1680632"/>
+            <a:ext cx="8588188" cy="4300066"/>
+          </a:xfrm>
+          <a:prstGeom prst="rect">
+            <a:avLst/>
+          </a:prstGeom>
+        </p:spPr>
+      </p:pic>
+    </p:spTree>
+    <p:extLst>
+      <p:ext uri="{BB962C8B-B14F-4D97-AF65-F5344CB8AC3E}">
+        <p14:creationId xmlns:p14="http://schemas.microsoft.com/office/powerpoint/2010/main" val="2403800732"/>
       </p:ext>
     </p:extLst>
   </p:cSld>

</xml_diff>